<commit_message>
Created new folders for races which i will apply face recognition distance metric to measure the mean average accuracy of recognition for 20 members of each race for comparison
</commit_message>
<xml_diff>
--- a/Research Methods/Lecture 1/Assignment 2/Research Methods Tasks.pptx
+++ b/Research Methods/Lecture 1/Assignment 2/Research Methods Tasks.pptx
@@ -122,7 +122,7 @@
 <file path=ppt/revisionInfo.xml><?xml version="1.0" encoding="utf-8"?>
 <p1510:revInfo xmlns:a="http://schemas.openxmlformats.org/drawingml/2006/main" xmlns:r="http://schemas.openxmlformats.org/officeDocument/2006/relationships" xmlns:p1510="http://schemas.microsoft.com/office/powerpoint/2015/10/main">
   <p1510:revLst>
-    <p1510:client id="{2E14539D-EE34-460F-AD55-262881C33275}" v="122" dt="2023-01-23T17:06:02.817"/>
+    <p1510:client id="{2E14539D-EE34-460F-AD55-262881C33275}" v="137" dt="2023-01-24T10:52:58.546"/>
   </p1510:revLst>
 </p1510:revInfo>
 </file>
@@ -132,7 +132,7 @@
   <pc:docChgLst>
     <pc:chgData name="Stephen Rerri" userId="ff494b0457865fe3" providerId="LiveId" clId="{2E14539D-EE34-460F-AD55-262881C33275}"/>
     <pc:docChg chg="undo redo custSel addSld modSld">
-      <pc:chgData name="Stephen Rerri" userId="ff494b0457865fe3" providerId="LiveId" clId="{2E14539D-EE34-460F-AD55-262881C33275}" dt="2023-01-23T17:07:22.384" v="2463" actId="207"/>
+      <pc:chgData name="Stephen Rerri" userId="ff494b0457865fe3" providerId="LiveId" clId="{2E14539D-EE34-460F-AD55-262881C33275}" dt="2023-01-24T10:53:55.025" v="2929" actId="20577"/>
       <pc:docMkLst>
         <pc:docMk/>
       </pc:docMkLst>
@@ -294,7 +294,7 @@
         </pc:graphicFrameChg>
       </pc:sldChg>
       <pc:sldChg chg="addSp delSp modSp new mod">
-        <pc:chgData name="Stephen Rerri" userId="ff494b0457865fe3" providerId="LiveId" clId="{2E14539D-EE34-460F-AD55-262881C33275}" dt="2023-01-23T17:07:22.384" v="2463" actId="207"/>
+        <pc:chgData name="Stephen Rerri" userId="ff494b0457865fe3" providerId="LiveId" clId="{2E14539D-EE34-460F-AD55-262881C33275}" dt="2023-01-24T10:53:55.025" v="2929" actId="20577"/>
         <pc:sldMkLst>
           <pc:docMk/>
           <pc:sldMk cId="4179145786" sldId="262"/>
@@ -380,7 +380,7 @@
           </ac:graphicFrameMkLst>
         </pc:graphicFrameChg>
         <pc:graphicFrameChg chg="add mod modGraphic">
-          <ac:chgData name="Stephen Rerri" userId="ff494b0457865fe3" providerId="LiveId" clId="{2E14539D-EE34-460F-AD55-262881C33275}" dt="2023-01-23T16:54:48.491" v="2346" actId="20577"/>
+          <ac:chgData name="Stephen Rerri" userId="ff494b0457865fe3" providerId="LiveId" clId="{2E14539D-EE34-460F-AD55-262881C33275}" dt="2023-01-24T10:36:01.102" v="2802"/>
           <ac:graphicFrameMkLst>
             <pc:docMk/>
             <pc:sldMk cId="4179145786" sldId="262"/>
@@ -396,7 +396,7 @@
           </ac:graphicFrameMkLst>
         </pc:graphicFrameChg>
         <pc:graphicFrameChg chg="add mod modGraphic">
-          <ac:chgData name="Stephen Rerri" userId="ff494b0457865fe3" providerId="LiveId" clId="{2E14539D-EE34-460F-AD55-262881C33275}" dt="2023-01-23T15:19:24.762" v="2193" actId="1076"/>
+          <ac:chgData name="Stephen Rerri" userId="ff494b0457865fe3" providerId="LiveId" clId="{2E14539D-EE34-460F-AD55-262881C33275}" dt="2023-01-24T10:39:25.097" v="2838" actId="20577"/>
           <ac:graphicFrameMkLst>
             <pc:docMk/>
             <pc:sldMk cId="4179145786" sldId="262"/>
@@ -404,7 +404,7 @@
           </ac:graphicFrameMkLst>
         </pc:graphicFrameChg>
         <pc:graphicFrameChg chg="add mod modGraphic">
-          <ac:chgData name="Stephen Rerri" userId="ff494b0457865fe3" providerId="LiveId" clId="{2E14539D-EE34-460F-AD55-262881C33275}" dt="2023-01-23T16:57:46.848" v="2388"/>
+          <ac:chgData name="Stephen Rerri" userId="ff494b0457865fe3" providerId="LiveId" clId="{2E14539D-EE34-460F-AD55-262881C33275}" dt="2023-01-24T10:45:41.408" v="2887" actId="20577"/>
           <ac:graphicFrameMkLst>
             <pc:docMk/>
             <pc:sldMk cId="4179145786" sldId="262"/>
@@ -412,7 +412,7 @@
           </ac:graphicFrameMkLst>
         </pc:graphicFrameChg>
         <pc:graphicFrameChg chg="add mod modGraphic">
-          <ac:chgData name="Stephen Rerri" userId="ff494b0457865fe3" providerId="LiveId" clId="{2E14539D-EE34-460F-AD55-262881C33275}" dt="2023-01-23T17:01:07.760" v="2437" actId="1035"/>
+          <ac:chgData name="Stephen Rerri" userId="ff494b0457865fe3" providerId="LiveId" clId="{2E14539D-EE34-460F-AD55-262881C33275}" dt="2023-01-24T10:49:20.413" v="2907" actId="20577"/>
           <ac:graphicFrameMkLst>
             <pc:docMk/>
             <pc:sldMk cId="4179145786" sldId="262"/>
@@ -420,7 +420,7 @@
           </ac:graphicFrameMkLst>
         </pc:graphicFrameChg>
         <pc:graphicFrameChg chg="add mod modGraphic">
-          <ac:chgData name="Stephen Rerri" userId="ff494b0457865fe3" providerId="LiveId" clId="{2E14539D-EE34-460F-AD55-262881C33275}" dt="2023-01-23T17:07:22.384" v="2463" actId="207"/>
+          <ac:chgData name="Stephen Rerri" userId="ff494b0457865fe3" providerId="LiveId" clId="{2E14539D-EE34-460F-AD55-262881C33275}" dt="2023-01-24T10:53:55.025" v="2929" actId="20577"/>
           <ac:graphicFrameMkLst>
             <pc:docMk/>
             <pc:sldMk cId="4179145786" sldId="262"/>
@@ -435,6 +435,22 @@
             <ac:graphicFrameMk id="21" creationId="{67996ACE-DE04-3FC2-AC01-4C960282B834}"/>
           </ac:graphicFrameMkLst>
         </pc:graphicFrameChg>
+        <pc:picChg chg="add del mod">
+          <ac:chgData name="Stephen Rerri" userId="ff494b0457865fe3" providerId="LiveId" clId="{2E14539D-EE34-460F-AD55-262881C33275}" dt="2023-01-24T10:35:49.044" v="2799" actId="478"/>
+          <ac:picMkLst>
+            <pc:docMk/>
+            <pc:sldMk cId="4179145786" sldId="262"/>
+            <ac:picMk id="4" creationId="{7AB60300-C3CD-F7AC-F9EA-3CABAE210F15}"/>
+          </ac:picMkLst>
+        </pc:picChg>
+        <pc:picChg chg="add del mod">
+          <ac:chgData name="Stephen Rerri" userId="ff494b0457865fe3" providerId="LiveId" clId="{2E14539D-EE34-460F-AD55-262881C33275}" dt="2023-01-24T10:35:55.021" v="2801" actId="478"/>
+          <ac:picMkLst>
+            <pc:docMk/>
+            <pc:sldMk cId="4179145786" sldId="262"/>
+            <ac:picMk id="6" creationId="{DF4AA0CC-D977-7FCC-E1A3-98141C4DF744}"/>
+          </ac:picMkLst>
+        </pc:picChg>
       </pc:sldChg>
       <pc:sldChg chg="modSp new mod">
         <pc:chgData name="Stephen Rerri" userId="ff494b0457865fe3" providerId="LiveId" clId="{2E14539D-EE34-460F-AD55-262881C33275}" dt="2023-01-23T14:22:58.212" v="1448" actId="20577"/>
@@ -605,7 +621,7 @@
           <a:p>
             <a:fld id="{67918565-613A-444B-85EF-DEFF1144F0F9}" type="datetimeFigureOut">
               <a:rPr lang="en-GB" smtClean="0"/>
-              <a:t>23/01/2023</a:t>
+              <a:t>24/01/2023</a:t>
             </a:fld>
             <a:endParaRPr lang="en-GB"/>
           </a:p>
@@ -805,7 +821,7 @@
           <a:p>
             <a:fld id="{67918565-613A-444B-85EF-DEFF1144F0F9}" type="datetimeFigureOut">
               <a:rPr lang="en-GB" smtClean="0"/>
-              <a:t>23/01/2023</a:t>
+              <a:t>24/01/2023</a:t>
             </a:fld>
             <a:endParaRPr lang="en-GB"/>
           </a:p>
@@ -1015,7 +1031,7 @@
           <a:p>
             <a:fld id="{67918565-613A-444B-85EF-DEFF1144F0F9}" type="datetimeFigureOut">
               <a:rPr lang="en-GB" smtClean="0"/>
-              <a:t>23/01/2023</a:t>
+              <a:t>24/01/2023</a:t>
             </a:fld>
             <a:endParaRPr lang="en-GB"/>
           </a:p>
@@ -1215,7 +1231,7 @@
           <a:p>
             <a:fld id="{67918565-613A-444B-85EF-DEFF1144F0F9}" type="datetimeFigureOut">
               <a:rPr lang="en-GB" smtClean="0"/>
-              <a:t>23/01/2023</a:t>
+              <a:t>24/01/2023</a:t>
             </a:fld>
             <a:endParaRPr lang="en-GB"/>
           </a:p>
@@ -1491,7 +1507,7 @@
           <a:p>
             <a:fld id="{67918565-613A-444B-85EF-DEFF1144F0F9}" type="datetimeFigureOut">
               <a:rPr lang="en-GB" smtClean="0"/>
-              <a:t>23/01/2023</a:t>
+              <a:t>24/01/2023</a:t>
             </a:fld>
             <a:endParaRPr lang="en-GB"/>
           </a:p>
@@ -1759,7 +1775,7 @@
           <a:p>
             <a:fld id="{67918565-613A-444B-85EF-DEFF1144F0F9}" type="datetimeFigureOut">
               <a:rPr lang="en-GB" smtClean="0"/>
-              <a:t>23/01/2023</a:t>
+              <a:t>24/01/2023</a:t>
             </a:fld>
             <a:endParaRPr lang="en-GB"/>
           </a:p>
@@ -2174,7 +2190,7 @@
           <a:p>
             <a:fld id="{67918565-613A-444B-85EF-DEFF1144F0F9}" type="datetimeFigureOut">
               <a:rPr lang="en-GB" smtClean="0"/>
-              <a:t>23/01/2023</a:t>
+              <a:t>24/01/2023</a:t>
             </a:fld>
             <a:endParaRPr lang="en-GB"/>
           </a:p>
@@ -2316,7 +2332,7 @@
           <a:p>
             <a:fld id="{67918565-613A-444B-85EF-DEFF1144F0F9}" type="datetimeFigureOut">
               <a:rPr lang="en-GB" smtClean="0"/>
-              <a:t>23/01/2023</a:t>
+              <a:t>24/01/2023</a:t>
             </a:fld>
             <a:endParaRPr lang="en-GB"/>
           </a:p>
@@ -2429,7 +2445,7 @@
           <a:p>
             <a:fld id="{67918565-613A-444B-85EF-DEFF1144F0F9}" type="datetimeFigureOut">
               <a:rPr lang="en-GB" smtClean="0"/>
-              <a:t>23/01/2023</a:t>
+              <a:t>24/01/2023</a:t>
             </a:fld>
             <a:endParaRPr lang="en-GB"/>
           </a:p>
@@ -2742,7 +2758,7 @@
           <a:p>
             <a:fld id="{67918565-613A-444B-85EF-DEFF1144F0F9}" type="datetimeFigureOut">
               <a:rPr lang="en-GB" smtClean="0"/>
-              <a:t>23/01/2023</a:t>
+              <a:t>24/01/2023</a:t>
             </a:fld>
             <a:endParaRPr lang="en-GB"/>
           </a:p>
@@ -3031,7 +3047,7 @@
           <a:p>
             <a:fld id="{67918565-613A-444B-85EF-DEFF1144F0F9}" type="datetimeFigureOut">
               <a:rPr lang="en-GB" smtClean="0"/>
-              <a:t>23/01/2023</a:t>
+              <a:t>24/01/2023</a:t>
             </a:fld>
             <a:endParaRPr lang="en-GB"/>
           </a:p>
@@ -3274,7 +3290,7 @@
           <a:p>
             <a:fld id="{67918565-613A-444B-85EF-DEFF1144F0F9}" type="datetimeFigureOut">
               <a:rPr lang="en-GB" smtClean="0"/>
-              <a:t>23/01/2023</a:t>
+              <a:t>24/01/2023</a:t>
             </a:fld>
             <a:endParaRPr lang="en-GB"/>
           </a:p>
@@ -5309,14 +5325,14 @@
           <p:nvPr>
             <p:extLst>
               <p:ext uri="{D42A27DB-BD31-4B8C-83A1-F6EECF244321}">
-                <p14:modId xmlns:p14="http://schemas.microsoft.com/office/powerpoint/2010/main" val="160102681"/>
+                <p14:modId xmlns:p14="http://schemas.microsoft.com/office/powerpoint/2010/main" val="4189765326"/>
               </p:ext>
             </p:extLst>
           </p:nvPr>
         </p:nvGraphicFramePr>
         <p:xfrm>
           <a:off x="96758" y="1549846"/>
-          <a:ext cx="2288223" cy="3716331"/>
+          <a:ext cx="2288223" cy="3790242"/>
         </p:xfrm>
         <a:graphic>
           <a:graphicData uri="http://schemas.openxmlformats.org/drawingml/2006/table">
@@ -5448,7 +5464,7 @@
                     <a:p>
                       <a:r>
                         <a:rPr lang="en-GB" sz="500" dirty="0"/>
-                        <a:t>10%</a:t>
+                        <a:t>-</a:t>
                       </a:r>
                     </a:p>
                   </a:txBody>
@@ -5496,7 +5512,7 @@
                     <a:p>
                       <a:r>
                         <a:rPr lang="en-GB" sz="500" dirty="0"/>
-                        <a:t>10%</a:t>
+                        <a:t>-</a:t>
                       </a:r>
                     </a:p>
                   </a:txBody>
@@ -5527,7 +5543,10 @@
                     <a:bodyPr/>
                     <a:lstStyle/>
                     <a:p>
-                      <a:endParaRPr lang="en-GB" sz="500" dirty="0"/>
+                      <a:r>
+                        <a:rPr lang="en-GB" sz="500" dirty="0"/>
+                        <a:t>-</a:t>
+                      </a:r>
                     </a:p>
                   </a:txBody>
                   <a:tcPr/>
@@ -5550,7 +5569,10 @@
                     <a:bodyPr/>
                     <a:lstStyle/>
                     <a:p>
-                      <a:endParaRPr lang="en-GB" sz="500"/>
+                      <a:r>
+                        <a:rPr lang="en-GB" sz="500" dirty="0"/>
+                        <a:t>-</a:t>
+                      </a:r>
                     </a:p>
                   </a:txBody>
                   <a:tcPr/>
@@ -5580,7 +5602,10 @@
                     <a:bodyPr/>
                     <a:lstStyle/>
                     <a:p>
-                      <a:endParaRPr lang="en-GB" sz="500" dirty="0"/>
+                      <a:r>
+                        <a:rPr lang="en-GB" sz="500" dirty="0"/>
+                        <a:t>-</a:t>
+                      </a:r>
                     </a:p>
                   </a:txBody>
                   <a:tcPr/>
@@ -5603,7 +5628,10 @@
                     <a:bodyPr/>
                     <a:lstStyle/>
                     <a:p>
-                      <a:endParaRPr lang="en-GB" sz="500"/>
+                      <a:r>
+                        <a:rPr lang="en-GB" sz="500" dirty="0"/>
+                        <a:t>-</a:t>
+                      </a:r>
                     </a:p>
                   </a:txBody>
                   <a:tcPr/>
@@ -5633,7 +5661,10 @@
                     <a:bodyPr/>
                     <a:lstStyle/>
                     <a:p>
-                      <a:endParaRPr lang="en-GB" sz="500" dirty="0"/>
+                      <a:r>
+                        <a:rPr lang="en-GB" sz="500" dirty="0"/>
+                        <a:t>-</a:t>
+                      </a:r>
                     </a:p>
                   </a:txBody>
                   <a:tcPr/>
@@ -5656,7 +5687,10 @@
                     <a:bodyPr/>
                     <a:lstStyle/>
                     <a:p>
-                      <a:endParaRPr lang="en-GB" sz="500"/>
+                      <a:r>
+                        <a:rPr lang="en-GB" sz="500" dirty="0"/>
+                        <a:t>-</a:t>
+                      </a:r>
                     </a:p>
                   </a:txBody>
                   <a:tcPr/>
@@ -5706,7 +5740,10 @@
                     <a:bodyPr/>
                     <a:lstStyle/>
                     <a:p>
-                      <a:endParaRPr lang="en-GB" sz="500" dirty="0"/>
+                      <a:r>
+                        <a:rPr lang="en-GB" sz="500" dirty="0"/>
+                        <a:t>-</a:t>
+                      </a:r>
                     </a:p>
                   </a:txBody>
                   <a:tcPr/>
@@ -5734,7 +5771,10 @@
                     <a:bodyPr/>
                     <a:lstStyle/>
                     <a:p>
-                      <a:endParaRPr lang="en-GB" sz="500" dirty="0"/>
+                      <a:r>
+                        <a:rPr lang="en-GB" sz="500" dirty="0"/>
+                        <a:t>-</a:t>
+                      </a:r>
                     </a:p>
                   </a:txBody>
                   <a:tcPr/>
@@ -5768,7 +5808,10 @@
                     <a:bodyPr/>
                     <a:lstStyle/>
                     <a:p>
-                      <a:endParaRPr lang="en-GB" sz="500" dirty="0"/>
+                      <a:r>
+                        <a:rPr lang="en-GB" sz="500" dirty="0"/>
+                        <a:t>-</a:t>
+                      </a:r>
                     </a:p>
                   </a:txBody>
                   <a:tcPr/>
@@ -5808,7 +5851,10 @@
                     <a:bodyPr/>
                     <a:lstStyle/>
                     <a:p>
-                      <a:endParaRPr lang="en-GB" sz="500" dirty="0"/>
+                      <a:r>
+                        <a:rPr lang="en-GB" sz="500" dirty="0"/>
+                        <a:t>-</a:t>
+                      </a:r>
                     </a:p>
                   </a:txBody>
                   <a:tcPr/>
@@ -5838,7 +5884,10 @@
                     <a:bodyPr/>
                     <a:lstStyle/>
                     <a:p>
-                      <a:endParaRPr lang="en-GB" sz="500" dirty="0"/>
+                      <a:r>
+                        <a:rPr lang="en-GB" sz="500" dirty="0"/>
+                        <a:t>-</a:t>
+                      </a:r>
                     </a:p>
                   </a:txBody>
                   <a:tcPr/>
@@ -5861,7 +5910,10 @@
                     <a:bodyPr/>
                     <a:lstStyle/>
                     <a:p>
-                      <a:endParaRPr lang="en-GB" sz="500" dirty="0"/>
+                      <a:r>
+                        <a:rPr lang="en-GB" sz="500" dirty="0"/>
+                        <a:t>-</a:t>
+                      </a:r>
                     </a:p>
                   </a:txBody>
                   <a:tcPr/>
@@ -5900,7 +5952,10 @@
                     <a:bodyPr/>
                     <a:lstStyle/>
                     <a:p>
-                      <a:endParaRPr lang="en-GB" sz="500" dirty="0"/>
+                      <a:r>
+                        <a:rPr lang="en-GB" sz="500" dirty="0"/>
+                        <a:t>-</a:t>
+                      </a:r>
                     </a:p>
                   </a:txBody>
                   <a:tcPr/>
@@ -5923,7 +5978,10 @@
                     <a:bodyPr/>
                     <a:lstStyle/>
                     <a:p>
-                      <a:endParaRPr lang="en-GB" sz="500" dirty="0"/>
+                      <a:r>
+                        <a:rPr lang="en-GB" sz="500" dirty="0"/>
+                        <a:t>-</a:t>
+                      </a:r>
                     </a:p>
                   </a:txBody>
                   <a:tcPr/>
@@ -5942,7 +6000,7 @@
                     <a:p>
                       <a:r>
                         <a:rPr lang="en-GB" sz="500" dirty="0" err="1"/>
-                        <a:t>Takenori</a:t>
+                        <a:t>Agbani</a:t>
                       </a:r>
                       <a:r>
                         <a:rPr lang="en-GB" sz="500" dirty="0"/>
@@ -5950,7 +6008,7 @@
                       </a:r>
                       <a:r>
                         <a:rPr lang="en-GB" sz="500" dirty="0" err="1"/>
-                        <a:t>Kanzaki</a:t>
+                        <a:t>Darego</a:t>
                       </a:r>
                       <a:endParaRPr lang="en-GB" sz="500" dirty="0"/>
                     </a:p>
@@ -5962,7 +6020,10 @@
                     <a:bodyPr/>
                     <a:lstStyle/>
                     <a:p>
-                      <a:endParaRPr lang="en-GB" sz="500" dirty="0"/>
+                      <a:r>
+                        <a:rPr lang="en-GB" sz="500" dirty="0"/>
+                        <a:t>-</a:t>
+                      </a:r>
                     </a:p>
                   </a:txBody>
                   <a:tcPr/>
@@ -5985,7 +6046,10 @@
                     <a:bodyPr/>
                     <a:lstStyle/>
                     <a:p>
-                      <a:endParaRPr lang="en-GB" sz="500" dirty="0"/>
+                      <a:r>
+                        <a:rPr lang="en-GB" sz="500" dirty="0"/>
+                        <a:t>-</a:t>
+                      </a:r>
                     </a:p>
                   </a:txBody>
                   <a:tcPr/>
@@ -6015,7 +6079,10 @@
                     <a:bodyPr/>
                     <a:lstStyle/>
                     <a:p>
-                      <a:endParaRPr lang="en-GB" sz="500" dirty="0"/>
+                      <a:r>
+                        <a:rPr lang="en-GB" sz="500" dirty="0"/>
+                        <a:t>-</a:t>
+                      </a:r>
                     </a:p>
                   </a:txBody>
                   <a:tcPr/>
@@ -6038,7 +6105,10 @@
                     <a:bodyPr/>
                     <a:lstStyle/>
                     <a:p>
-                      <a:endParaRPr lang="en-GB" sz="500"/>
+                      <a:r>
+                        <a:rPr lang="en-GB" sz="500" dirty="0"/>
+                        <a:t>-</a:t>
+                      </a:r>
                     </a:p>
                   </a:txBody>
                   <a:tcPr/>
@@ -6068,7 +6138,10 @@
                     <a:bodyPr/>
                     <a:lstStyle/>
                     <a:p>
-                      <a:endParaRPr lang="en-GB" sz="500" dirty="0"/>
+                      <a:r>
+                        <a:rPr lang="en-GB" sz="500" dirty="0"/>
+                        <a:t>-</a:t>
+                      </a:r>
                     </a:p>
                   </a:txBody>
                   <a:tcPr/>
@@ -6113,7 +6186,10 @@
                     <a:bodyPr/>
                     <a:lstStyle/>
                     <a:p>
-                      <a:endParaRPr lang="en-GB" sz="500" dirty="0"/>
+                      <a:r>
+                        <a:rPr lang="en-GB" sz="500" dirty="0"/>
+                        <a:t>-</a:t>
+                      </a:r>
                     </a:p>
                   </a:txBody>
                   <a:tcPr/>
@@ -6143,7 +6219,10 @@
                     <a:bodyPr/>
                     <a:lstStyle/>
                     <a:p>
-                      <a:endParaRPr lang="en-GB" sz="500" dirty="0"/>
+                      <a:r>
+                        <a:rPr lang="en-GB" sz="500" dirty="0"/>
+                        <a:t>-</a:t>
+                      </a:r>
                     </a:p>
                   </a:txBody>
                   <a:tcPr/>
@@ -6171,7 +6250,10 @@
                     <a:bodyPr/>
                     <a:lstStyle/>
                     <a:p>
-                      <a:endParaRPr lang="en-GB" sz="500"/>
+                      <a:r>
+                        <a:rPr lang="en-GB" sz="500" dirty="0"/>
+                        <a:t>-</a:t>
+                      </a:r>
                     </a:p>
                   </a:txBody>
                   <a:tcPr/>
@@ -6201,7 +6283,10 @@
                     <a:bodyPr/>
                     <a:lstStyle/>
                     <a:p>
-                      <a:endParaRPr lang="en-GB" sz="500" dirty="0"/>
+                      <a:r>
+                        <a:rPr lang="en-GB" sz="500" dirty="0"/>
+                        <a:t>-</a:t>
+                      </a:r>
                     </a:p>
                   </a:txBody>
                   <a:tcPr/>
@@ -6224,7 +6309,10 @@
                     <a:bodyPr/>
                     <a:lstStyle/>
                     <a:p>
-                      <a:endParaRPr lang="en-GB" sz="500" dirty="0"/>
+                      <a:r>
+                        <a:rPr lang="en-GB" sz="500" dirty="0"/>
+                        <a:t>-</a:t>
+                      </a:r>
                     </a:p>
                   </a:txBody>
                   <a:tcPr/>
@@ -6254,7 +6342,10 @@
                     <a:bodyPr/>
                     <a:lstStyle/>
                     <a:p>
-                      <a:endParaRPr lang="en-GB" sz="500" dirty="0"/>
+                      <a:r>
+                        <a:rPr lang="en-GB" sz="500" dirty="0"/>
+                        <a:t>-</a:t>
+                      </a:r>
                     </a:p>
                   </a:txBody>
                   <a:tcPr/>
@@ -6282,7 +6373,10 @@
                     <a:bodyPr/>
                     <a:lstStyle/>
                     <a:p>
-                      <a:endParaRPr lang="en-GB" sz="500" dirty="0"/>
+                      <a:r>
+                        <a:rPr lang="en-GB" sz="500" dirty="0"/>
+                        <a:t>-</a:t>
+                      </a:r>
                     </a:p>
                   </a:txBody>
                   <a:tcPr/>
@@ -6312,30 +6406,61 @@
                     <a:bodyPr/>
                     <a:lstStyle/>
                     <a:p>
+                      <a:r>
+                        <a:rPr lang="en-GB" sz="500" dirty="0"/>
+                        <a:t>-</a:t>
+                      </a:r>
+                    </a:p>
+                  </a:txBody>
+                  <a:tcPr/>
+                </a:tc>
+                <a:tc>
+                  <a:txBody>
+                    <a:bodyPr/>
+                    <a:lstStyle/>
+                    <a:p>
+                      <a:pPr marL="0" marR="0" lvl="0" indent="0" algn="l" defTabSz="914400" rtl="0" eaLnBrk="1" fontAlgn="auto" latinLnBrk="0" hangingPunct="1">
+                        <a:lnSpc>
+                          <a:spcPct val="100000"/>
+                        </a:lnSpc>
+                        <a:spcBef>
+                          <a:spcPts val="0"/>
+                        </a:spcBef>
+                        <a:spcAft>
+                          <a:spcPts val="0"/>
+                        </a:spcAft>
+                        <a:buClrTx/>
+                        <a:buSzTx/>
+                        <a:buFontTx/>
+                        <a:buNone/>
+                        <a:tabLst/>
+                        <a:defRPr/>
+                      </a:pPr>
+                      <a:r>
+                        <a:rPr lang="en-GB" sz="500" dirty="0"/>
+                        <a:t>Tatiana </a:t>
+                      </a:r>
+                      <a:r>
+                        <a:rPr lang="en-GB" sz="500" dirty="0" err="1"/>
+                        <a:t>Gratcheva</a:t>
+                      </a:r>
                       <a:endParaRPr lang="en-GB" sz="500" dirty="0"/>
                     </a:p>
-                  </a:txBody>
-                  <a:tcPr/>
-                </a:tc>
-                <a:tc>
-                  <a:txBody>
-                    <a:bodyPr/>
-                    <a:lstStyle/>
-                    <a:p>
-                      <a:r>
-                        <a:rPr lang="en-GB" sz="500" dirty="0"/>
-                        <a:t>Yashwant Sinha</a:t>
-                      </a:r>
-                    </a:p>
-                  </a:txBody>
-                  <a:tcPr/>
-                </a:tc>
-                <a:tc>
-                  <a:txBody>
-                    <a:bodyPr/>
-                    <a:lstStyle/>
                     <a:p>
                       <a:endParaRPr lang="en-GB" sz="500" dirty="0"/>
+                    </a:p>
+                  </a:txBody>
+                  <a:tcPr/>
+                </a:tc>
+                <a:tc>
+                  <a:txBody>
+                    <a:bodyPr/>
+                    <a:lstStyle/>
+                    <a:p>
+                      <a:r>
+                        <a:rPr lang="en-GB" sz="500" dirty="0"/>
+                        <a:t>-</a:t>
+                      </a:r>
                     </a:p>
                   </a:txBody>
                   <a:tcPr/>
@@ -6365,7 +6490,10 @@
                     <a:bodyPr/>
                     <a:lstStyle/>
                     <a:p>
-                      <a:endParaRPr lang="en-GB" sz="500" dirty="0"/>
+                      <a:r>
+                        <a:rPr lang="en-GB" sz="500" dirty="0"/>
+                        <a:t>-</a:t>
+                      </a:r>
                     </a:p>
                   </a:txBody>
                   <a:tcPr/>
@@ -6388,7 +6516,10 @@
                     <a:bodyPr/>
                     <a:lstStyle/>
                     <a:p>
-                      <a:endParaRPr lang="en-GB" sz="500" dirty="0"/>
+                      <a:r>
+                        <a:rPr lang="en-GB" sz="500" dirty="0"/>
+                        <a:t>-</a:t>
+                      </a:r>
                     </a:p>
                   </a:txBody>
                   <a:tcPr/>
@@ -6418,7 +6549,10 @@
                     <a:bodyPr/>
                     <a:lstStyle/>
                     <a:p>
-                      <a:endParaRPr lang="en-GB" sz="500" dirty="0"/>
+                      <a:r>
+                        <a:rPr lang="en-GB" sz="500" dirty="0"/>
+                        <a:t>-</a:t>
+                      </a:r>
                     </a:p>
                   </a:txBody>
                   <a:tcPr/>
@@ -6441,7 +6575,10 @@
                     <a:bodyPr/>
                     <a:lstStyle/>
                     <a:p>
-                      <a:endParaRPr lang="en-GB" sz="500" dirty="0"/>
+                      <a:r>
+                        <a:rPr lang="en-GB" sz="500" dirty="0"/>
+                        <a:t>-</a:t>
+                      </a:r>
                     </a:p>
                   </a:txBody>
                   <a:tcPr/>
@@ -6471,7 +6608,10 @@
                     <a:bodyPr/>
                     <a:lstStyle/>
                     <a:p>
-                      <a:endParaRPr lang="en-GB" sz="500" dirty="0"/>
+                      <a:r>
+                        <a:rPr lang="en-GB" sz="500" dirty="0"/>
+                        <a:t>-</a:t>
+                      </a:r>
                     </a:p>
                   </a:txBody>
                   <a:tcPr/>
@@ -6494,7 +6634,10 @@
                     <a:bodyPr/>
                     <a:lstStyle/>
                     <a:p>
-                      <a:endParaRPr lang="en-GB" sz="500" dirty="0"/>
+                      <a:r>
+                        <a:rPr lang="en-GB" sz="500" dirty="0"/>
+                        <a:t>-</a:t>
+                      </a:r>
                     </a:p>
                   </a:txBody>
                   <a:tcPr/>
@@ -6525,7 +6668,10 @@
                     <a:bodyPr/>
                     <a:lstStyle/>
                     <a:p>
-                      <a:endParaRPr lang="en-GB" sz="500" dirty="0"/>
+                      <a:r>
+                        <a:rPr lang="en-GB" sz="500" dirty="0"/>
+                        <a:t>-</a:t>
+                      </a:r>
                     </a:p>
                   </a:txBody>
                   <a:tcPr/>
@@ -6548,7 +6694,10 @@
                     <a:bodyPr/>
                     <a:lstStyle/>
                     <a:p>
-                      <a:endParaRPr lang="en-GB" sz="500" dirty="0"/>
+                      <a:r>
+                        <a:rPr lang="en-GB" sz="500" dirty="0"/>
+                        <a:t>-</a:t>
+                      </a:r>
                     </a:p>
                   </a:txBody>
                   <a:tcPr/>
@@ -6578,6 +6727,44 @@
                     <a:bodyPr/>
                     <a:lstStyle/>
                     <a:p>
+                      <a:r>
+                        <a:rPr lang="en-GB" sz="500" dirty="0"/>
+                        <a:t>-</a:t>
+                      </a:r>
+                    </a:p>
+                  </a:txBody>
+                  <a:tcPr/>
+                </a:tc>
+                <a:tc>
+                  <a:txBody>
+                    <a:bodyPr/>
+                    <a:lstStyle/>
+                    <a:p>
+                      <a:pPr marL="0" marR="0" lvl="0" indent="0" algn="l" defTabSz="914400" rtl="0" eaLnBrk="1" fontAlgn="auto" latinLnBrk="0" hangingPunct="1">
+                        <a:lnSpc>
+                          <a:spcPct val="100000"/>
+                        </a:lnSpc>
+                        <a:spcBef>
+                          <a:spcPts val="0"/>
+                        </a:spcBef>
+                        <a:spcAft>
+                          <a:spcPts val="0"/>
+                        </a:spcAft>
+                        <a:buClrTx/>
+                        <a:buSzTx/>
+                        <a:buFontTx/>
+                        <a:buNone/>
+                        <a:tabLst/>
+                        <a:defRPr/>
+                      </a:pPr>
+                      <a:r>
+                        <a:rPr lang="en-GB" sz="500" dirty="0"/>
+                        <a:t>Wolfgang </a:t>
+                      </a:r>
+                      <a:r>
+                        <a:rPr lang="en-GB" sz="500" dirty="0" err="1"/>
+                        <a:t>Schuessel</a:t>
+                      </a:r>
                       <a:endParaRPr lang="en-GB" sz="500" dirty="0"/>
                     </a:p>
                   </a:txBody>
@@ -6590,18 +6777,8 @@
                     <a:p>
                       <a:r>
                         <a:rPr lang="en-GB" sz="500" dirty="0"/>
-                        <a:t>Yves Brodeur</a:t>
-                      </a:r>
-                    </a:p>
-                  </a:txBody>
-                  <a:tcPr/>
-                </a:tc>
-                <a:tc>
-                  <a:txBody>
-                    <a:bodyPr/>
-                    <a:lstStyle/>
-                    <a:p>
-                      <a:endParaRPr lang="en-GB" sz="500" dirty="0"/>
+                        <a:t>-</a:t>
+                      </a:r>
                     </a:p>
                   </a:txBody>
                   <a:tcPr/>
@@ -6631,7 +6808,7 @@
           <p:nvPr>
             <p:extLst>
               <p:ext uri="{D42A27DB-BD31-4B8C-83A1-F6EECF244321}">
-                <p14:modId xmlns:p14="http://schemas.microsoft.com/office/powerpoint/2010/main" val="2337768988"/>
+                <p14:modId xmlns:p14="http://schemas.microsoft.com/office/powerpoint/2010/main" val="1267802506"/>
               </p:ext>
             </p:extLst>
           </p:nvPr>
@@ -6770,7 +6947,7 @@
                     <a:p>
                       <a:r>
                         <a:rPr lang="en-GB" sz="500" dirty="0"/>
-                        <a:t>10%</a:t>
+                        <a:t>-</a:t>
                       </a:r>
                     </a:p>
                   </a:txBody>
@@ -6818,7 +6995,7 @@
                     <a:p>
                       <a:r>
                         <a:rPr lang="en-GB" sz="500" dirty="0"/>
-                        <a:t>10%</a:t>
+                        <a:t>-</a:t>
                       </a:r>
                     </a:p>
                   </a:txBody>
@@ -6866,7 +7043,10 @@
                     <a:bodyPr/>
                     <a:lstStyle/>
                     <a:p>
-                      <a:endParaRPr lang="en-GB" sz="500" dirty="0"/>
+                      <a:r>
+                        <a:rPr lang="en-GB" sz="500" dirty="0"/>
+                        <a:t>-</a:t>
+                      </a:r>
                     </a:p>
                   </a:txBody>
                   <a:tcPr/>
@@ -6889,7 +7069,10 @@
                     <a:bodyPr/>
                     <a:lstStyle/>
                     <a:p>
-                      <a:endParaRPr lang="en-GB" sz="500"/>
+                      <a:r>
+                        <a:rPr lang="en-GB" sz="500" dirty="0"/>
+                        <a:t>-</a:t>
+                      </a:r>
                     </a:p>
                   </a:txBody>
                   <a:tcPr/>
@@ -6925,13 +7108,8 @@
                       </a:pPr>
                       <a:r>
                         <a:rPr lang="en-GB" sz="500" dirty="0"/>
-                        <a:t>Wolfgang </a:t>
-                      </a:r>
-                      <a:r>
-                        <a:rPr lang="en-GB" sz="500" dirty="0" err="1"/>
-                        <a:t>Schuessel</a:t>
-                      </a:r>
-                      <a:endParaRPr lang="en-GB" sz="500" dirty="0"/>
+                        <a:t>Takeo Fukui</a:t>
+                      </a:r>
                     </a:p>
                   </a:txBody>
                   <a:tcPr marL="49380" marR="49380" marT="24691" marB="24691"/>
@@ -6941,7 +7119,10 @@
                     <a:bodyPr/>
                     <a:lstStyle/>
                     <a:p>
-                      <a:endParaRPr lang="en-GB" sz="500"/>
+                      <a:r>
+                        <a:rPr lang="en-GB" sz="500" dirty="0"/>
+                        <a:t>-</a:t>
+                      </a:r>
                     </a:p>
                   </a:txBody>
                   <a:tcPr/>
@@ -6964,7 +7145,10 @@
                     <a:bodyPr/>
                     <a:lstStyle/>
                     <a:p>
-                      <a:endParaRPr lang="en-GB" sz="500"/>
+                      <a:r>
+                        <a:rPr lang="en-GB" sz="500" dirty="0"/>
+                        <a:t>-</a:t>
+                      </a:r>
                     </a:p>
                   </a:txBody>
                   <a:tcPr/>
@@ -6994,7 +7178,10 @@
                     <a:bodyPr/>
                     <a:lstStyle/>
                     <a:p>
-                      <a:endParaRPr lang="en-GB" sz="500"/>
+                      <a:r>
+                        <a:rPr lang="en-GB" sz="500" dirty="0"/>
+                        <a:t>-</a:t>
+                      </a:r>
                     </a:p>
                   </a:txBody>
                   <a:tcPr/>
@@ -7017,7 +7204,10 @@
                     <a:bodyPr/>
                     <a:lstStyle/>
                     <a:p>
-                      <a:endParaRPr lang="en-GB" sz="500"/>
+                      <a:r>
+                        <a:rPr lang="en-GB" sz="500" dirty="0"/>
+                        <a:t>-</a:t>
+                      </a:r>
                     </a:p>
                   </a:txBody>
                   <a:tcPr/>
@@ -7047,7 +7237,10 @@
                     <a:bodyPr/>
                     <a:lstStyle/>
                     <a:p>
-                      <a:endParaRPr lang="en-GB" sz="500" dirty="0"/>
+                      <a:r>
+                        <a:rPr lang="en-GB" sz="500" dirty="0"/>
+                        <a:t>-</a:t>
+                      </a:r>
                     </a:p>
                   </a:txBody>
                   <a:tcPr/>
@@ -7075,7 +7268,10 @@
                     <a:bodyPr/>
                     <a:lstStyle/>
                     <a:p>
-                      <a:endParaRPr lang="en-GB" sz="500" dirty="0"/>
+                      <a:r>
+                        <a:rPr lang="en-GB" sz="500" dirty="0"/>
+                        <a:t>-</a:t>
+                      </a:r>
                     </a:p>
                   </a:txBody>
                   <a:tcPr/>
@@ -7110,7 +7306,10 @@
                     <a:bodyPr/>
                     <a:lstStyle/>
                     <a:p>
-                      <a:endParaRPr lang="en-GB" sz="500" dirty="0"/>
+                      <a:r>
+                        <a:rPr lang="en-GB" sz="500" dirty="0"/>
+                        <a:t>-</a:t>
+                      </a:r>
                     </a:p>
                   </a:txBody>
                   <a:tcPr/>
@@ -7150,7 +7349,10 @@
                     <a:bodyPr/>
                     <a:lstStyle/>
                     <a:p>
-                      <a:endParaRPr lang="en-GB" sz="500" dirty="0"/>
+                      <a:r>
+                        <a:rPr lang="en-GB" sz="500" dirty="0"/>
+                        <a:t>-</a:t>
+                      </a:r>
                     </a:p>
                   </a:txBody>
                   <a:tcPr/>
@@ -7180,7 +7382,10 @@
                     <a:bodyPr/>
                     <a:lstStyle/>
                     <a:p>
-                      <a:endParaRPr lang="en-GB" sz="500"/>
+                      <a:r>
+                        <a:rPr lang="en-GB" sz="500" dirty="0"/>
+                        <a:t>-</a:t>
+                      </a:r>
                     </a:p>
                   </a:txBody>
                   <a:tcPr/>
@@ -7203,7 +7408,10 @@
                     <a:bodyPr/>
                     <a:lstStyle/>
                     <a:p>
-                      <a:endParaRPr lang="en-GB" sz="500" dirty="0"/>
+                      <a:r>
+                        <a:rPr lang="en-GB" sz="500" dirty="0"/>
+                        <a:t>-</a:t>
+                      </a:r>
                     </a:p>
                   </a:txBody>
                   <a:tcPr/>
@@ -7233,7 +7441,10 @@
                     <a:bodyPr/>
                     <a:lstStyle/>
                     <a:p>
-                      <a:endParaRPr lang="en-GB" sz="500"/>
+                      <a:r>
+                        <a:rPr lang="en-GB" sz="500" dirty="0"/>
+                        <a:t>-</a:t>
+                      </a:r>
                     </a:p>
                   </a:txBody>
                   <a:tcPr/>
@@ -7256,7 +7467,10 @@
                     <a:bodyPr/>
                     <a:lstStyle/>
                     <a:p>
-                      <a:endParaRPr lang="en-GB" sz="500" dirty="0"/>
+                      <a:r>
+                        <a:rPr lang="en-GB" sz="500" dirty="0"/>
+                        <a:t>-</a:t>
+                      </a:r>
                     </a:p>
                   </a:txBody>
                   <a:tcPr/>
@@ -7287,7 +7501,10 @@
                     <a:bodyPr/>
                     <a:lstStyle/>
                     <a:p>
-                      <a:endParaRPr lang="en-GB" sz="500"/>
+                      <a:r>
+                        <a:rPr lang="en-GB" sz="500" dirty="0"/>
+                        <a:t>-</a:t>
+                      </a:r>
                     </a:p>
                   </a:txBody>
                   <a:tcPr/>
@@ -7310,7 +7527,10 @@
                     <a:bodyPr/>
                     <a:lstStyle/>
                     <a:p>
-                      <a:endParaRPr lang="en-GB" sz="500" dirty="0"/>
+                      <a:r>
+                        <a:rPr lang="en-GB" sz="500" dirty="0"/>
+                        <a:t>-</a:t>
+                      </a:r>
                     </a:p>
                   </a:txBody>
                   <a:tcPr/>
@@ -7348,7 +7568,10 @@
                     <a:bodyPr/>
                     <a:lstStyle/>
                     <a:p>
-                      <a:endParaRPr lang="en-GB" sz="500" dirty="0"/>
+                      <a:r>
+                        <a:rPr lang="en-GB" sz="500" dirty="0"/>
+                        <a:t>-</a:t>
+                      </a:r>
                     </a:p>
                   </a:txBody>
                   <a:tcPr/>
@@ -7371,7 +7594,10 @@
                     <a:bodyPr/>
                     <a:lstStyle/>
                     <a:p>
-                      <a:endParaRPr lang="en-GB" sz="500"/>
+                      <a:r>
+                        <a:rPr lang="en-GB" sz="500" dirty="0"/>
+                        <a:t>-</a:t>
+                      </a:r>
                     </a:p>
                   </a:txBody>
                   <a:tcPr/>
@@ -7401,7 +7627,10 @@
                     <a:bodyPr/>
                     <a:lstStyle/>
                     <a:p>
-                      <a:endParaRPr lang="en-GB" sz="500"/>
+                      <a:r>
+                        <a:rPr lang="en-GB" sz="500" dirty="0"/>
+                        <a:t>-</a:t>
+                      </a:r>
                     </a:p>
                   </a:txBody>
                   <a:tcPr/>
@@ -7446,7 +7675,10 @@
                     <a:bodyPr/>
                     <a:lstStyle/>
                     <a:p>
-                      <a:endParaRPr lang="en-GB" sz="500" dirty="0"/>
+                      <a:r>
+                        <a:rPr lang="en-GB" sz="500" dirty="0"/>
+                        <a:t>-</a:t>
+                      </a:r>
                     </a:p>
                   </a:txBody>
                   <a:tcPr/>
@@ -7481,7 +7713,10 @@
                     <a:bodyPr/>
                     <a:lstStyle/>
                     <a:p>
-                      <a:endParaRPr lang="en-GB" sz="500"/>
+                      <a:r>
+                        <a:rPr lang="en-GB" sz="500" dirty="0"/>
+                        <a:t>-</a:t>
+                      </a:r>
                     </a:p>
                   </a:txBody>
                   <a:tcPr/>
@@ -7509,7 +7744,10 @@
                     <a:bodyPr/>
                     <a:lstStyle/>
                     <a:p>
-                      <a:endParaRPr lang="en-GB" sz="500"/>
+                      <a:r>
+                        <a:rPr lang="en-GB" sz="500" dirty="0"/>
+                        <a:t>-</a:t>
+                      </a:r>
                     </a:p>
                   </a:txBody>
                   <a:tcPr/>
@@ -7539,7 +7777,10 @@
                     <a:bodyPr/>
                     <a:lstStyle/>
                     <a:p>
-                      <a:endParaRPr lang="en-GB" sz="500"/>
+                      <a:r>
+                        <a:rPr lang="en-GB" sz="500" dirty="0"/>
+                        <a:t>-</a:t>
+                      </a:r>
                     </a:p>
                   </a:txBody>
                   <a:tcPr/>
@@ -7562,7 +7803,10 @@
                     <a:bodyPr/>
                     <a:lstStyle/>
                     <a:p>
-                      <a:endParaRPr lang="en-GB" sz="500" dirty="0"/>
+                      <a:r>
+                        <a:rPr lang="en-GB" sz="500" dirty="0"/>
+                        <a:t>-</a:t>
+                      </a:r>
                     </a:p>
                   </a:txBody>
                   <a:tcPr/>
@@ -7596,7 +7840,10 @@
                     <a:bodyPr/>
                     <a:lstStyle/>
                     <a:p>
-                      <a:endParaRPr lang="en-GB" sz="500" dirty="0"/>
+                      <a:r>
+                        <a:rPr lang="en-GB" sz="500" dirty="0"/>
+                        <a:t>-</a:t>
+                      </a:r>
                     </a:p>
                   </a:txBody>
                   <a:tcPr/>
@@ -7624,7 +7871,10 @@
                     <a:bodyPr/>
                     <a:lstStyle/>
                     <a:p>
-                      <a:endParaRPr lang="en-GB" sz="500" dirty="0"/>
+                      <a:r>
+                        <a:rPr lang="en-GB" sz="500" dirty="0"/>
+                        <a:t>-</a:t>
+                      </a:r>
                     </a:p>
                   </a:txBody>
                   <a:tcPr/>
@@ -7658,7 +7908,10 @@
                     <a:bodyPr/>
                     <a:lstStyle/>
                     <a:p>
-                      <a:endParaRPr lang="en-GB" sz="500"/>
+                      <a:r>
+                        <a:rPr lang="en-GB" sz="500" dirty="0"/>
+                        <a:t>-</a:t>
+                      </a:r>
                     </a:p>
                   </a:txBody>
                   <a:tcPr/>
@@ -7681,7 +7934,10 @@
                     <a:bodyPr/>
                     <a:lstStyle/>
                     <a:p>
-                      <a:endParaRPr lang="en-GB" sz="500" dirty="0"/>
+                      <a:r>
+                        <a:rPr lang="en-GB" sz="500" dirty="0"/>
+                        <a:t>-</a:t>
+                      </a:r>
                     </a:p>
                   </a:txBody>
                   <a:tcPr/>
@@ -7711,7 +7967,10 @@
                     <a:bodyPr/>
                     <a:lstStyle/>
                     <a:p>
-                      <a:endParaRPr lang="en-GB" sz="500"/>
+                      <a:r>
+                        <a:rPr lang="en-GB" sz="500" dirty="0"/>
+                        <a:t>-</a:t>
+                      </a:r>
                     </a:p>
                   </a:txBody>
                   <a:tcPr/>
@@ -7734,7 +7993,10 @@
                     <a:bodyPr/>
                     <a:lstStyle/>
                     <a:p>
-                      <a:endParaRPr lang="en-GB" sz="500" dirty="0"/>
+                      <a:r>
+                        <a:rPr lang="en-GB" sz="500" dirty="0"/>
+                        <a:t>-</a:t>
+                      </a:r>
                     </a:p>
                   </a:txBody>
                   <a:tcPr/>
@@ -7772,7 +8034,10 @@
                     <a:bodyPr/>
                     <a:lstStyle/>
                     <a:p>
-                      <a:endParaRPr lang="en-GB" sz="500" dirty="0"/>
+                      <a:r>
+                        <a:rPr lang="en-GB" sz="500" dirty="0"/>
+                        <a:t>-</a:t>
+                      </a:r>
                     </a:p>
                   </a:txBody>
                   <a:tcPr/>
@@ -7795,7 +8060,10 @@
                     <a:bodyPr/>
                     <a:lstStyle/>
                     <a:p>
-                      <a:endParaRPr lang="en-GB" sz="500" dirty="0"/>
+                      <a:r>
+                        <a:rPr lang="en-GB" sz="500" dirty="0"/>
+                        <a:t>-</a:t>
+                      </a:r>
                     </a:p>
                   </a:txBody>
                   <a:tcPr/>
@@ -7830,7 +8098,10 @@
                     <a:bodyPr/>
                     <a:lstStyle/>
                     <a:p>
-                      <a:endParaRPr lang="en-GB" sz="500"/>
+                      <a:r>
+                        <a:rPr lang="en-GB" sz="500" dirty="0"/>
+                        <a:t>-</a:t>
+                      </a:r>
                     </a:p>
                   </a:txBody>
                   <a:tcPr/>
@@ -7853,7 +8124,10 @@
                     <a:bodyPr/>
                     <a:lstStyle/>
                     <a:p>
-                      <a:endParaRPr lang="en-GB" sz="500" dirty="0"/>
+                      <a:r>
+                        <a:rPr lang="en-GB" sz="500" dirty="0"/>
+                        <a:t>-</a:t>
+                      </a:r>
                     </a:p>
                   </a:txBody>
                   <a:tcPr/>
@@ -7888,7 +8162,10 @@
                     <a:bodyPr/>
                     <a:lstStyle/>
                     <a:p>
-                      <a:endParaRPr lang="en-GB" sz="500" dirty="0"/>
+                      <a:r>
+                        <a:rPr lang="en-GB" sz="500" dirty="0"/>
+                        <a:t>-</a:t>
+                      </a:r>
                     </a:p>
                   </a:txBody>
                   <a:tcPr/>
@@ -7911,7 +8188,10 @@
                     <a:bodyPr/>
                     <a:lstStyle/>
                     <a:p>
-                      <a:endParaRPr lang="en-GB" sz="500" dirty="0"/>
+                      <a:r>
+                        <a:rPr lang="en-GB" sz="500" dirty="0"/>
+                        <a:t>-</a:t>
+                      </a:r>
                     </a:p>
                   </a:txBody>
                   <a:tcPr/>
@@ -7946,7 +8226,10 @@
                     <a:bodyPr/>
                     <a:lstStyle/>
                     <a:p>
-                      <a:endParaRPr lang="en-GB" sz="500" dirty="0"/>
+                      <a:r>
+                        <a:rPr lang="en-GB" sz="500" dirty="0"/>
+                        <a:t>-</a:t>
+                      </a:r>
                     </a:p>
                   </a:txBody>
                   <a:tcPr/>
@@ -7970,7 +8253,10 @@
                     <a:bodyPr/>
                     <a:lstStyle/>
                     <a:p>
-                      <a:endParaRPr lang="en-GB" sz="500" dirty="0"/>
+                      <a:r>
+                        <a:rPr lang="en-GB" sz="500" dirty="0"/>
+                        <a:t>-</a:t>
+                      </a:r>
                     </a:p>
                   </a:txBody>
                   <a:tcPr/>
@@ -8000,7 +8286,7 @@
           <p:nvPr>
             <p:extLst>
               <p:ext uri="{D42A27DB-BD31-4B8C-83A1-F6EECF244321}">
-                <p14:modId xmlns:p14="http://schemas.microsoft.com/office/powerpoint/2010/main" val="3500055739"/>
+                <p14:modId xmlns:p14="http://schemas.microsoft.com/office/powerpoint/2010/main" val="3468870977"/>
               </p:ext>
             </p:extLst>
           </p:nvPr>
@@ -8139,7 +8425,7 @@
                     <a:p>
                       <a:r>
                         <a:rPr lang="en-GB" sz="500" dirty="0"/>
-                        <a:t>10%</a:t>
+                        <a:t>-</a:t>
                       </a:r>
                     </a:p>
                   </a:txBody>
@@ -8187,7 +8473,7 @@
                     <a:p>
                       <a:r>
                         <a:rPr lang="en-GB" sz="500" dirty="0"/>
-                        <a:t>10%</a:t>
+                        <a:t>-</a:t>
                       </a:r>
                     </a:p>
                   </a:txBody>
@@ -8223,7 +8509,10 @@
                     <a:bodyPr/>
                     <a:lstStyle/>
                     <a:p>
-                      <a:endParaRPr lang="en-GB" sz="500" dirty="0"/>
+                      <a:r>
+                        <a:rPr lang="en-GB" sz="500" dirty="0"/>
+                        <a:t>-</a:t>
+                      </a:r>
                     </a:p>
                   </a:txBody>
                   <a:tcPr/>
@@ -8246,7 +8535,10 @@
                     <a:bodyPr/>
                     <a:lstStyle/>
                     <a:p>
-                      <a:endParaRPr lang="en-GB" sz="500" dirty="0"/>
+                      <a:r>
+                        <a:rPr lang="en-GB" sz="500" dirty="0"/>
+                        <a:t>-</a:t>
+                      </a:r>
                     </a:p>
                   </a:txBody>
                   <a:tcPr/>
@@ -8281,7 +8573,10 @@
                     <a:bodyPr/>
                     <a:lstStyle/>
                     <a:p>
-                      <a:endParaRPr lang="en-GB" sz="500" dirty="0"/>
+                      <a:r>
+                        <a:rPr lang="en-GB" sz="500" dirty="0"/>
+                        <a:t>-</a:t>
+                      </a:r>
                     </a:p>
                   </a:txBody>
                   <a:tcPr/>
@@ -8304,7 +8599,10 @@
                     <a:bodyPr/>
                     <a:lstStyle/>
                     <a:p>
-                      <a:endParaRPr lang="en-GB" sz="500" dirty="0"/>
+                      <a:r>
+                        <a:rPr lang="en-GB" sz="500" dirty="0"/>
+                        <a:t>-</a:t>
+                      </a:r>
                     </a:p>
                   </a:txBody>
                   <a:tcPr/>
@@ -8339,7 +8637,10 @@
                     <a:bodyPr/>
                     <a:lstStyle/>
                     <a:p>
-                      <a:endParaRPr lang="en-GB" sz="500" dirty="0"/>
+                      <a:r>
+                        <a:rPr lang="en-GB" sz="500" dirty="0"/>
+                        <a:t>-</a:t>
+                      </a:r>
                     </a:p>
                   </a:txBody>
                   <a:tcPr/>
@@ -8362,7 +8663,10 @@
                     <a:bodyPr/>
                     <a:lstStyle/>
                     <a:p>
-                      <a:endParaRPr lang="en-GB" sz="500" dirty="0"/>
+                      <a:r>
+                        <a:rPr lang="en-GB" sz="500" dirty="0"/>
+                        <a:t>-</a:t>
+                      </a:r>
                     </a:p>
                   </a:txBody>
                   <a:tcPr/>
@@ -8401,7 +8705,10 @@
                     <a:bodyPr/>
                     <a:lstStyle/>
                     <a:p>
-                      <a:endParaRPr lang="en-GB" sz="500" dirty="0"/>
+                      <a:r>
+                        <a:rPr lang="en-GB" sz="500" dirty="0"/>
+                        <a:t>-</a:t>
+                      </a:r>
                     </a:p>
                   </a:txBody>
                   <a:tcPr/>
@@ -8429,7 +8736,10 @@
                     <a:bodyPr/>
                     <a:lstStyle/>
                     <a:p>
-                      <a:endParaRPr lang="en-GB" sz="500" dirty="0"/>
+                      <a:r>
+                        <a:rPr lang="en-GB" sz="500" dirty="0"/>
+                        <a:t>-</a:t>
+                      </a:r>
                     </a:p>
                   </a:txBody>
                   <a:tcPr/>
@@ -8448,9 +8758,12 @@
                     <a:p>
                       <a:r>
                         <a:rPr lang="en-GB" sz="500" dirty="0" err="1"/>
-                        <a:t>Yasushi_Chimura</a:t>
-                      </a:r>
-                      <a:endParaRPr lang="en-GB" sz="500" dirty="0"/>
+                        <a:t>Taia</a:t>
+                      </a:r>
+                      <a:r>
+                        <a:rPr lang="en-GB" sz="500" dirty="0"/>
+                        <a:t> Balk</a:t>
+                      </a:r>
                     </a:p>
                   </a:txBody>
                   <a:tcPr marL="53946" marR="53946" marT="26973" marB="26973"/>
@@ -8460,7 +8773,10 @@
                     <a:bodyPr/>
                     <a:lstStyle/>
                     <a:p>
-                      <a:endParaRPr lang="en-GB" sz="500" dirty="0"/>
+                      <a:r>
+                        <a:rPr lang="en-GB" sz="500" dirty="0"/>
+                        <a:t>-</a:t>
+                      </a:r>
                     </a:p>
                   </a:txBody>
                   <a:tcPr/>
@@ -8500,7 +8816,10 @@
                     <a:bodyPr/>
                     <a:lstStyle/>
                     <a:p>
-                      <a:endParaRPr lang="en-GB" sz="500" dirty="0"/>
+                      <a:r>
+                        <a:rPr lang="en-GB" sz="500" dirty="0"/>
+                        <a:t>-</a:t>
+                      </a:r>
                     </a:p>
                   </a:txBody>
                   <a:tcPr/>
@@ -8535,7 +8854,10 @@
                     <a:bodyPr/>
                     <a:lstStyle/>
                     <a:p>
-                      <a:endParaRPr lang="en-GB" sz="500" dirty="0"/>
+                      <a:r>
+                        <a:rPr lang="en-GB" sz="500" dirty="0"/>
+                        <a:t>-</a:t>
+                      </a:r>
                     </a:p>
                   </a:txBody>
                   <a:tcPr/>
@@ -8558,7 +8880,10 @@
                     <a:bodyPr/>
                     <a:lstStyle/>
                     <a:p>
-                      <a:endParaRPr lang="en-GB" sz="500" dirty="0"/>
+                      <a:r>
+                        <a:rPr lang="en-GB" sz="500" dirty="0"/>
+                        <a:t>-</a:t>
+                      </a:r>
                     </a:p>
                   </a:txBody>
                   <a:tcPr/>
@@ -8597,7 +8922,10 @@
                     <a:bodyPr/>
                     <a:lstStyle/>
                     <a:p>
-                      <a:endParaRPr lang="en-GB" sz="500" dirty="0"/>
+                      <a:r>
+                        <a:rPr lang="en-GB" sz="500" dirty="0"/>
+                        <a:t>-</a:t>
+                      </a:r>
                     </a:p>
                   </a:txBody>
                   <a:tcPr/>
@@ -8620,7 +8948,10 @@
                     <a:bodyPr/>
                     <a:lstStyle/>
                     <a:p>
-                      <a:endParaRPr lang="en-GB" sz="500" dirty="0"/>
+                      <a:r>
+                        <a:rPr lang="en-GB" sz="500" dirty="0"/>
+                        <a:t>-</a:t>
+                      </a:r>
                     </a:p>
                   </a:txBody>
                   <a:tcPr/>
@@ -8654,7 +8985,10 @@
                     <a:bodyPr/>
                     <a:lstStyle/>
                     <a:p>
-                      <a:endParaRPr lang="en-GB" sz="500" dirty="0"/>
+                      <a:r>
+                        <a:rPr lang="en-GB" sz="500" dirty="0"/>
+                        <a:t>-</a:t>
+                      </a:r>
                     </a:p>
                   </a:txBody>
                   <a:tcPr/>
@@ -8677,7 +9011,10 @@
                     <a:bodyPr/>
                     <a:lstStyle/>
                     <a:p>
-                      <a:endParaRPr lang="en-GB" sz="500" dirty="0"/>
+                      <a:r>
+                        <a:rPr lang="en-GB" sz="500" dirty="0"/>
+                        <a:t>-</a:t>
+                      </a:r>
                     </a:p>
                   </a:txBody>
                   <a:tcPr/>
@@ -8695,23 +9032,22 @@
                     <a:lstStyle/>
                     <a:p>
                       <a:r>
-                        <a:rPr lang="en-GB" sz="500" dirty="0" err="1"/>
-                        <a:t>Tayyeb</a:t>
-                      </a:r>
-                      <a:r>
-                        <a:rPr lang="en-GB" sz="500" dirty="0"/>
-                        <a:t> Abdel Rahim</a:t>
-                      </a:r>
-                    </a:p>
-                  </a:txBody>
-                  <a:tcPr/>
-                </a:tc>
-                <a:tc>
-                  <a:txBody>
-                    <a:bodyPr/>
-                    <a:lstStyle/>
-                    <a:p>
-                      <a:endParaRPr lang="en-GB" sz="500" dirty="0"/>
+                        <a:rPr lang="en-GB" sz="500" dirty="0"/>
+                        <a:t>Tom Harkin</a:t>
+                      </a:r>
+                    </a:p>
+                  </a:txBody>
+                  <a:tcPr/>
+                </a:tc>
+                <a:tc>
+                  <a:txBody>
+                    <a:bodyPr/>
+                    <a:lstStyle/>
+                    <a:p>
+                      <a:r>
+                        <a:rPr lang="en-GB" sz="500" dirty="0"/>
+                        <a:t>-</a:t>
+                      </a:r>
                     </a:p>
                   </a:txBody>
                   <a:tcPr/>
@@ -8734,7 +9070,10 @@
                     <a:bodyPr/>
                     <a:lstStyle/>
                     <a:p>
-                      <a:endParaRPr lang="en-GB" sz="500" dirty="0"/>
+                      <a:r>
+                        <a:rPr lang="en-GB" sz="500" dirty="0"/>
+                        <a:t>-</a:t>
+                      </a:r>
                     </a:p>
                   </a:txBody>
                   <a:tcPr/>
@@ -8776,7 +9115,10 @@
                     <a:bodyPr/>
                     <a:lstStyle/>
                     <a:p>
-                      <a:endParaRPr lang="en-GB" sz="500" dirty="0"/>
+                      <a:r>
+                        <a:rPr lang="en-GB" sz="500" dirty="0"/>
+                        <a:t>-</a:t>
+                      </a:r>
                     </a:p>
                   </a:txBody>
                   <a:tcPr/>
@@ -8821,7 +9163,10 @@
                     <a:bodyPr/>
                     <a:lstStyle/>
                     <a:p>
-                      <a:endParaRPr lang="en-GB" sz="500" dirty="0"/>
+                      <a:r>
+                        <a:rPr lang="en-GB" sz="500" dirty="0"/>
+                        <a:t>-</a:t>
+                      </a:r>
                     </a:p>
                   </a:txBody>
                   <a:tcPr/>
@@ -8856,7 +9201,10 @@
                     <a:bodyPr/>
                     <a:lstStyle/>
                     <a:p>
-                      <a:endParaRPr lang="en-GB" sz="500" dirty="0"/>
+                      <a:r>
+                        <a:rPr lang="en-GB" sz="500" dirty="0"/>
+                        <a:t>-</a:t>
+                      </a:r>
                     </a:p>
                   </a:txBody>
                   <a:tcPr/>
@@ -8884,7 +9232,10 @@
                     <a:bodyPr/>
                     <a:lstStyle/>
                     <a:p>
-                      <a:endParaRPr lang="en-GB" sz="500" dirty="0"/>
+                      <a:r>
+                        <a:rPr lang="en-GB" sz="500" dirty="0"/>
+                        <a:t>-</a:t>
+                      </a:r>
                     </a:p>
                   </a:txBody>
                   <a:tcPr/>
@@ -8919,7 +9270,10 @@
                     <a:bodyPr/>
                     <a:lstStyle/>
                     <a:p>
-                      <a:endParaRPr lang="en-GB" sz="500" dirty="0"/>
+                      <a:r>
+                        <a:rPr lang="en-GB" sz="500" dirty="0"/>
+                        <a:t>-</a:t>
+                      </a:r>
                     </a:p>
                   </a:txBody>
                   <a:tcPr/>
@@ -8942,7 +9296,10 @@
                     <a:bodyPr/>
                     <a:lstStyle/>
                     <a:p>
-                      <a:endParaRPr lang="en-GB" sz="500" dirty="0"/>
+                      <a:r>
+                        <a:rPr lang="en-GB" sz="500" dirty="0"/>
+                        <a:t>-</a:t>
+                      </a:r>
                     </a:p>
                   </a:txBody>
                   <a:tcPr/>
@@ -8972,7 +9329,10 @@
                     <a:bodyPr/>
                     <a:lstStyle/>
                     <a:p>
-                      <a:endParaRPr lang="en-GB" sz="500" dirty="0"/>
+                      <a:r>
+                        <a:rPr lang="en-GB" sz="500" dirty="0"/>
+                        <a:t>-</a:t>
+                      </a:r>
                     </a:p>
                   </a:txBody>
                   <a:tcPr/>
@@ -9000,7 +9360,10 @@
                     <a:bodyPr/>
                     <a:lstStyle/>
                     <a:p>
-                      <a:endParaRPr lang="en-GB" sz="500" dirty="0"/>
+                      <a:r>
+                        <a:rPr lang="en-GB" sz="500" dirty="0"/>
+                        <a:t>-</a:t>
+                      </a:r>
                     </a:p>
                   </a:txBody>
                   <a:tcPr/>
@@ -9030,7 +9393,10 @@
                     <a:bodyPr/>
                     <a:lstStyle/>
                     <a:p>
-                      <a:endParaRPr lang="en-GB" sz="500" dirty="0"/>
+                      <a:r>
+                        <a:rPr lang="en-GB" sz="500" dirty="0"/>
+                        <a:t>-</a:t>
+                      </a:r>
                     </a:p>
                   </a:txBody>
                   <a:tcPr/>
@@ -9053,7 +9419,10 @@
                     <a:bodyPr/>
                     <a:lstStyle/>
                     <a:p>
-                      <a:endParaRPr lang="en-GB" sz="500" dirty="0"/>
+                      <a:r>
+                        <a:rPr lang="en-GB" sz="500" dirty="0"/>
+                        <a:t>-</a:t>
+                      </a:r>
                     </a:p>
                   </a:txBody>
                   <a:tcPr/>
@@ -9083,7 +9452,10 @@
                     <a:bodyPr/>
                     <a:lstStyle/>
                     <a:p>
-                      <a:endParaRPr lang="en-GB" sz="500" dirty="0"/>
+                      <a:r>
+                        <a:rPr lang="en-GB" sz="500" dirty="0"/>
+                        <a:t>-</a:t>
+                      </a:r>
                     </a:p>
                   </a:txBody>
                   <a:tcPr/>
@@ -9106,7 +9478,10 @@
                     <a:bodyPr/>
                     <a:lstStyle/>
                     <a:p>
-                      <a:endParaRPr lang="en-GB" sz="500" dirty="0"/>
+                      <a:r>
+                        <a:rPr lang="en-GB" sz="500" dirty="0"/>
+                        <a:t>-</a:t>
+                      </a:r>
                     </a:p>
                   </a:txBody>
                   <a:tcPr/>
@@ -9136,7 +9511,10 @@
                     <a:bodyPr/>
                     <a:lstStyle/>
                     <a:p>
-                      <a:endParaRPr lang="en-GB" sz="500" dirty="0"/>
+                      <a:r>
+                        <a:rPr lang="en-GB" sz="500" dirty="0"/>
+                        <a:t>-</a:t>
+                      </a:r>
                     </a:p>
                   </a:txBody>
                   <a:tcPr/>
@@ -9159,7 +9537,10 @@
                     <a:bodyPr/>
                     <a:lstStyle/>
                     <a:p>
-                      <a:endParaRPr lang="en-GB" sz="500" dirty="0"/>
+                      <a:r>
+                        <a:rPr lang="en-GB" sz="500" dirty="0"/>
+                        <a:t>-</a:t>
+                      </a:r>
                     </a:p>
                   </a:txBody>
                   <a:tcPr/>
@@ -9189,7 +9570,10 @@
                     <a:bodyPr/>
                     <a:lstStyle/>
                     <a:p>
-                      <a:endParaRPr lang="en-GB" sz="500" dirty="0"/>
+                      <a:r>
+                        <a:rPr lang="en-GB" sz="500" dirty="0"/>
+                        <a:t>-</a:t>
+                      </a:r>
                     </a:p>
                   </a:txBody>
                   <a:tcPr/>
@@ -9212,7 +9596,10 @@
                     <a:bodyPr/>
                     <a:lstStyle/>
                     <a:p>
-                      <a:endParaRPr lang="en-GB" sz="500" dirty="0"/>
+                      <a:r>
+                        <a:rPr lang="en-GB" sz="500" dirty="0"/>
+                        <a:t>-</a:t>
+                      </a:r>
                     </a:p>
                   </a:txBody>
                   <a:tcPr/>
@@ -9247,7 +9634,10 @@
                     <a:bodyPr/>
                     <a:lstStyle/>
                     <a:p>
-                      <a:endParaRPr lang="en-GB" sz="500" dirty="0"/>
+                      <a:r>
+                        <a:rPr lang="en-GB" sz="500" dirty="0"/>
+                        <a:t>-</a:t>
+                      </a:r>
                     </a:p>
                   </a:txBody>
                   <a:tcPr/>
@@ -9270,7 +9660,10 @@
                     <a:bodyPr/>
                     <a:lstStyle/>
                     <a:p>
-                      <a:endParaRPr lang="en-GB" sz="500" dirty="0"/>
+                      <a:r>
+                        <a:rPr lang="en-GB" sz="500" dirty="0"/>
+                        <a:t>-</a:t>
+                      </a:r>
                     </a:p>
                   </a:txBody>
                   <a:tcPr/>
@@ -9301,7 +9694,10 @@
                     <a:bodyPr/>
                     <a:lstStyle/>
                     <a:p>
-                      <a:endParaRPr lang="en-GB" sz="500" dirty="0"/>
+                      <a:r>
+                        <a:rPr lang="en-GB" sz="500" dirty="0"/>
+                        <a:t>-</a:t>
+                      </a:r>
                     </a:p>
                   </a:txBody>
                   <a:tcPr/>
@@ -9324,7 +9720,10 @@
                     <a:bodyPr/>
                     <a:lstStyle/>
                     <a:p>
-                      <a:endParaRPr lang="en-GB" sz="500" dirty="0"/>
+                      <a:r>
+                        <a:rPr lang="en-GB" sz="500" dirty="0"/>
+                        <a:t>-</a:t>
+                      </a:r>
                     </a:p>
                   </a:txBody>
                   <a:tcPr/>
@@ -9354,7 +9753,7 @@
           <p:nvPr>
             <p:extLst>
               <p:ext uri="{D42A27DB-BD31-4B8C-83A1-F6EECF244321}">
-                <p14:modId xmlns:p14="http://schemas.microsoft.com/office/powerpoint/2010/main" val="2652716501"/>
+                <p14:modId xmlns:p14="http://schemas.microsoft.com/office/powerpoint/2010/main" val="2082692658"/>
               </p:ext>
             </p:extLst>
           </p:nvPr>
@@ -9493,7 +9892,7 @@
                     <a:p>
                       <a:r>
                         <a:rPr lang="en-GB" sz="500" dirty="0"/>
-                        <a:t>10%</a:t>
+                        <a:t>-</a:t>
                       </a:r>
                     </a:p>
                   </a:txBody>
@@ -9541,7 +9940,7 @@
                     <a:p>
                       <a:r>
                         <a:rPr lang="en-GB" sz="500" dirty="0"/>
-                        <a:t>10%</a:t>
+                        <a:t>-</a:t>
                       </a:r>
                     </a:p>
                   </a:txBody>
@@ -9572,7 +9971,10 @@
                     <a:bodyPr/>
                     <a:lstStyle/>
                     <a:p>
-                      <a:endParaRPr lang="en-GB" sz="500" dirty="0"/>
+                      <a:r>
+                        <a:rPr lang="en-GB" sz="500" dirty="0"/>
+                        <a:t>-</a:t>
+                      </a:r>
                     </a:p>
                   </a:txBody>
                   <a:tcPr/>
@@ -9595,7 +9997,10 @@
                     <a:bodyPr/>
                     <a:lstStyle/>
                     <a:p>
-                      <a:endParaRPr lang="en-GB" sz="500"/>
+                      <a:r>
+                        <a:rPr lang="en-GB" sz="500" dirty="0"/>
+                        <a:t>-</a:t>
+                      </a:r>
                     </a:p>
                   </a:txBody>
                   <a:tcPr/>
@@ -9625,7 +10030,10 @@
                     <a:bodyPr/>
                     <a:lstStyle/>
                     <a:p>
-                      <a:endParaRPr lang="en-GB" sz="500" dirty="0"/>
+                      <a:r>
+                        <a:rPr lang="en-GB" sz="500" dirty="0"/>
+                        <a:t>-</a:t>
+                      </a:r>
                     </a:p>
                   </a:txBody>
                   <a:tcPr/>
@@ -9648,7 +10056,10 @@
                     <a:bodyPr/>
                     <a:lstStyle/>
                     <a:p>
-                      <a:endParaRPr lang="en-GB" sz="500"/>
+                      <a:r>
+                        <a:rPr lang="en-GB" sz="500" dirty="0"/>
+                        <a:t>-</a:t>
+                      </a:r>
                     </a:p>
                   </a:txBody>
                   <a:tcPr/>
@@ -9683,7 +10094,10 @@
                     <a:bodyPr/>
                     <a:lstStyle/>
                     <a:p>
-                      <a:endParaRPr lang="en-GB" sz="500" dirty="0"/>
+                      <a:r>
+                        <a:rPr lang="en-GB" sz="500" dirty="0"/>
+                        <a:t>-</a:t>
+                      </a:r>
                     </a:p>
                   </a:txBody>
                   <a:tcPr/>
@@ -9706,7 +10120,10 @@
                     <a:bodyPr/>
                     <a:lstStyle/>
                     <a:p>
-                      <a:endParaRPr lang="en-GB" sz="500"/>
+                      <a:r>
+                        <a:rPr lang="en-GB" sz="500" dirty="0"/>
+                        <a:t>-</a:t>
+                      </a:r>
                     </a:p>
                   </a:txBody>
                   <a:tcPr/>
@@ -9740,7 +10157,10 @@
                     <a:bodyPr/>
                     <a:lstStyle/>
                     <a:p>
-                      <a:endParaRPr lang="en-GB" sz="500" dirty="0"/>
+                      <a:r>
+                        <a:rPr lang="en-GB" sz="500" dirty="0"/>
+                        <a:t>-</a:t>
+                      </a:r>
                     </a:p>
                   </a:txBody>
                   <a:tcPr/>
@@ -9768,7 +10188,10 @@
                     <a:bodyPr/>
                     <a:lstStyle/>
                     <a:p>
-                      <a:endParaRPr lang="en-GB" sz="500" dirty="0"/>
+                      <a:r>
+                        <a:rPr lang="en-GB" sz="500" dirty="0"/>
+                        <a:t>-</a:t>
+                      </a:r>
                     </a:p>
                   </a:txBody>
                   <a:tcPr/>
@@ -9799,7 +10222,10 @@
                     <a:bodyPr/>
                     <a:lstStyle/>
                     <a:p>
-                      <a:endParaRPr lang="en-GB" sz="500" dirty="0"/>
+                      <a:r>
+                        <a:rPr lang="en-GB" sz="500" dirty="0"/>
+                        <a:t>-</a:t>
+                      </a:r>
                     </a:p>
                   </a:txBody>
                   <a:tcPr/>
@@ -9839,7 +10265,10 @@
                     <a:bodyPr/>
                     <a:lstStyle/>
                     <a:p>
-                      <a:endParaRPr lang="en-GB" sz="500" dirty="0"/>
+                      <a:r>
+                        <a:rPr lang="en-GB" sz="500" dirty="0"/>
+                        <a:t>-</a:t>
+                      </a:r>
                     </a:p>
                   </a:txBody>
                   <a:tcPr/>
@@ -9874,7 +10303,10 @@
                     <a:bodyPr/>
                     <a:lstStyle/>
                     <a:p>
-                      <a:endParaRPr lang="en-GB" sz="500" dirty="0"/>
+                      <a:r>
+                        <a:rPr lang="en-GB" sz="500" dirty="0"/>
+                        <a:t>-</a:t>
+                      </a:r>
                     </a:p>
                   </a:txBody>
                   <a:tcPr/>
@@ -9897,7 +10329,10 @@
                     <a:bodyPr/>
                     <a:lstStyle/>
                     <a:p>
-                      <a:endParaRPr lang="en-GB" sz="500" dirty="0"/>
+                      <a:r>
+                        <a:rPr lang="en-GB" sz="500" dirty="0"/>
+                        <a:t>-</a:t>
+                      </a:r>
                     </a:p>
                   </a:txBody>
                   <a:tcPr/>
@@ -9927,7 +10362,10 @@
                     <a:bodyPr/>
                     <a:lstStyle/>
                     <a:p>
-                      <a:endParaRPr lang="en-GB" sz="500" dirty="0"/>
+                      <a:r>
+                        <a:rPr lang="en-GB" sz="500" dirty="0"/>
+                        <a:t>-</a:t>
+                      </a:r>
                     </a:p>
                   </a:txBody>
                   <a:tcPr/>
@@ -9950,7 +10388,10 @@
                     <a:bodyPr/>
                     <a:lstStyle/>
                     <a:p>
-                      <a:endParaRPr lang="en-GB" sz="500" dirty="0"/>
+                      <a:r>
+                        <a:rPr lang="en-GB" sz="500" dirty="0"/>
+                        <a:t>-</a:t>
+                      </a:r>
                     </a:p>
                   </a:txBody>
                   <a:tcPr/>
@@ -9980,7 +10421,10 @@
                     <a:bodyPr/>
                     <a:lstStyle/>
                     <a:p>
-                      <a:endParaRPr lang="en-GB" sz="500" dirty="0"/>
+                      <a:r>
+                        <a:rPr lang="en-GB" sz="500" dirty="0"/>
+                        <a:t>-</a:t>
+                      </a:r>
                     </a:p>
                   </a:txBody>
                   <a:tcPr/>
@@ -10003,7 +10447,10 @@
                     <a:bodyPr/>
                     <a:lstStyle/>
                     <a:p>
-                      <a:endParaRPr lang="en-GB" sz="500" dirty="0"/>
+                      <a:r>
+                        <a:rPr lang="en-GB" sz="500" dirty="0"/>
+                        <a:t>-</a:t>
+                      </a:r>
                     </a:p>
                   </a:txBody>
                   <a:tcPr/>
@@ -10033,7 +10480,10 @@
                     <a:bodyPr/>
                     <a:lstStyle/>
                     <a:p>
-                      <a:endParaRPr lang="en-GB" sz="500" dirty="0"/>
+                      <a:r>
+                        <a:rPr lang="en-GB" sz="500" dirty="0"/>
+                        <a:t>-</a:t>
+                      </a:r>
                     </a:p>
                   </a:txBody>
                   <a:tcPr/>
@@ -10056,7 +10506,10 @@
                     <a:bodyPr/>
                     <a:lstStyle/>
                     <a:p>
-                      <a:endParaRPr lang="en-GB" sz="500"/>
+                      <a:r>
+                        <a:rPr lang="en-GB" sz="500" dirty="0"/>
+                        <a:t>-</a:t>
+                      </a:r>
                     </a:p>
                   </a:txBody>
                   <a:tcPr/>
@@ -10090,7 +10543,10 @@
                     <a:bodyPr/>
                     <a:lstStyle/>
                     <a:p>
-                      <a:endParaRPr lang="en-GB" sz="500" dirty="0"/>
+                      <a:r>
+                        <a:rPr lang="en-GB" sz="500" dirty="0"/>
+                        <a:t>-</a:t>
+                      </a:r>
                     </a:p>
                   </a:txBody>
                   <a:tcPr/>
@@ -10135,7 +10591,10 @@
                     <a:bodyPr/>
                     <a:lstStyle/>
                     <a:p>
-                      <a:endParaRPr lang="en-GB" sz="500" dirty="0"/>
+                      <a:r>
+                        <a:rPr lang="en-GB" sz="500" dirty="0"/>
+                        <a:t>-</a:t>
+                      </a:r>
                     </a:p>
                   </a:txBody>
                   <a:tcPr/>
@@ -10165,7 +10624,10 @@
                     <a:bodyPr/>
                     <a:lstStyle/>
                     <a:p>
-                      <a:endParaRPr lang="en-GB" sz="500" dirty="0"/>
+                      <a:r>
+                        <a:rPr lang="en-GB" sz="500" dirty="0"/>
+                        <a:t>-</a:t>
+                      </a:r>
                     </a:p>
                   </a:txBody>
                   <a:tcPr/>
@@ -10193,7 +10655,10 @@
                     <a:bodyPr/>
                     <a:lstStyle/>
                     <a:p>
-                      <a:endParaRPr lang="en-GB" sz="500"/>
+                      <a:r>
+                        <a:rPr lang="en-GB" sz="500" dirty="0"/>
+                        <a:t>-</a:t>
+                      </a:r>
                     </a:p>
                   </a:txBody>
                   <a:tcPr/>
@@ -10223,7 +10688,10 @@
                     <a:bodyPr/>
                     <a:lstStyle/>
                     <a:p>
-                      <a:endParaRPr lang="en-GB" sz="500" dirty="0"/>
+                      <a:r>
+                        <a:rPr lang="en-GB" sz="500" dirty="0"/>
+                        <a:t>-</a:t>
+                      </a:r>
                     </a:p>
                   </a:txBody>
                   <a:tcPr/>
@@ -10246,7 +10714,10 @@
                     <a:bodyPr/>
                     <a:lstStyle/>
                     <a:p>
-                      <a:endParaRPr lang="en-GB" sz="500" dirty="0"/>
+                      <a:r>
+                        <a:rPr lang="en-GB" sz="500" dirty="0"/>
+                        <a:t>-</a:t>
+                      </a:r>
                     </a:p>
                   </a:txBody>
                   <a:tcPr/>
@@ -10276,7 +10747,10 @@
                     <a:bodyPr/>
                     <a:lstStyle/>
                     <a:p>
-                      <a:endParaRPr lang="en-GB" sz="500" dirty="0"/>
+                      <a:r>
+                        <a:rPr lang="en-GB" sz="500" dirty="0"/>
+                        <a:t>-</a:t>
+                      </a:r>
                     </a:p>
                   </a:txBody>
                   <a:tcPr/>
@@ -10304,7 +10778,10 @@
                     <a:bodyPr/>
                     <a:lstStyle/>
                     <a:p>
-                      <a:endParaRPr lang="en-GB" sz="500" dirty="0"/>
+                      <a:r>
+                        <a:rPr lang="en-GB" sz="500" dirty="0"/>
+                        <a:t>-</a:t>
+                      </a:r>
                     </a:p>
                   </a:txBody>
                   <a:tcPr/>
@@ -10339,7 +10816,10 @@
                     <a:bodyPr/>
                     <a:lstStyle/>
                     <a:p>
-                      <a:endParaRPr lang="en-GB" sz="500" dirty="0"/>
+                      <a:r>
+                        <a:rPr lang="en-GB" sz="500" dirty="0"/>
+                        <a:t>-</a:t>
+                      </a:r>
                     </a:p>
                   </a:txBody>
                   <a:tcPr/>
@@ -10362,7 +10842,10 @@
                     <a:bodyPr/>
                     <a:lstStyle/>
                     <a:p>
-                      <a:endParaRPr lang="en-GB" sz="500" dirty="0"/>
+                      <a:r>
+                        <a:rPr lang="en-GB" sz="500" dirty="0"/>
+                        <a:t>-</a:t>
+                      </a:r>
                     </a:p>
                   </a:txBody>
                   <a:tcPr/>
@@ -10392,7 +10875,10 @@
                     <a:bodyPr/>
                     <a:lstStyle/>
                     <a:p>
-                      <a:endParaRPr lang="en-GB" sz="500" dirty="0"/>
+                      <a:r>
+                        <a:rPr lang="en-GB" sz="500" dirty="0"/>
+                        <a:t>-</a:t>
+                      </a:r>
                     </a:p>
                   </a:txBody>
                   <a:tcPr/>
@@ -10415,7 +10901,10 @@
                     <a:bodyPr/>
                     <a:lstStyle/>
                     <a:p>
-                      <a:endParaRPr lang="en-GB" sz="500" dirty="0"/>
+                      <a:r>
+                        <a:rPr lang="en-GB" sz="500" dirty="0"/>
+                        <a:t>-</a:t>
+                      </a:r>
                     </a:p>
                   </a:txBody>
                   <a:tcPr/>
@@ -10445,7 +10934,10 @@
                     <a:bodyPr/>
                     <a:lstStyle/>
                     <a:p>
-                      <a:endParaRPr lang="en-GB" sz="500" dirty="0"/>
+                      <a:r>
+                        <a:rPr lang="en-GB" sz="500" dirty="0"/>
+                        <a:t>-</a:t>
+                      </a:r>
                     </a:p>
                   </a:txBody>
                   <a:tcPr/>
@@ -10468,7 +10960,10 @@
                     <a:bodyPr/>
                     <a:lstStyle/>
                     <a:p>
-                      <a:endParaRPr lang="en-GB" sz="500" dirty="0"/>
+                      <a:r>
+                        <a:rPr lang="en-GB" sz="500" dirty="0"/>
+                        <a:t>-</a:t>
+                      </a:r>
                     </a:p>
                   </a:txBody>
                   <a:tcPr/>
@@ -10498,7 +10993,10 @@
                     <a:bodyPr/>
                     <a:lstStyle/>
                     <a:p>
-                      <a:endParaRPr lang="en-GB" sz="500" dirty="0"/>
+                      <a:r>
+                        <a:rPr lang="en-GB" sz="500" dirty="0"/>
+                        <a:t>-</a:t>
+                      </a:r>
                     </a:p>
                   </a:txBody>
                   <a:tcPr/>
@@ -10521,7 +11019,10 @@
                     <a:bodyPr/>
                     <a:lstStyle/>
                     <a:p>
-                      <a:endParaRPr lang="en-GB" sz="500" dirty="0"/>
+                      <a:r>
+                        <a:rPr lang="en-GB" sz="500" dirty="0"/>
+                        <a:t>-</a:t>
+                      </a:r>
                     </a:p>
                   </a:txBody>
                   <a:tcPr/>
@@ -10551,7 +11052,10 @@
                     <a:bodyPr/>
                     <a:lstStyle/>
                     <a:p>
-                      <a:endParaRPr lang="en-GB" sz="500" dirty="0"/>
+                      <a:r>
+                        <a:rPr lang="en-GB" sz="500" dirty="0"/>
+                        <a:t>-</a:t>
+                      </a:r>
                     </a:p>
                   </a:txBody>
                   <a:tcPr/>
@@ -10574,7 +11078,10 @@
                     <a:bodyPr/>
                     <a:lstStyle/>
                     <a:p>
-                      <a:endParaRPr lang="en-GB" sz="500" dirty="0"/>
+                      <a:r>
+                        <a:rPr lang="en-GB" sz="500" dirty="0"/>
+                        <a:t>-</a:t>
+                      </a:r>
                     </a:p>
                   </a:txBody>
                   <a:tcPr/>
@@ -10604,7 +11111,10 @@
                     <a:bodyPr/>
                     <a:lstStyle/>
                     <a:p>
-                      <a:endParaRPr lang="en-GB" sz="500" dirty="0"/>
+                      <a:r>
+                        <a:rPr lang="en-GB" sz="500" dirty="0"/>
+                        <a:t>-</a:t>
+                      </a:r>
                     </a:p>
                   </a:txBody>
                   <a:tcPr/>
@@ -10627,7 +11137,10 @@
                     <a:bodyPr/>
                     <a:lstStyle/>
                     <a:p>
-                      <a:endParaRPr lang="en-GB" sz="500" dirty="0"/>
+                      <a:r>
+                        <a:rPr lang="en-GB" sz="500" dirty="0"/>
+                        <a:t>-</a:t>
+                      </a:r>
                     </a:p>
                   </a:txBody>
                   <a:tcPr/>
@@ -10657,14 +11170,14 @@
           <p:nvPr>
             <p:extLst>
               <p:ext uri="{D42A27DB-BD31-4B8C-83A1-F6EECF244321}">
-                <p14:modId xmlns:p14="http://schemas.microsoft.com/office/powerpoint/2010/main" val="130974937"/>
+                <p14:modId xmlns:p14="http://schemas.microsoft.com/office/powerpoint/2010/main" val="3838597414"/>
               </p:ext>
             </p:extLst>
           </p:nvPr>
         </p:nvGraphicFramePr>
         <p:xfrm>
           <a:off x="9514754" y="1549845"/>
-          <a:ext cx="2288223" cy="3783398"/>
+          <a:ext cx="2288223" cy="4119513"/>
         </p:xfrm>
         <a:graphic>
           <a:graphicData uri="http://schemas.openxmlformats.org/drawingml/2006/table">
@@ -10796,7 +11309,7 @@
                     <a:p>
                       <a:r>
                         <a:rPr lang="en-GB" sz="500" dirty="0"/>
-                        <a:t>10%</a:t>
+                        <a:t>-</a:t>
                       </a:r>
                     </a:p>
                   </a:txBody>
@@ -10844,7 +11357,7 @@
                     <a:p>
                       <a:r>
                         <a:rPr lang="en-GB" sz="500" dirty="0"/>
-                        <a:t>10%</a:t>
+                        <a:t>-</a:t>
                       </a:r>
                     </a:p>
                   </a:txBody>
@@ -10875,7 +11388,10 @@
                     <a:bodyPr/>
                     <a:lstStyle/>
                     <a:p>
-                      <a:endParaRPr lang="en-GB" sz="500" dirty="0"/>
+                      <a:r>
+                        <a:rPr lang="en-GB" sz="500" dirty="0"/>
+                        <a:t>-</a:t>
+                      </a:r>
                     </a:p>
                   </a:txBody>
                   <a:tcPr/>
@@ -10898,7 +11414,10 @@
                     <a:bodyPr/>
                     <a:lstStyle/>
                     <a:p>
-                      <a:endParaRPr lang="en-GB" sz="500"/>
+                      <a:r>
+                        <a:rPr lang="en-GB" sz="500" dirty="0"/>
+                        <a:t>-</a:t>
+                      </a:r>
                     </a:p>
                   </a:txBody>
                   <a:tcPr/>
@@ -10916,20 +11435,22 @@
                     <a:lstStyle/>
                     <a:p>
                       <a:r>
-                        <a:rPr lang="en-GB" sz="500" dirty="0" err="1"/>
-                        <a:t>Tony_Fernandes</a:t>
-                      </a:r>
-                      <a:endParaRPr lang="en-GB" sz="500" dirty="0"/>
-                    </a:p>
-                  </a:txBody>
-                  <a:tcPr/>
-                </a:tc>
-                <a:tc>
-                  <a:txBody>
-                    <a:bodyPr/>
-                    <a:lstStyle/>
-                    <a:p>
-                      <a:endParaRPr lang="en-GB" sz="500" dirty="0"/>
+                        <a:rPr lang="en-GB" sz="500" dirty="0"/>
+                        <a:t>Tony Fernandes</a:t>
+                      </a:r>
+                    </a:p>
+                  </a:txBody>
+                  <a:tcPr/>
+                </a:tc>
+                <a:tc>
+                  <a:txBody>
+                    <a:bodyPr/>
+                    <a:lstStyle/>
+                    <a:p>
+                      <a:r>
+                        <a:rPr lang="en-GB" sz="500" dirty="0"/>
+                        <a:t>-</a:t>
+                      </a:r>
                     </a:p>
                   </a:txBody>
                   <a:tcPr/>
@@ -10952,7 +11473,10 @@
                     <a:bodyPr/>
                     <a:lstStyle/>
                     <a:p>
-                      <a:endParaRPr lang="en-GB" sz="500"/>
+                      <a:r>
+                        <a:rPr lang="en-GB" sz="500" dirty="0"/>
+                        <a:t>-</a:t>
+                      </a:r>
                     </a:p>
                   </a:txBody>
                   <a:tcPr/>
@@ -10982,7 +11506,10 @@
                     <a:bodyPr/>
                     <a:lstStyle/>
                     <a:p>
-                      <a:endParaRPr lang="en-GB" sz="500" dirty="0"/>
+                      <a:r>
+                        <a:rPr lang="en-GB" sz="500" dirty="0"/>
+                        <a:t>-</a:t>
+                      </a:r>
                     </a:p>
                   </a:txBody>
                   <a:tcPr/>
@@ -11005,7 +11532,10 @@
                     <a:bodyPr/>
                     <a:lstStyle/>
                     <a:p>
-                      <a:endParaRPr lang="en-GB" sz="500"/>
+                      <a:r>
+                        <a:rPr lang="en-GB" sz="500" dirty="0"/>
+                        <a:t>-</a:t>
+                      </a:r>
                     </a:p>
                   </a:txBody>
                   <a:tcPr/>
@@ -11035,7 +11565,10 @@
                     <a:bodyPr/>
                     <a:lstStyle/>
                     <a:p>
-                      <a:endParaRPr lang="en-GB" sz="500" dirty="0"/>
+                      <a:r>
+                        <a:rPr lang="en-GB" sz="500" dirty="0"/>
+                        <a:t>-</a:t>
+                      </a:r>
                     </a:p>
                   </a:txBody>
                   <a:tcPr/>
@@ -11063,7 +11596,10 @@
                     <a:bodyPr/>
                     <a:lstStyle/>
                     <a:p>
-                      <a:endParaRPr lang="en-GB" sz="500" dirty="0"/>
+                      <a:r>
+                        <a:rPr lang="en-GB" sz="500" dirty="0"/>
+                        <a:t>-</a:t>
+                      </a:r>
                     </a:p>
                   </a:txBody>
                   <a:tcPr/>
@@ -11093,7 +11629,10 @@
                     <a:bodyPr/>
                     <a:lstStyle/>
                     <a:p>
-                      <a:endParaRPr lang="en-GB" sz="500" dirty="0"/>
+                      <a:r>
+                        <a:rPr lang="en-GB" sz="500" dirty="0"/>
+                        <a:t>-</a:t>
+                      </a:r>
                     </a:p>
                   </a:txBody>
                   <a:tcPr/>
@@ -11133,7 +11672,10 @@
                     <a:bodyPr/>
                     <a:lstStyle/>
                     <a:p>
-                      <a:endParaRPr lang="en-GB" sz="500" dirty="0"/>
+                      <a:r>
+                        <a:rPr lang="en-GB" sz="500" dirty="0"/>
+                        <a:t>-</a:t>
+                      </a:r>
                     </a:p>
                   </a:txBody>
                   <a:tcPr/>
@@ -11150,12 +11692,15 @@
                     <a:bodyPr/>
                     <a:lstStyle/>
                     <a:p>
-                      <a:endParaRPr lang="en-GB" sz="500" dirty="0"/>
+                      <a:r>
+                        <a:rPr lang="en-GB" sz="500" dirty="0"/>
+                        <a:t>Taha Yassin Ramadan</a:t>
+                      </a:r>
                     </a:p>
                   </a:txBody>
                   <a:tcPr>
                     <a:solidFill>
-                      <a:schemeClr val="tx1"/>
+                      <a:srgbClr val="CFD5EA"/>
                     </a:solidFill>
                   </a:tcPr>
                 </a:tc>
@@ -11164,7 +11709,14 @@
                     <a:bodyPr/>
                     <a:lstStyle/>
                     <a:p>
-                      <a:endParaRPr lang="en-GB" sz="500" dirty="0"/>
+                      <a:r>
+                        <a:rPr lang="en-GB" sz="500" dirty="0">
+                          <a:solidFill>
+                            <a:srgbClr val="A1A4AF"/>
+                          </a:solidFill>
+                        </a:rPr>
+                        <a:t>-</a:t>
+                      </a:r>
                     </a:p>
                   </a:txBody>
                   <a:tcPr/>
@@ -11187,7 +11739,10 @@
                     <a:bodyPr/>
                     <a:lstStyle/>
                     <a:p>
-                      <a:endParaRPr lang="en-GB" sz="500" dirty="0"/>
+                      <a:r>
+                        <a:rPr lang="en-GB" sz="500" dirty="0"/>
+                        <a:t>-</a:t>
+                      </a:r>
                     </a:p>
                   </a:txBody>
                   <a:tcPr/>
@@ -11204,12 +11759,15 @@
                     <a:bodyPr/>
                     <a:lstStyle/>
                     <a:p>
-                      <a:endParaRPr lang="en-GB" sz="500" dirty="0"/>
+                      <a:r>
+                        <a:rPr lang="en-GB" sz="500" dirty="0"/>
+                        <a:t>Yuvraj Singh</a:t>
+                      </a:r>
                     </a:p>
                   </a:txBody>
                   <a:tcPr>
                     <a:solidFill>
-                      <a:schemeClr val="tx1"/>
+                      <a:srgbClr val="E9EBF5"/>
                     </a:solidFill>
                   </a:tcPr>
                 </a:tc>
@@ -11218,7 +11776,10 @@
                     <a:bodyPr/>
                     <a:lstStyle/>
                     <a:p>
-                      <a:endParaRPr lang="en-GB" sz="500" dirty="0"/>
+                      <a:r>
+                        <a:rPr lang="en-GB" sz="500" dirty="0"/>
+                        <a:t>-</a:t>
+                      </a:r>
                     </a:p>
                   </a:txBody>
                   <a:tcPr/>
@@ -11241,7 +11802,10 @@
                     <a:bodyPr/>
                     <a:lstStyle/>
                     <a:p>
-                      <a:endParaRPr lang="en-GB" sz="500" dirty="0"/>
+                      <a:r>
+                        <a:rPr lang="en-GB" sz="500" dirty="0"/>
+                        <a:t>-</a:t>
+                      </a:r>
                     </a:p>
                   </a:txBody>
                   <a:tcPr/>
@@ -11258,12 +11822,15 @@
                     <a:bodyPr/>
                     <a:lstStyle/>
                     <a:p>
-                      <a:endParaRPr lang="en-GB" sz="500" dirty="0"/>
+                      <a:r>
+                        <a:rPr lang="en-GB" sz="500" dirty="0"/>
+                        <a:t>Zafarullah Khan Jamali</a:t>
+                      </a:r>
                     </a:p>
                   </a:txBody>
                   <a:tcPr>
                     <a:solidFill>
-                      <a:schemeClr val="tx1"/>
+                      <a:srgbClr val="CFD5EA"/>
                     </a:solidFill>
                   </a:tcPr>
                 </a:tc>
@@ -11272,7 +11839,10 @@
                     <a:bodyPr/>
                     <a:lstStyle/>
                     <a:p>
-                      <a:endParaRPr lang="en-GB" sz="500" dirty="0"/>
+                      <a:r>
+                        <a:rPr lang="en-GB" sz="500" dirty="0"/>
+                        <a:t>-</a:t>
+                      </a:r>
                     </a:p>
                   </a:txBody>
                   <a:tcPr/>
@@ -11295,7 +11865,10 @@
                     <a:bodyPr/>
                     <a:lstStyle/>
                     <a:p>
-                      <a:endParaRPr lang="en-GB" sz="500" dirty="0"/>
+                      <a:r>
+                        <a:rPr lang="en-GB" sz="500" dirty="0"/>
+                        <a:t>-</a:t>
+                      </a:r>
                     </a:p>
                   </a:txBody>
                   <a:tcPr/>
@@ -11312,12 +11885,19 @@
                     <a:bodyPr/>
                     <a:lstStyle/>
                     <a:p>
-                      <a:endParaRPr lang="en-GB" sz="500" dirty="0"/>
+                      <a:r>
+                        <a:rPr lang="en-GB" sz="500" dirty="0" err="1"/>
+                        <a:t>Zaini</a:t>
+                      </a:r>
+                      <a:r>
+                        <a:rPr lang="en-GB" sz="500" dirty="0"/>
+                        <a:t> Abdullah</a:t>
+                      </a:r>
                     </a:p>
                   </a:txBody>
                   <a:tcPr>
                     <a:solidFill>
-                      <a:schemeClr val="tx1"/>
+                      <a:srgbClr val="E9EBF5"/>
                     </a:solidFill>
                   </a:tcPr>
                 </a:tc>
@@ -11326,7 +11906,10 @@
                     <a:bodyPr/>
                     <a:lstStyle/>
                     <a:p>
-                      <a:endParaRPr lang="en-GB" sz="500" dirty="0"/>
+                      <a:r>
+                        <a:rPr lang="en-GB" sz="500" dirty="0"/>
+                        <a:t>-</a:t>
+                      </a:r>
                     </a:p>
                   </a:txBody>
                   <a:tcPr/>
@@ -11349,7 +11932,10 @@
                     <a:bodyPr/>
                     <a:lstStyle/>
                     <a:p>
-                      <a:endParaRPr lang="en-GB" sz="500"/>
+                      <a:r>
+                        <a:rPr lang="en-GB" sz="500" dirty="0"/>
+                        <a:t>-</a:t>
+                      </a:r>
                     </a:p>
                   </a:txBody>
                   <a:tcPr/>
@@ -11366,12 +11952,19 @@
                     <a:bodyPr/>
                     <a:lstStyle/>
                     <a:p>
-                      <a:endParaRPr lang="en-GB" sz="500" dirty="0"/>
+                      <a:r>
+                        <a:rPr lang="en-GB" sz="500" dirty="0" err="1"/>
+                        <a:t>Zahir</a:t>
+                      </a:r>
+                      <a:r>
+                        <a:rPr lang="en-GB" sz="500" dirty="0"/>
+                        <a:t> Shah</a:t>
+                      </a:r>
                     </a:p>
                   </a:txBody>
                   <a:tcPr>
                     <a:solidFill>
-                      <a:schemeClr val="tx1"/>
+                      <a:srgbClr val="CFD5EA"/>
                     </a:solidFill>
                   </a:tcPr>
                 </a:tc>
@@ -11380,7 +11973,10 @@
                     <a:bodyPr/>
                     <a:lstStyle/>
                     <a:p>
-                      <a:endParaRPr lang="en-GB" sz="500" dirty="0"/>
+                      <a:r>
+                        <a:rPr lang="en-GB" sz="500" dirty="0"/>
+                        <a:t>-</a:t>
+                      </a:r>
                     </a:p>
                   </a:txBody>
                   <a:tcPr/>
@@ -11425,7 +12021,10 @@
                     <a:bodyPr/>
                     <a:lstStyle/>
                     <a:p>
-                      <a:endParaRPr lang="en-GB" sz="500" dirty="0"/>
+                      <a:r>
+                        <a:rPr lang="en-GB" sz="500" dirty="0"/>
+                        <a:t>-</a:t>
+                      </a:r>
                     </a:p>
                   </a:txBody>
                   <a:tcPr/>
@@ -11442,12 +12041,24 @@
                     <a:bodyPr/>
                     <a:lstStyle/>
                     <a:p>
+                      <a:r>
+                        <a:rPr lang="en-GB" sz="500" dirty="0" err="1"/>
+                        <a:t>Zakia</a:t>
+                      </a:r>
+                      <a:r>
+                        <a:rPr lang="en-GB" sz="500" dirty="0"/>
+                        <a:t> </a:t>
+                      </a:r>
+                      <a:r>
+                        <a:rPr lang="en-GB" sz="500" dirty="0" err="1"/>
+                        <a:t>Hakki</a:t>
+                      </a:r>
                       <a:endParaRPr lang="en-GB" sz="500" dirty="0"/>
                     </a:p>
                   </a:txBody>
                   <a:tcPr>
                     <a:solidFill>
-                      <a:schemeClr val="tx1"/>
+                      <a:srgbClr val="E9EBF5"/>
                     </a:solidFill>
                   </a:tcPr>
                 </a:tc>
@@ -11456,7 +12067,10 @@
                     <a:bodyPr/>
                     <a:lstStyle/>
                     <a:p>
-                      <a:endParaRPr lang="en-GB" sz="500" dirty="0"/>
+                      <a:r>
+                        <a:rPr lang="en-GB" sz="500" dirty="0"/>
+                        <a:t>-</a:t>
+                      </a:r>
                     </a:p>
                   </a:txBody>
                   <a:tcPr/>
@@ -11484,7 +12098,10 @@
                     <a:bodyPr/>
                     <a:lstStyle/>
                     <a:p>
-                      <a:endParaRPr lang="en-GB" sz="500"/>
+                      <a:r>
+                        <a:rPr lang="en-GB" sz="500" dirty="0"/>
+                        <a:t>-</a:t>
+                      </a:r>
                     </a:p>
                   </a:txBody>
                   <a:tcPr/>
@@ -11501,12 +12118,20 @@
                     <a:bodyPr/>
                     <a:lstStyle/>
                     <a:p>
+                      <a:r>
+                        <a:rPr lang="en-GB" sz="500" dirty="0"/>
+                        <a:t>Talal </a:t>
+                      </a:r>
+                      <a:r>
+                        <a:rPr lang="en-GB" sz="500" dirty="0" err="1"/>
+                        <a:t>Keenaan</a:t>
+                      </a:r>
                       <a:endParaRPr lang="en-GB" sz="500" dirty="0"/>
                     </a:p>
                   </a:txBody>
                   <a:tcPr>
                     <a:solidFill>
-                      <a:schemeClr val="tx1"/>
+                      <a:srgbClr val="CFD5EA"/>
                     </a:solidFill>
                   </a:tcPr>
                 </a:tc>
@@ -11515,7 +12140,10 @@
                     <a:bodyPr/>
                     <a:lstStyle/>
                     <a:p>
-                      <a:endParaRPr lang="en-GB" sz="500" dirty="0"/>
+                      <a:r>
+                        <a:rPr lang="en-GB" sz="500" dirty="0"/>
+                        <a:t>-</a:t>
+                      </a:r>
                     </a:p>
                   </a:txBody>
                   <a:tcPr/>
@@ -11538,7 +12166,10 @@
                     <a:bodyPr/>
                     <a:lstStyle/>
                     <a:p>
-                      <a:endParaRPr lang="en-GB" sz="500" dirty="0"/>
+                      <a:r>
+                        <a:rPr lang="en-GB" sz="500" dirty="0"/>
+                        <a:t>-</a:t>
+                      </a:r>
                     </a:p>
                   </a:txBody>
                   <a:tcPr/>
@@ -11555,12 +12186,15 @@
                     <a:bodyPr/>
                     <a:lstStyle/>
                     <a:p>
-                      <a:endParaRPr lang="en-GB" sz="500" dirty="0"/>
+                      <a:r>
+                        <a:rPr lang="en-GB" sz="500" dirty="0"/>
+                        <a:t>Syed Ibrahim</a:t>
+                      </a:r>
                     </a:p>
                   </a:txBody>
                   <a:tcPr>
                     <a:solidFill>
-                      <a:schemeClr val="tx1"/>
+                      <a:srgbClr val="E9EBF5"/>
                     </a:solidFill>
                   </a:tcPr>
                 </a:tc>
@@ -11569,7 +12203,10 @@
                     <a:bodyPr/>
                     <a:lstStyle/>
                     <a:p>
-                      <a:endParaRPr lang="en-GB" sz="500" dirty="0"/>
+                      <a:r>
+                        <a:rPr lang="en-GB" sz="500" dirty="0"/>
+                        <a:t>-</a:t>
+                      </a:r>
                     </a:p>
                   </a:txBody>
                   <a:tcPr/>
@@ -11597,7 +12234,10 @@
                     <a:bodyPr/>
                     <a:lstStyle/>
                     <a:p>
-                      <a:endParaRPr lang="en-GB" sz="500" dirty="0"/>
+                      <a:r>
+                        <a:rPr lang="en-GB" sz="500" dirty="0"/>
+                        <a:t>-</a:t>
+                      </a:r>
                     </a:p>
                   </a:txBody>
                   <a:tcPr/>
@@ -11614,12 +12254,15 @@
                     <a:bodyPr/>
                     <a:lstStyle/>
                     <a:p>
-                      <a:endParaRPr lang="en-GB" sz="500" dirty="0"/>
+                      <a:r>
+                        <a:rPr lang="en-GB" sz="500" dirty="0"/>
+                        <a:t>Syed Abdul Rahman Geelani</a:t>
+                      </a:r>
                     </a:p>
                   </a:txBody>
                   <a:tcPr>
                     <a:solidFill>
-                      <a:schemeClr val="tx1"/>
+                      <a:srgbClr val="CFD5EA"/>
                     </a:solidFill>
                   </a:tcPr>
                 </a:tc>
@@ -11628,7 +12271,10 @@
                     <a:bodyPr/>
                     <a:lstStyle/>
                     <a:p>
-                      <a:endParaRPr lang="en-GB" sz="500" dirty="0"/>
+                      <a:r>
+                        <a:rPr lang="en-GB" sz="500" dirty="0"/>
+                        <a:t>-</a:t>
+                      </a:r>
                     </a:p>
                   </a:txBody>
                   <a:tcPr/>
@@ -11651,7 +12297,10 @@
                     <a:bodyPr/>
                     <a:lstStyle/>
                     <a:p>
-                      <a:endParaRPr lang="en-GB" sz="500" dirty="0"/>
+                      <a:r>
+                        <a:rPr lang="en-GB" sz="500" dirty="0"/>
+                        <a:t>-</a:t>
+                      </a:r>
                     </a:p>
                   </a:txBody>
                   <a:tcPr/>
@@ -11668,12 +12317,15 @@
                     <a:bodyPr/>
                     <a:lstStyle/>
                     <a:p>
-                      <a:endParaRPr lang="en-GB" sz="500" dirty="0"/>
+                      <a:r>
+                        <a:rPr lang="en-GB" sz="500" dirty="0"/>
+                        <a:t>Surya Bahadur Thapa</a:t>
+                      </a:r>
                     </a:p>
                   </a:txBody>
                   <a:tcPr>
                     <a:solidFill>
-                      <a:schemeClr val="tx1"/>
+                      <a:srgbClr val="E9EBF5"/>
                     </a:solidFill>
                   </a:tcPr>
                 </a:tc>
@@ -11682,7 +12334,10 @@
                     <a:bodyPr/>
                     <a:lstStyle/>
                     <a:p>
-                      <a:endParaRPr lang="en-GB" sz="500" dirty="0"/>
+                      <a:r>
+                        <a:rPr lang="en-GB" sz="500" dirty="0"/>
+                        <a:t>-</a:t>
+                      </a:r>
                     </a:p>
                   </a:txBody>
                   <a:tcPr/>
@@ -11705,7 +12360,10 @@
                     <a:bodyPr/>
                     <a:lstStyle/>
                     <a:p>
-                      <a:endParaRPr lang="en-GB" sz="500" dirty="0"/>
+                      <a:r>
+                        <a:rPr lang="en-GB" sz="500" dirty="0"/>
+                        <a:t>-</a:t>
+                      </a:r>
                     </a:p>
                   </a:txBody>
                   <a:tcPr/>
@@ -11722,12 +12380,24 @@
                     <a:bodyPr/>
                     <a:lstStyle/>
                     <a:p>
+                      <a:r>
+                        <a:rPr lang="en-GB" sz="500" dirty="0" err="1"/>
+                        <a:t>Sureyya</a:t>
+                      </a:r>
+                      <a:r>
+                        <a:rPr lang="en-GB" sz="500" dirty="0"/>
+                        <a:t> </a:t>
+                      </a:r>
+                      <a:r>
+                        <a:rPr lang="en-GB" sz="500" dirty="0" err="1"/>
+                        <a:t>Ayhan</a:t>
+                      </a:r>
                       <a:endParaRPr lang="en-GB" sz="500" dirty="0"/>
                     </a:p>
                   </a:txBody>
                   <a:tcPr>
                     <a:solidFill>
-                      <a:schemeClr val="tx1"/>
+                      <a:srgbClr val="CFD5EA"/>
                     </a:solidFill>
                   </a:tcPr>
                 </a:tc>
@@ -11736,7 +12406,10 @@
                     <a:bodyPr/>
                     <a:lstStyle/>
                     <a:p>
-                      <a:endParaRPr lang="en-GB" sz="500" dirty="0"/>
+                      <a:r>
+                        <a:rPr lang="en-GB" sz="500" dirty="0"/>
+                        <a:t>-</a:t>
+                      </a:r>
                     </a:p>
                   </a:txBody>
                   <a:tcPr/>
@@ -11759,7 +12432,10 @@
                     <a:bodyPr/>
                     <a:lstStyle/>
                     <a:p>
-                      <a:endParaRPr lang="en-GB" sz="500" dirty="0"/>
+                      <a:r>
+                        <a:rPr lang="en-GB" sz="500" dirty="0"/>
+                        <a:t>-</a:t>
+                      </a:r>
                     </a:p>
                   </a:txBody>
                   <a:tcPr/>
@@ -11776,12 +12452,20 @@
                     <a:bodyPr/>
                     <a:lstStyle/>
                     <a:p>
+                      <a:r>
+                        <a:rPr lang="en-GB" sz="500" dirty="0"/>
+                        <a:t>Supachai </a:t>
+                      </a:r>
+                      <a:r>
+                        <a:rPr lang="en-GB" sz="500" dirty="0" err="1"/>
+                        <a:t>Panitchpakdi</a:t>
+                      </a:r>
                       <a:endParaRPr lang="en-GB" sz="500" dirty="0"/>
                     </a:p>
                   </a:txBody>
                   <a:tcPr>
                     <a:solidFill>
-                      <a:schemeClr val="tx1"/>
+                      <a:srgbClr val="E9EBF5"/>
                     </a:solidFill>
                   </a:tcPr>
                 </a:tc>
@@ -11790,7 +12474,10 @@
                     <a:bodyPr/>
                     <a:lstStyle/>
                     <a:p>
-                      <a:endParaRPr lang="en-GB" sz="500" dirty="0"/>
+                      <a:r>
+                        <a:rPr lang="en-GB" sz="500" dirty="0"/>
+                        <a:t>-</a:t>
+                      </a:r>
                     </a:p>
                   </a:txBody>
                   <a:tcPr/>
@@ -11813,7 +12500,10 @@
                     <a:bodyPr/>
                     <a:lstStyle/>
                     <a:p>
-                      <a:endParaRPr lang="en-GB" sz="500" dirty="0"/>
+                      <a:r>
+                        <a:rPr lang="en-GB" sz="500" dirty="0"/>
+                        <a:t>-</a:t>
+                      </a:r>
                     </a:p>
                   </a:txBody>
                   <a:tcPr/>
@@ -11830,12 +12520,15 @@
                     <a:bodyPr/>
                     <a:lstStyle/>
                     <a:p>
-                      <a:endParaRPr lang="en-GB" sz="500" dirty="0"/>
+                      <a:r>
+                        <a:rPr lang="en-GB" sz="500" dirty="0"/>
+                        <a:t>Sultan Qaboos</a:t>
+                      </a:r>
                     </a:p>
                   </a:txBody>
                   <a:tcPr>
                     <a:solidFill>
-                      <a:schemeClr val="tx1"/>
+                      <a:srgbClr val="CFD5EA"/>
                     </a:solidFill>
                   </a:tcPr>
                 </a:tc>
@@ -11844,7 +12537,10 @@
                     <a:bodyPr/>
                     <a:lstStyle/>
                     <a:p>
-                      <a:endParaRPr lang="en-GB" sz="500" dirty="0"/>
+                      <a:r>
+                        <a:rPr lang="en-GB" sz="500" dirty="0"/>
+                        <a:t>-</a:t>
+                      </a:r>
                     </a:p>
                   </a:txBody>
                   <a:tcPr/>
@@ -11867,7 +12563,10 @@
                     <a:bodyPr/>
                     <a:lstStyle/>
                     <a:p>
-                      <a:endParaRPr lang="en-GB" sz="500" dirty="0"/>
+                      <a:r>
+                        <a:rPr lang="en-GB" sz="500" dirty="0"/>
+                        <a:t>-</a:t>
+                      </a:r>
                     </a:p>
                   </a:txBody>
                   <a:tcPr/>
@@ -11884,12 +12583,15 @@
                     <a:bodyPr/>
                     <a:lstStyle/>
                     <a:p>
-                      <a:endParaRPr lang="en-GB" sz="500" dirty="0"/>
+                      <a:r>
+                        <a:rPr lang="en-GB" sz="500" dirty="0"/>
+                        <a:t>Saddam Hussein</a:t>
+                      </a:r>
                     </a:p>
                   </a:txBody>
                   <a:tcPr>
                     <a:solidFill>
-                      <a:schemeClr val="tx1"/>
+                      <a:srgbClr val="E9EBF5"/>
                     </a:solidFill>
                   </a:tcPr>
                 </a:tc>
@@ -11898,6 +12600,10 @@
                     <a:bodyPr/>
                     <a:lstStyle/>
                     <a:p>
+                      <a:r>
+                        <a:rPr lang="en-GB" sz="500"/>
+                        <a:t>-</a:t>
+                      </a:r>
                       <a:endParaRPr lang="en-GB" sz="500" dirty="0"/>
                     </a:p>
                   </a:txBody>
@@ -11921,7 +12627,10 @@
                     <a:bodyPr/>
                     <a:lstStyle/>
                     <a:p>
-                      <a:endParaRPr lang="en-GB" sz="500" dirty="0"/>
+                      <a:r>
+                        <a:rPr lang="en-GB" sz="500" dirty="0"/>
+                        <a:t>-</a:t>
+                      </a:r>
                     </a:p>
                   </a:txBody>
                   <a:tcPr/>

</xml_diff>

<commit_message>
Finished acquiring results to apply inferential statistics onto
</commit_message>
<xml_diff>
--- a/Research Methods/Lecture 1/Assignment 2/Research Methods Tasks.pptx
+++ b/Research Methods/Lecture 1/Assignment 2/Research Methods Tasks.pptx
@@ -122,7 +122,7 @@
 <file path=ppt/revisionInfo.xml><?xml version="1.0" encoding="utf-8"?>
 <p1510:revInfo xmlns:a="http://schemas.openxmlformats.org/drawingml/2006/main" xmlns:r="http://schemas.openxmlformats.org/officeDocument/2006/relationships" xmlns:p1510="http://schemas.microsoft.com/office/powerpoint/2015/10/main">
   <p1510:revLst>
-    <p1510:client id="{2E14539D-EE34-460F-AD55-262881C33275}" v="137" dt="2023-01-24T10:52:58.546"/>
+    <p1510:client id="{2E14539D-EE34-460F-AD55-262881C33275}" v="206" dt="2023-01-26T05:04:34.001"/>
   </p1510:revLst>
 </p1510:revInfo>
 </file>
@@ -132,7 +132,7 @@
   <pc:docChgLst>
     <pc:chgData name="Stephen Rerri" userId="ff494b0457865fe3" providerId="LiveId" clId="{2E14539D-EE34-460F-AD55-262881C33275}"/>
     <pc:docChg chg="undo redo custSel addSld modSld">
-      <pc:chgData name="Stephen Rerri" userId="ff494b0457865fe3" providerId="LiveId" clId="{2E14539D-EE34-460F-AD55-262881C33275}" dt="2023-01-24T10:53:55.025" v="2929" actId="20577"/>
+      <pc:chgData name="Stephen Rerri" userId="ff494b0457865fe3" providerId="LiveId" clId="{2E14539D-EE34-460F-AD55-262881C33275}" dt="2023-01-26T05:04:34.001" v="3314" actId="5736"/>
       <pc:docMkLst>
         <pc:docMk/>
       </pc:docMkLst>
@@ -255,7 +255,7 @@
         </pc:grpChg>
       </pc:sldChg>
       <pc:sldChg chg="addSp delSp modSp new mod">
-        <pc:chgData name="Stephen Rerri" userId="ff494b0457865fe3" providerId="LiveId" clId="{2E14539D-EE34-460F-AD55-262881C33275}" dt="2023-01-23T13:00:27.113" v="1427" actId="20577"/>
+        <pc:chgData name="Stephen Rerri" userId="ff494b0457865fe3" providerId="LiveId" clId="{2E14539D-EE34-460F-AD55-262881C33275}" dt="2023-01-26T05:04:34.001" v="3314" actId="5736"/>
         <pc:sldMkLst>
           <pc:docMk/>
           <pc:sldMk cId="1287465027" sldId="261"/>
@@ -285,7 +285,7 @@
           </ac:spMkLst>
         </pc:spChg>
         <pc:graphicFrameChg chg="add mod ord modGraphic">
-          <ac:chgData name="Stephen Rerri" userId="ff494b0457865fe3" providerId="LiveId" clId="{2E14539D-EE34-460F-AD55-262881C33275}" dt="2023-01-23T12:59:27.872" v="1421" actId="20577"/>
+          <ac:chgData name="Stephen Rerri" userId="ff494b0457865fe3" providerId="LiveId" clId="{2E14539D-EE34-460F-AD55-262881C33275}" dt="2023-01-26T05:04:34.001" v="3314" actId="5736"/>
           <ac:graphicFrameMkLst>
             <pc:docMk/>
             <pc:sldMk cId="1287465027" sldId="261"/>
@@ -294,7 +294,7 @@
         </pc:graphicFrameChg>
       </pc:sldChg>
       <pc:sldChg chg="addSp delSp modSp new mod">
-        <pc:chgData name="Stephen Rerri" userId="ff494b0457865fe3" providerId="LiveId" clId="{2E14539D-EE34-460F-AD55-262881C33275}" dt="2023-01-24T10:53:55.025" v="2929" actId="20577"/>
+        <pc:chgData name="Stephen Rerri" userId="ff494b0457865fe3" providerId="LiveId" clId="{2E14539D-EE34-460F-AD55-262881C33275}" dt="2023-01-26T03:27:26.224" v="3023" actId="13926"/>
         <pc:sldMkLst>
           <pc:docMk/>
           <pc:sldMk cId="4179145786" sldId="262"/>
@@ -380,7 +380,7 @@
           </ac:graphicFrameMkLst>
         </pc:graphicFrameChg>
         <pc:graphicFrameChg chg="add mod modGraphic">
-          <ac:chgData name="Stephen Rerri" userId="ff494b0457865fe3" providerId="LiveId" clId="{2E14539D-EE34-460F-AD55-262881C33275}" dt="2023-01-24T10:36:01.102" v="2802"/>
+          <ac:chgData name="Stephen Rerri" userId="ff494b0457865fe3" providerId="LiveId" clId="{2E14539D-EE34-460F-AD55-262881C33275}" dt="2023-01-26T03:07:06.630" v="3019" actId="13926"/>
           <ac:graphicFrameMkLst>
             <pc:docMk/>
             <pc:sldMk cId="4179145786" sldId="262"/>
@@ -396,7 +396,7 @@
           </ac:graphicFrameMkLst>
         </pc:graphicFrameChg>
         <pc:graphicFrameChg chg="add mod modGraphic">
-          <ac:chgData name="Stephen Rerri" userId="ff494b0457865fe3" providerId="LiveId" clId="{2E14539D-EE34-460F-AD55-262881C33275}" dt="2023-01-24T10:39:25.097" v="2838" actId="20577"/>
+          <ac:chgData name="Stephen Rerri" userId="ff494b0457865fe3" providerId="LiveId" clId="{2E14539D-EE34-460F-AD55-262881C33275}" dt="2023-01-26T03:07:11.982" v="3020" actId="13926"/>
           <ac:graphicFrameMkLst>
             <pc:docMk/>
             <pc:sldMk cId="4179145786" sldId="262"/>
@@ -404,7 +404,7 @@
           </ac:graphicFrameMkLst>
         </pc:graphicFrameChg>
         <pc:graphicFrameChg chg="add mod modGraphic">
-          <ac:chgData name="Stephen Rerri" userId="ff494b0457865fe3" providerId="LiveId" clId="{2E14539D-EE34-460F-AD55-262881C33275}" dt="2023-01-24T10:45:41.408" v="2887" actId="20577"/>
+          <ac:chgData name="Stephen Rerri" userId="ff494b0457865fe3" providerId="LiveId" clId="{2E14539D-EE34-460F-AD55-262881C33275}" dt="2023-01-26T03:12:28.407" v="3021" actId="13926"/>
           <ac:graphicFrameMkLst>
             <pc:docMk/>
             <pc:sldMk cId="4179145786" sldId="262"/>
@@ -412,7 +412,7 @@
           </ac:graphicFrameMkLst>
         </pc:graphicFrameChg>
         <pc:graphicFrameChg chg="add mod modGraphic">
-          <ac:chgData name="Stephen Rerri" userId="ff494b0457865fe3" providerId="LiveId" clId="{2E14539D-EE34-460F-AD55-262881C33275}" dt="2023-01-24T10:49:20.413" v="2907" actId="20577"/>
+          <ac:chgData name="Stephen Rerri" userId="ff494b0457865fe3" providerId="LiveId" clId="{2E14539D-EE34-460F-AD55-262881C33275}" dt="2023-01-26T03:19:57.728" v="3022" actId="13926"/>
           <ac:graphicFrameMkLst>
             <pc:docMk/>
             <pc:sldMk cId="4179145786" sldId="262"/>
@@ -420,7 +420,7 @@
           </ac:graphicFrameMkLst>
         </pc:graphicFrameChg>
         <pc:graphicFrameChg chg="add mod modGraphic">
-          <ac:chgData name="Stephen Rerri" userId="ff494b0457865fe3" providerId="LiveId" clId="{2E14539D-EE34-460F-AD55-262881C33275}" dt="2023-01-24T10:53:55.025" v="2929" actId="20577"/>
+          <ac:chgData name="Stephen Rerri" userId="ff494b0457865fe3" providerId="LiveId" clId="{2E14539D-EE34-460F-AD55-262881C33275}" dt="2023-01-26T03:27:26.224" v="3023" actId="13926"/>
           <ac:graphicFrameMkLst>
             <pc:docMk/>
             <pc:sldMk cId="4179145786" sldId="262"/>
@@ -621,7 +621,7 @@
           <a:p>
             <a:fld id="{67918565-613A-444B-85EF-DEFF1144F0F9}" type="datetimeFigureOut">
               <a:rPr lang="en-GB" smtClean="0"/>
-              <a:t>24/01/2023</a:t>
+              <a:t>26/01/2023</a:t>
             </a:fld>
             <a:endParaRPr lang="en-GB"/>
           </a:p>
@@ -821,7 +821,7 @@
           <a:p>
             <a:fld id="{67918565-613A-444B-85EF-DEFF1144F0F9}" type="datetimeFigureOut">
               <a:rPr lang="en-GB" smtClean="0"/>
-              <a:t>24/01/2023</a:t>
+              <a:t>26/01/2023</a:t>
             </a:fld>
             <a:endParaRPr lang="en-GB"/>
           </a:p>
@@ -1031,7 +1031,7 @@
           <a:p>
             <a:fld id="{67918565-613A-444B-85EF-DEFF1144F0F9}" type="datetimeFigureOut">
               <a:rPr lang="en-GB" smtClean="0"/>
-              <a:t>24/01/2023</a:t>
+              <a:t>26/01/2023</a:t>
             </a:fld>
             <a:endParaRPr lang="en-GB"/>
           </a:p>
@@ -1231,7 +1231,7 @@
           <a:p>
             <a:fld id="{67918565-613A-444B-85EF-DEFF1144F0F9}" type="datetimeFigureOut">
               <a:rPr lang="en-GB" smtClean="0"/>
-              <a:t>24/01/2023</a:t>
+              <a:t>26/01/2023</a:t>
             </a:fld>
             <a:endParaRPr lang="en-GB"/>
           </a:p>
@@ -1507,7 +1507,7 @@
           <a:p>
             <a:fld id="{67918565-613A-444B-85EF-DEFF1144F0F9}" type="datetimeFigureOut">
               <a:rPr lang="en-GB" smtClean="0"/>
-              <a:t>24/01/2023</a:t>
+              <a:t>26/01/2023</a:t>
             </a:fld>
             <a:endParaRPr lang="en-GB"/>
           </a:p>
@@ -1775,7 +1775,7 @@
           <a:p>
             <a:fld id="{67918565-613A-444B-85EF-DEFF1144F0F9}" type="datetimeFigureOut">
               <a:rPr lang="en-GB" smtClean="0"/>
-              <a:t>24/01/2023</a:t>
+              <a:t>26/01/2023</a:t>
             </a:fld>
             <a:endParaRPr lang="en-GB"/>
           </a:p>
@@ -2190,7 +2190,7 @@
           <a:p>
             <a:fld id="{67918565-613A-444B-85EF-DEFF1144F0F9}" type="datetimeFigureOut">
               <a:rPr lang="en-GB" smtClean="0"/>
-              <a:t>24/01/2023</a:t>
+              <a:t>26/01/2023</a:t>
             </a:fld>
             <a:endParaRPr lang="en-GB"/>
           </a:p>
@@ -2332,7 +2332,7 @@
           <a:p>
             <a:fld id="{67918565-613A-444B-85EF-DEFF1144F0F9}" type="datetimeFigureOut">
               <a:rPr lang="en-GB" smtClean="0"/>
-              <a:t>24/01/2023</a:t>
+              <a:t>26/01/2023</a:t>
             </a:fld>
             <a:endParaRPr lang="en-GB"/>
           </a:p>
@@ -2445,7 +2445,7 @@
           <a:p>
             <a:fld id="{67918565-613A-444B-85EF-DEFF1144F0F9}" type="datetimeFigureOut">
               <a:rPr lang="en-GB" smtClean="0"/>
-              <a:t>24/01/2023</a:t>
+              <a:t>26/01/2023</a:t>
             </a:fld>
             <a:endParaRPr lang="en-GB"/>
           </a:p>
@@ -2758,7 +2758,7 @@
           <a:p>
             <a:fld id="{67918565-613A-444B-85EF-DEFF1144F0F9}" type="datetimeFigureOut">
               <a:rPr lang="en-GB" smtClean="0"/>
-              <a:t>24/01/2023</a:t>
+              <a:t>26/01/2023</a:t>
             </a:fld>
             <a:endParaRPr lang="en-GB"/>
           </a:p>
@@ -3047,7 +3047,7 @@
           <a:p>
             <a:fld id="{67918565-613A-444B-85EF-DEFF1144F0F9}" type="datetimeFigureOut">
               <a:rPr lang="en-GB" smtClean="0"/>
-              <a:t>24/01/2023</a:t>
+              <a:t>26/01/2023</a:t>
             </a:fld>
             <a:endParaRPr lang="en-GB"/>
           </a:p>
@@ -3290,7 +3290,7 @@
           <a:p>
             <a:fld id="{67918565-613A-444B-85EF-DEFF1144F0F9}" type="datetimeFigureOut">
               <a:rPr lang="en-GB" smtClean="0"/>
-              <a:t>24/01/2023</a:t>
+              <a:t>26/01/2023</a:t>
             </a:fld>
             <a:endParaRPr lang="en-GB"/>
           </a:p>
@@ -4728,14 +4728,14 @@
             <p:ph idx="1"/>
             <p:extLst>
               <p:ext uri="{D42A27DB-BD31-4B8C-83A1-F6EECF244321}">
-                <p14:modId xmlns:p14="http://schemas.microsoft.com/office/powerpoint/2010/main" val="3274661230"/>
+                <p14:modId xmlns:p14="http://schemas.microsoft.com/office/powerpoint/2010/main" val="3529901756"/>
               </p:ext>
             </p:extLst>
           </p:nvPr>
         </p:nvGraphicFramePr>
         <p:xfrm>
           <a:off x="873520" y="1233139"/>
-          <a:ext cx="7485586" cy="4043680"/>
+          <a:ext cx="7698813" cy="3175000"/>
         </p:xfrm>
         <a:graphic>
           <a:graphicData uri="http://schemas.openxmlformats.org/drawingml/2006/table">
@@ -4744,34 +4744,27 @@
                 <a:tableStyleId>{5C22544A-7EE6-4342-B048-85BDC9FD1C3A}</a:tableStyleId>
               </a:tblPr>
               <a:tblGrid>
-                <a:gridCol w="1405136">
+                <a:gridCol w="1862127">
                   <a:extLst>
                     <a:ext uri="{9D8B030D-6E8A-4147-A177-3AD203B41FA5}">
                       <a16:colId xmlns:a16="http://schemas.microsoft.com/office/drawing/2014/main" val="3471083108"/>
                     </a:ext>
                   </a:extLst>
                 </a:gridCol>
-                <a:gridCol w="1409412">
+                <a:gridCol w="3112016">
                   <a:extLst>
                     <a:ext uri="{9D8B030D-6E8A-4147-A177-3AD203B41FA5}">
                       <a16:colId xmlns:a16="http://schemas.microsoft.com/office/drawing/2014/main" val="342199426"/>
                     </a:ext>
                   </a:extLst>
                 </a:gridCol>
-                <a:gridCol w="2335519">
+                <a:gridCol w="2724670">
                   <a:extLst>
                     <a:ext uri="{9D8B030D-6E8A-4147-A177-3AD203B41FA5}">
                       <a16:colId xmlns:a16="http://schemas.microsoft.com/office/drawing/2014/main" val="3286319533"/>
                     </a:ext>
                   </a:extLst>
                 </a:gridCol>
-                <a:gridCol w="2335519">
-                  <a:extLst>
-                    <a:ext uri="{9D8B030D-6E8A-4147-A177-3AD203B41FA5}">
-                      <a16:colId xmlns:a16="http://schemas.microsoft.com/office/drawing/2014/main" val="1674502909"/>
-                    </a:ext>
-                  </a:extLst>
-                </a:gridCol>
               </a:tblGrid>
               <a:tr h="370840">
                 <a:tc>
@@ -4780,7 +4773,7 @@
                     <a:lstStyle/>
                     <a:p>
                       <a:r>
-                        <a:rPr lang="en-GB" dirty="0"/>
+                        <a:rPr lang="en-GB" sz="1600" dirty="0"/>
                         <a:t>Race</a:t>
                       </a:r>
                     </a:p>
@@ -4793,7 +4786,7 @@
                     <a:lstStyle/>
                     <a:p>
                       <a:r>
-                        <a:rPr lang="en-GB" dirty="0"/>
+                        <a:rPr lang="en-GB" sz="1600" dirty="0"/>
                         <a:t>Dataset percentage</a:t>
                       </a:r>
                     </a:p>
@@ -4806,21 +4799,8 @@
                     <a:lstStyle/>
                     <a:p>
                       <a:r>
-                        <a:rPr lang="en-GB" dirty="0"/>
-                        <a:t>Mean Average Classification Error</a:t>
-                      </a:r>
-                    </a:p>
-                  </a:txBody>
-                  <a:tcPr/>
-                </a:tc>
-                <a:tc>
-                  <a:txBody>
-                    <a:bodyPr/>
-                    <a:lstStyle/>
-                    <a:p>
-                      <a:r>
-                        <a:rPr lang="en-GB" dirty="0"/>
-                        <a:t>Regression</a:t>
+                        <a:rPr lang="en-GB" sz="1600" dirty="0"/>
+                        <a:t>Mean Average Distance</a:t>
                       </a:r>
                     </a:p>
                   </a:txBody>
@@ -4839,7 +4819,7 @@
                     <a:lstStyle/>
                     <a:p>
                       <a:r>
-                        <a:rPr lang="en-GB" dirty="0"/>
+                        <a:rPr lang="en-GB" sz="1600" dirty="0"/>
                         <a:t>White </a:t>
                       </a:r>
                     </a:p>
@@ -4852,32 +4832,32 @@
                     <a:lstStyle/>
                     <a:p>
                       <a:r>
-                        <a:rPr lang="en-GB" dirty="0"/>
-                        <a:t>57% of 5749</a:t>
-                      </a:r>
-                    </a:p>
-                  </a:txBody>
-                  <a:tcPr/>
-                </a:tc>
-                <a:tc>
-                  <a:txBody>
-                    <a:bodyPr/>
-                    <a:lstStyle/>
-                    <a:p>
-                      <a:endParaRPr lang="en-GB" dirty="0"/>
-                    </a:p>
-                  </a:txBody>
-                  <a:tcPr/>
-                </a:tc>
-                <a:tc>
-                  <a:txBody>
-                    <a:bodyPr/>
-                    <a:lstStyle/>
-                    <a:p>
-                      <a:endParaRPr lang="en-GB" dirty="0"/>
-                    </a:p>
-                  </a:txBody>
-                  <a:tcPr/>
+                        <a:rPr lang="en-GB" sz="1600" dirty="0"/>
+                        <a:t>57.02%(2.dp) of 5749 = 3277 people</a:t>
+                      </a:r>
+                    </a:p>
+                  </a:txBody>
+                  <a:tcPr/>
+                </a:tc>
+                <a:tc>
+                  <a:txBody>
+                    <a:bodyPr/>
+                    <a:lstStyle/>
+                    <a:p>
+                      <a:pPr algn="r" fontAlgn="b"/>
+                      <a:r>
+                        <a:rPr lang="en-GB" sz="1600" b="0" i="0" u="none" strike="noStrike" dirty="0">
+                          <a:solidFill>
+                            <a:srgbClr val="000000"/>
+                          </a:solidFill>
+                          <a:effectLst/>
+                          <a:latin typeface="+mn-lt"/>
+                        </a:rPr>
+                        <a:t>0.76</a:t>
+                      </a:r>
+                    </a:p>
+                  </a:txBody>
+                  <a:tcPr marL="6350" marR="6350" marT="6350" marB="0" anchor="b"/>
                 </a:tc>
                 <a:extLst>
                   <a:ext uri="{0D108BD9-81ED-4DB2-BD59-A6C34878D82A}">
@@ -4892,7 +4872,7 @@
                     <a:lstStyle/>
                     <a:p>
                       <a:r>
-                        <a:rPr lang="en-GB" dirty="0"/>
+                        <a:rPr lang="en-GB" sz="1600" dirty="0"/>
                         <a:t>Black</a:t>
                       </a:r>
                     </a:p>
@@ -4905,32 +4885,32 @@
                     <a:lstStyle/>
                     <a:p>
                       <a:r>
-                        <a:rPr lang="en-GB" dirty="0"/>
-                        <a:t>7%</a:t>
-                      </a:r>
-                    </a:p>
-                  </a:txBody>
-                  <a:tcPr/>
-                </a:tc>
-                <a:tc>
-                  <a:txBody>
-                    <a:bodyPr/>
-                    <a:lstStyle/>
-                    <a:p>
-                      <a:endParaRPr lang="en-GB" dirty="0"/>
-                    </a:p>
-                  </a:txBody>
-                  <a:tcPr/>
-                </a:tc>
-                <a:tc>
-                  <a:txBody>
-                    <a:bodyPr/>
-                    <a:lstStyle/>
-                    <a:p>
-                      <a:endParaRPr lang="en-GB" dirty="0"/>
-                    </a:p>
-                  </a:txBody>
-                  <a:tcPr/>
+                        <a:rPr lang="en-GB" sz="1600" dirty="0"/>
+                        <a:t>7.39%(2.dp) of 5739 = 425 people</a:t>
+                      </a:r>
+                    </a:p>
+                  </a:txBody>
+                  <a:tcPr/>
+                </a:tc>
+                <a:tc>
+                  <a:txBody>
+                    <a:bodyPr/>
+                    <a:lstStyle/>
+                    <a:p>
+                      <a:pPr algn="r" fontAlgn="b"/>
+                      <a:r>
+                        <a:rPr lang="en-GB" sz="1600" b="0" i="0" u="none" strike="noStrike" dirty="0">
+                          <a:solidFill>
+                            <a:srgbClr val="000000"/>
+                          </a:solidFill>
+                          <a:effectLst/>
+                          <a:latin typeface="+mn-lt"/>
+                        </a:rPr>
+                        <a:t>0.667</a:t>
+                      </a:r>
+                    </a:p>
+                  </a:txBody>
+                  <a:tcPr marL="6350" marR="6350" marT="6350" marB="0" anchor="b"/>
                 </a:tc>
                 <a:extLst>
                   <a:ext uri="{0D108BD9-81ED-4DB2-BD59-A6C34878D82A}">
@@ -4945,7 +4925,7 @@
                     <a:lstStyle/>
                     <a:p>
                       <a:r>
-                        <a:rPr lang="en-GB" dirty="0"/>
+                        <a:rPr lang="en-GB" sz="1600" dirty="0"/>
                         <a:t>Middle Eastern</a:t>
                       </a:r>
                     </a:p>
@@ -4958,32 +4938,32 @@
                     <a:lstStyle/>
                     <a:p>
                       <a:r>
-                        <a:rPr lang="en-GB" dirty="0"/>
-                        <a:t>10%</a:t>
-                      </a:r>
-                    </a:p>
-                  </a:txBody>
-                  <a:tcPr/>
-                </a:tc>
-                <a:tc>
-                  <a:txBody>
-                    <a:bodyPr/>
-                    <a:lstStyle/>
-                    <a:p>
-                      <a:endParaRPr lang="en-GB"/>
-                    </a:p>
-                  </a:txBody>
-                  <a:tcPr/>
-                </a:tc>
-                <a:tc>
-                  <a:txBody>
-                    <a:bodyPr/>
-                    <a:lstStyle/>
-                    <a:p>
-                      <a:endParaRPr lang="en-GB"/>
-                    </a:p>
-                  </a:txBody>
-                  <a:tcPr/>
+                        <a:rPr lang="en-GB" sz="1600" dirty="0"/>
+                        <a:t>9.90%(2.dp) of 5739 = 569 people</a:t>
+                      </a:r>
+                    </a:p>
+                  </a:txBody>
+                  <a:tcPr/>
+                </a:tc>
+                <a:tc>
+                  <a:txBody>
+                    <a:bodyPr/>
+                    <a:lstStyle/>
+                    <a:p>
+                      <a:pPr algn="r" fontAlgn="b"/>
+                      <a:r>
+                        <a:rPr lang="en-GB" sz="1600" b="0" i="0" u="none" strike="noStrike">
+                          <a:solidFill>
+                            <a:srgbClr val="000000"/>
+                          </a:solidFill>
+                          <a:effectLst/>
+                          <a:latin typeface="+mn-lt"/>
+                        </a:rPr>
+                        <a:t>0.6955</a:t>
+                      </a:r>
+                    </a:p>
+                  </a:txBody>
+                  <a:tcPr marL="6350" marR="6350" marT="6350" marB="0" anchor="b"/>
                 </a:tc>
                 <a:extLst>
                   <a:ext uri="{0D108BD9-81ED-4DB2-BD59-A6C34878D82A}">
@@ -4998,7 +4978,7 @@
                     <a:lstStyle/>
                     <a:p>
                       <a:r>
-                        <a:rPr lang="en-GB" dirty="0"/>
+                        <a:rPr lang="en-GB" sz="1600" dirty="0"/>
                         <a:t>Latino Hispanic</a:t>
                       </a:r>
                     </a:p>
@@ -5011,32 +4991,32 @@
                     <a:lstStyle/>
                     <a:p>
                       <a:r>
-                        <a:rPr lang="en-GB" dirty="0"/>
-                        <a:t>10%</a:t>
-                      </a:r>
-                    </a:p>
-                  </a:txBody>
-                  <a:tcPr/>
-                </a:tc>
-                <a:tc>
-                  <a:txBody>
-                    <a:bodyPr/>
-                    <a:lstStyle/>
-                    <a:p>
-                      <a:endParaRPr lang="en-GB" dirty="0"/>
-                    </a:p>
-                  </a:txBody>
-                  <a:tcPr/>
-                </a:tc>
-                <a:tc>
-                  <a:txBody>
-                    <a:bodyPr/>
-                    <a:lstStyle/>
-                    <a:p>
-                      <a:endParaRPr lang="en-GB"/>
-                    </a:p>
-                  </a:txBody>
-                  <a:tcPr/>
+                        <a:rPr lang="en-GB" sz="1600" dirty="0"/>
+                        <a:t>9.76% (2.dp) of 5739 = 561 people</a:t>
+                      </a:r>
+                    </a:p>
+                  </a:txBody>
+                  <a:tcPr/>
+                </a:tc>
+                <a:tc>
+                  <a:txBody>
+                    <a:bodyPr/>
+                    <a:lstStyle/>
+                    <a:p>
+                      <a:pPr algn="r" fontAlgn="b"/>
+                      <a:r>
+                        <a:rPr lang="en-GB" sz="1600" b="0" i="0" u="none" strike="noStrike">
+                          <a:solidFill>
+                            <a:srgbClr val="000000"/>
+                          </a:solidFill>
+                          <a:effectLst/>
+                          <a:latin typeface="+mn-lt"/>
+                        </a:rPr>
+                        <a:t>0.732</a:t>
+                      </a:r>
+                    </a:p>
+                  </a:txBody>
+                  <a:tcPr marL="6350" marR="6350" marT="6350" marB="0" anchor="b"/>
                 </a:tc>
                 <a:extLst>
                   <a:ext uri="{0D108BD9-81ED-4DB2-BD59-A6C34878D82A}">
@@ -5051,7 +5031,7 @@
                     <a:lstStyle/>
                     <a:p>
                       <a:r>
-                        <a:rPr lang="en-GB" dirty="0"/>
+                        <a:rPr lang="en-GB" sz="1600" dirty="0"/>
                         <a:t>Asian</a:t>
                       </a:r>
                     </a:p>
@@ -5064,32 +5044,32 @@
                     <a:lstStyle/>
                     <a:p>
                       <a:r>
-                        <a:rPr lang="en-GB" dirty="0"/>
-                        <a:t>12%</a:t>
-                      </a:r>
-                    </a:p>
-                  </a:txBody>
-                  <a:tcPr/>
-                </a:tc>
-                <a:tc>
-                  <a:txBody>
-                    <a:bodyPr/>
-                    <a:lstStyle/>
-                    <a:p>
-                      <a:endParaRPr lang="en-GB" dirty="0"/>
-                    </a:p>
-                  </a:txBody>
-                  <a:tcPr/>
-                </a:tc>
-                <a:tc>
-                  <a:txBody>
-                    <a:bodyPr/>
-                    <a:lstStyle/>
-                    <a:p>
-                      <a:endParaRPr lang="en-GB" dirty="0"/>
-                    </a:p>
-                  </a:txBody>
-                  <a:tcPr/>
+                        <a:rPr lang="en-GB" sz="1600" dirty="0"/>
+                        <a:t>12.35%(2.dp) of 5739 = 710 people</a:t>
+                      </a:r>
+                    </a:p>
+                  </a:txBody>
+                  <a:tcPr/>
+                </a:tc>
+                <a:tc>
+                  <a:txBody>
+                    <a:bodyPr/>
+                    <a:lstStyle/>
+                    <a:p>
+                      <a:pPr algn="r" fontAlgn="b"/>
+                      <a:r>
+                        <a:rPr lang="en-GB" sz="1600" b="0" i="0" u="none" strike="noStrike">
+                          <a:solidFill>
+                            <a:srgbClr val="000000"/>
+                          </a:solidFill>
+                          <a:effectLst/>
+                          <a:latin typeface="+mn-lt"/>
+                        </a:rPr>
+                        <a:t>0.8155</a:t>
+                      </a:r>
+                    </a:p>
+                  </a:txBody>
+                  <a:tcPr marL="6350" marR="6350" marT="6350" marB="0" anchor="b"/>
                 </a:tc>
                 <a:extLst>
                   <a:ext uri="{0D108BD9-81ED-4DB2-BD59-A6C34878D82A}">
@@ -5104,7 +5084,7 @@
                     <a:lstStyle/>
                     <a:p>
                       <a:r>
-                        <a:rPr lang="en-GB" dirty="0"/>
+                        <a:rPr lang="en-GB" sz="1600" dirty="0"/>
                         <a:t>Indian</a:t>
                       </a:r>
                     </a:p>
@@ -5117,32 +5097,32 @@
                     <a:lstStyle/>
                     <a:p>
                       <a:r>
-                        <a:rPr lang="en-GB" dirty="0"/>
-                        <a:t>1%</a:t>
-                      </a:r>
-                    </a:p>
-                  </a:txBody>
-                  <a:tcPr/>
-                </a:tc>
-                <a:tc>
-                  <a:txBody>
-                    <a:bodyPr/>
-                    <a:lstStyle/>
-                    <a:p>
-                      <a:endParaRPr lang="en-GB" dirty="0"/>
-                    </a:p>
-                  </a:txBody>
-                  <a:tcPr/>
-                </a:tc>
-                <a:tc>
-                  <a:txBody>
-                    <a:bodyPr/>
-                    <a:lstStyle/>
-                    <a:p>
-                      <a:endParaRPr lang="en-GB" dirty="0"/>
-                    </a:p>
-                  </a:txBody>
-                  <a:tcPr/>
+                        <a:rPr lang="en-GB" sz="1600" dirty="0"/>
+                        <a:t>1.34%(2.dp) of 5739 = 77 people</a:t>
+                      </a:r>
+                    </a:p>
+                  </a:txBody>
+                  <a:tcPr/>
+                </a:tc>
+                <a:tc>
+                  <a:txBody>
+                    <a:bodyPr/>
+                    <a:lstStyle/>
+                    <a:p>
+                      <a:pPr algn="r" fontAlgn="b"/>
+                      <a:r>
+                        <a:rPr lang="en-GB" sz="1600" b="0" i="0" u="none" strike="noStrike" dirty="0">
+                          <a:solidFill>
+                            <a:srgbClr val="000000"/>
+                          </a:solidFill>
+                          <a:effectLst/>
+                          <a:latin typeface="+mn-lt"/>
+                        </a:rPr>
+                        <a:t>0.6765</a:t>
+                      </a:r>
+                    </a:p>
+                  </a:txBody>
+                  <a:tcPr marL="6350" marR="6350" marT="6350" marB="0" anchor="b"/>
                 </a:tc>
                 <a:extLst>
                   <a:ext uri="{0D108BD9-81ED-4DB2-BD59-A6C34878D82A}">
@@ -5157,46 +5137,43 @@
                     <a:lstStyle/>
                     <a:p>
                       <a:r>
-                        <a:rPr lang="en-GB" dirty="0" err="1"/>
+                        <a:rPr lang="en-GB" sz="1600" dirty="0" err="1"/>
                         <a:t>Race_unrecognised</a:t>
                       </a:r>
-                      <a:endParaRPr lang="en-GB" dirty="0"/>
-                    </a:p>
-                  </a:txBody>
-                  <a:tcPr/>
-                </a:tc>
-                <a:tc>
-                  <a:txBody>
-                    <a:bodyPr/>
-                    <a:lstStyle/>
-                    <a:p>
-                      <a:r>
-                        <a:rPr lang="en-GB" dirty="0"/>
-                        <a:t>3%</a:t>
-                      </a:r>
-                    </a:p>
-                  </a:txBody>
-                  <a:tcPr/>
-                </a:tc>
-                <a:tc>
-                  <a:txBody>
-                    <a:bodyPr/>
-                    <a:lstStyle/>
-                    <a:p>
-                      <a:endParaRPr lang="en-GB" dirty="0"/>
-                    </a:p>
-                  </a:txBody>
-                  <a:tcPr/>
-                </a:tc>
-                <a:tc>
-                  <a:txBody>
-                    <a:bodyPr/>
-                    <a:lstStyle/>
-                    <a:p>
-                      <a:endParaRPr lang="en-GB" dirty="0"/>
-                    </a:p>
-                  </a:txBody>
-                  <a:tcPr/>
+                      <a:endParaRPr lang="en-GB" sz="1600" dirty="0"/>
+                    </a:p>
+                  </a:txBody>
+                  <a:tcPr/>
+                </a:tc>
+                <a:tc>
+                  <a:txBody>
+                    <a:bodyPr/>
+                    <a:lstStyle/>
+                    <a:p>
+                      <a:r>
+                        <a:rPr lang="en-GB" sz="1600" dirty="0"/>
+                        <a:t>2.24%(2.dp) of 5739 = 129 people</a:t>
+                      </a:r>
+                    </a:p>
+                  </a:txBody>
+                  <a:tcPr/>
+                </a:tc>
+                <a:tc>
+                  <a:txBody>
+                    <a:bodyPr/>
+                    <a:lstStyle/>
+                    <a:p>
+                      <a:pPr algn="r" fontAlgn="b"/>
+                      <a:endParaRPr lang="en-GB" sz="1100" b="0" i="0" u="none" strike="noStrike" dirty="0">
+                        <a:solidFill>
+                          <a:srgbClr val="000000"/>
+                        </a:solidFill>
+                        <a:effectLst/>
+                        <a:latin typeface="Calibri" panose="020F0502020204030204" pitchFamily="34" charset="0"/>
+                      </a:endParaRPr>
+                    </a:p>
+                  </a:txBody>
+                  <a:tcPr marL="6350" marR="6350" marT="6350" marB="0" anchor="b"/>
                 </a:tc>
                 <a:extLst>
                   <a:ext uri="{0D108BD9-81ED-4DB2-BD59-A6C34878D82A}">
@@ -5325,14 +5302,14 @@
           <p:nvPr>
             <p:extLst>
               <p:ext uri="{D42A27DB-BD31-4B8C-83A1-F6EECF244321}">
-                <p14:modId xmlns:p14="http://schemas.microsoft.com/office/powerpoint/2010/main" val="4189765326"/>
+                <p14:modId xmlns:p14="http://schemas.microsoft.com/office/powerpoint/2010/main" val="3755716405"/>
               </p:ext>
             </p:extLst>
           </p:nvPr>
         </p:nvGraphicFramePr>
         <p:xfrm>
           <a:off x="96758" y="1549846"/>
-          <a:ext cx="2288223" cy="3790242"/>
+          <a:ext cx="2288223" cy="3716331"/>
         </p:xfrm>
         <a:graphic>
           <a:graphicData uri="http://schemas.openxmlformats.org/drawingml/2006/table">
@@ -6419,6 +6396,306 @@
                     <a:bodyPr/>
                     <a:lstStyle/>
                     <a:p>
+                      <a:r>
+                        <a:rPr lang="en-GB" sz="500" dirty="0"/>
+                        <a:t>Afton Smith</a:t>
+                      </a:r>
+                    </a:p>
+                  </a:txBody>
+                  <a:tcPr/>
+                </a:tc>
+                <a:tc>
+                  <a:txBody>
+                    <a:bodyPr/>
+                    <a:lstStyle/>
+                    <a:p>
+                      <a:r>
+                        <a:rPr lang="en-GB" sz="500" dirty="0"/>
+                        <a:t>-</a:t>
+                      </a:r>
+                    </a:p>
+                  </a:txBody>
+                  <a:tcPr/>
+                </a:tc>
+                <a:extLst>
+                  <a:ext uri="{0D108BD9-81ED-4DB2-BD59-A6C34878D82A}">
+                    <a16:rowId xmlns:a16="http://schemas.microsoft.com/office/drawing/2014/main" val="429791919"/>
+                  </a:ext>
+                </a:extLst>
+              </a:tr>
+              <a:tr h="169929">
+                <a:tc>
+                  <a:txBody>
+                    <a:bodyPr/>
+                    <a:lstStyle/>
+                    <a:p>
+                      <a:r>
+                        <a:rPr lang="en-GB" sz="500" dirty="0"/>
+                        <a:t>Ted Washington</a:t>
+                      </a:r>
+                    </a:p>
+                  </a:txBody>
+                  <a:tcPr/>
+                </a:tc>
+                <a:tc>
+                  <a:txBody>
+                    <a:bodyPr/>
+                    <a:lstStyle/>
+                    <a:p>
+                      <a:r>
+                        <a:rPr lang="en-GB" sz="500" dirty="0"/>
+                        <a:t>-</a:t>
+                      </a:r>
+                    </a:p>
+                  </a:txBody>
+                  <a:tcPr/>
+                </a:tc>
+                <a:tc>
+                  <a:txBody>
+                    <a:bodyPr/>
+                    <a:lstStyle/>
+                    <a:p>
+                      <a:r>
+                        <a:rPr lang="en-GB" sz="500" dirty="0"/>
+                        <a:t>Yekaterina Guseva</a:t>
+                      </a:r>
+                    </a:p>
+                  </a:txBody>
+                  <a:tcPr/>
+                </a:tc>
+                <a:tc>
+                  <a:txBody>
+                    <a:bodyPr/>
+                    <a:lstStyle/>
+                    <a:p>
+                      <a:r>
+                        <a:rPr lang="en-GB" sz="500" dirty="0"/>
+                        <a:t>-</a:t>
+                      </a:r>
+                    </a:p>
+                  </a:txBody>
+                  <a:tcPr/>
+                </a:tc>
+                <a:extLst>
+                  <a:ext uri="{0D108BD9-81ED-4DB2-BD59-A6C34878D82A}">
+                    <a16:rowId xmlns:a16="http://schemas.microsoft.com/office/drawing/2014/main" val="977737313"/>
+                  </a:ext>
+                </a:extLst>
+              </a:tr>
+              <a:tr h="169929">
+                <a:tc>
+                  <a:txBody>
+                    <a:bodyPr/>
+                    <a:lstStyle/>
+                    <a:p>
+                      <a:r>
+                        <a:rPr lang="en-GB" sz="500" dirty="0"/>
+                        <a:t>Terence Newman</a:t>
+                      </a:r>
+                    </a:p>
+                  </a:txBody>
+                  <a:tcPr/>
+                </a:tc>
+                <a:tc>
+                  <a:txBody>
+                    <a:bodyPr/>
+                    <a:lstStyle/>
+                    <a:p>
+                      <a:r>
+                        <a:rPr lang="en-GB" sz="500" dirty="0"/>
+                        <a:t>-</a:t>
+                      </a:r>
+                    </a:p>
+                  </a:txBody>
+                  <a:tcPr/>
+                </a:tc>
+                <a:tc>
+                  <a:txBody>
+                    <a:bodyPr/>
+                    <a:lstStyle/>
+                    <a:p>
+                      <a:r>
+                        <a:rPr lang="en-GB" sz="500" dirty="0"/>
+                        <a:t>Yevgeny Kafelnikov</a:t>
+                      </a:r>
+                    </a:p>
+                  </a:txBody>
+                  <a:tcPr/>
+                </a:tc>
+                <a:tc>
+                  <a:txBody>
+                    <a:bodyPr/>
+                    <a:lstStyle/>
+                    <a:p>
+                      <a:r>
+                        <a:rPr lang="en-GB" sz="500" dirty="0"/>
+                        <a:t>-</a:t>
+                      </a:r>
+                    </a:p>
+                  </a:txBody>
+                  <a:tcPr/>
+                </a:tc>
+                <a:extLst>
+                  <a:ext uri="{0D108BD9-81ED-4DB2-BD59-A6C34878D82A}">
+                    <a16:rowId xmlns:a16="http://schemas.microsoft.com/office/drawing/2014/main" val="268052284"/>
+                  </a:ext>
+                </a:extLst>
+              </a:tr>
+              <a:tr h="169929">
+                <a:tc>
+                  <a:txBody>
+                    <a:bodyPr/>
+                    <a:lstStyle/>
+                    <a:p>
+                      <a:r>
+                        <a:rPr lang="en-GB" sz="500" dirty="0"/>
+                        <a:t>Teresa Graves</a:t>
+                      </a:r>
+                    </a:p>
+                  </a:txBody>
+                  <a:tcPr/>
+                </a:tc>
+                <a:tc>
+                  <a:txBody>
+                    <a:bodyPr/>
+                    <a:lstStyle/>
+                    <a:p>
+                      <a:r>
+                        <a:rPr lang="en-GB" sz="500" dirty="0"/>
+                        <a:t>-</a:t>
+                      </a:r>
+                    </a:p>
+                  </a:txBody>
+                  <a:tcPr/>
+                </a:tc>
+                <a:tc>
+                  <a:txBody>
+                    <a:bodyPr/>
+                    <a:lstStyle/>
+                    <a:p>
+                      <a:r>
+                        <a:rPr lang="en-GB" sz="500" dirty="0"/>
+                        <a:t>Yogi Berra</a:t>
+                      </a:r>
+                    </a:p>
+                  </a:txBody>
+                  <a:tcPr/>
+                </a:tc>
+                <a:tc>
+                  <a:txBody>
+                    <a:bodyPr/>
+                    <a:lstStyle/>
+                    <a:p>
+                      <a:r>
+                        <a:rPr lang="en-GB" sz="500" dirty="0"/>
+                        <a:t>-</a:t>
+                      </a:r>
+                    </a:p>
+                  </a:txBody>
+                  <a:tcPr/>
+                </a:tc>
+                <a:extLst>
+                  <a:ext uri="{0D108BD9-81ED-4DB2-BD59-A6C34878D82A}">
+                    <a16:rowId xmlns:a16="http://schemas.microsoft.com/office/drawing/2014/main" val="3453303915"/>
+                  </a:ext>
+                </a:extLst>
+              </a:tr>
+              <a:tr h="169929">
+                <a:tc>
+                  <a:txBody>
+                    <a:bodyPr/>
+                    <a:lstStyle/>
+                    <a:p>
+                      <a:r>
+                        <a:rPr lang="en-GB" sz="500" dirty="0" err="1"/>
+                        <a:t>Teresa_Williams</a:t>
+                      </a:r>
+                      <a:endParaRPr lang="en-GB" sz="500" dirty="0"/>
+                    </a:p>
+                  </a:txBody>
+                  <a:tcPr/>
+                </a:tc>
+                <a:tc>
+                  <a:txBody>
+                    <a:bodyPr/>
+                    <a:lstStyle/>
+                    <a:p>
+                      <a:r>
+                        <a:rPr lang="en-GB" sz="500" dirty="0"/>
+                        <a:t>-</a:t>
+                      </a:r>
+                    </a:p>
+                  </a:txBody>
+                  <a:tcPr/>
+                </a:tc>
+                <a:tc>
+                  <a:txBody>
+                    <a:bodyPr/>
+                    <a:lstStyle/>
+                    <a:p>
+                      <a:r>
+                        <a:rPr lang="en-GB" sz="500" dirty="0"/>
+                        <a:t>Yossi Beilin</a:t>
+                      </a:r>
+                    </a:p>
+                  </a:txBody>
+                  <a:tcPr/>
+                </a:tc>
+                <a:tc>
+                  <a:txBody>
+                    <a:bodyPr/>
+                    <a:lstStyle/>
+                    <a:p>
+                      <a:r>
+                        <a:rPr lang="en-GB" sz="500" dirty="0"/>
+                        <a:t>-</a:t>
+                      </a:r>
+                    </a:p>
+                  </a:txBody>
+                  <a:tcPr/>
+                </a:tc>
+                <a:extLst>
+                  <a:ext uri="{0D108BD9-81ED-4DB2-BD59-A6C34878D82A}">
+                    <a16:rowId xmlns:a16="http://schemas.microsoft.com/office/drawing/2014/main" val="1777076561"/>
+                  </a:ext>
+                </a:extLst>
+              </a:tr>
+              <a:tr h="169929">
+                <a:tc>
+                  <a:txBody>
+                    <a:bodyPr/>
+                    <a:lstStyle/>
+                    <a:p>
+                      <a:r>
+                        <a:rPr lang="en-GB" sz="500" dirty="0">
+                          <a:highlight>
+                            <a:srgbClr val="FFFF00"/>
+                          </a:highlight>
+                        </a:rPr>
+                        <a:t>Terrell Suggs</a:t>
+                      </a:r>
+                    </a:p>
+                  </a:txBody>
+                  <a:tcPr/>
+                </a:tc>
+                <a:tc>
+                  <a:txBody>
+                    <a:bodyPr/>
+                    <a:lstStyle/>
+                    <a:p>
+                      <a:r>
+                        <a:rPr lang="en-GB" sz="500" dirty="0"/>
+                        <a:t>-</a:t>
+                      </a:r>
+                    </a:p>
+                  </a:txBody>
+                  <a:tcPr/>
+                </a:tc>
+                <a:tc>
+                  <a:txBody>
+                    <a:bodyPr/>
+                    <a:lstStyle/>
+                    <a:p>
                       <a:pPr marL="0" marR="0" lvl="0" indent="0" algn="l" defTabSz="914400" rtl="0" eaLnBrk="1" fontAlgn="auto" latinLnBrk="0" hangingPunct="1">
                         <a:lnSpc>
                           <a:spcPct val="100000"/>
@@ -6437,335 +6714,26 @@
                         <a:defRPr/>
                       </a:pPr>
                       <a:r>
-                        <a:rPr lang="en-GB" sz="500" dirty="0"/>
-                        <a:t>Tatiana </a:t>
-                      </a:r>
-                      <a:r>
-                        <a:rPr lang="en-GB" sz="500" dirty="0" err="1"/>
-                        <a:t>Gratcheva</a:t>
-                      </a:r>
-                      <a:endParaRPr lang="en-GB" sz="500" dirty="0"/>
-                    </a:p>
-                    <a:p>
-                      <a:endParaRPr lang="en-GB" sz="500" dirty="0"/>
-                    </a:p>
-                  </a:txBody>
-                  <a:tcPr/>
-                </a:tc>
-                <a:tc>
-                  <a:txBody>
-                    <a:bodyPr/>
-                    <a:lstStyle/>
-                    <a:p>
-                      <a:r>
-                        <a:rPr lang="en-GB" sz="500" dirty="0"/>
-                        <a:t>-</a:t>
-                      </a:r>
-                    </a:p>
-                  </a:txBody>
-                  <a:tcPr/>
-                </a:tc>
-                <a:extLst>
-                  <a:ext uri="{0D108BD9-81ED-4DB2-BD59-A6C34878D82A}">
-                    <a16:rowId xmlns:a16="http://schemas.microsoft.com/office/drawing/2014/main" val="429791919"/>
-                  </a:ext>
-                </a:extLst>
-              </a:tr>
-              <a:tr h="169929">
-                <a:tc>
-                  <a:txBody>
-                    <a:bodyPr/>
-                    <a:lstStyle/>
-                    <a:p>
-                      <a:r>
-                        <a:rPr lang="en-GB" sz="500" dirty="0"/>
-                        <a:t>Ted Washington</a:t>
-                      </a:r>
-                    </a:p>
-                  </a:txBody>
-                  <a:tcPr/>
-                </a:tc>
-                <a:tc>
-                  <a:txBody>
-                    <a:bodyPr/>
-                    <a:lstStyle/>
-                    <a:p>
-                      <a:r>
-                        <a:rPr lang="en-GB" sz="500" dirty="0"/>
-                        <a:t>-</a:t>
-                      </a:r>
-                    </a:p>
-                  </a:txBody>
-                  <a:tcPr/>
-                </a:tc>
-                <a:tc>
-                  <a:txBody>
-                    <a:bodyPr/>
-                    <a:lstStyle/>
-                    <a:p>
-                      <a:r>
-                        <a:rPr lang="en-GB" sz="500" dirty="0"/>
-                        <a:t>Yekaterina Guseva</a:t>
-                      </a:r>
-                    </a:p>
-                  </a:txBody>
-                  <a:tcPr/>
-                </a:tc>
-                <a:tc>
-                  <a:txBody>
-                    <a:bodyPr/>
-                    <a:lstStyle/>
-                    <a:p>
-                      <a:r>
-                        <a:rPr lang="en-GB" sz="500" dirty="0"/>
-                        <a:t>-</a:t>
-                      </a:r>
-                    </a:p>
-                  </a:txBody>
-                  <a:tcPr/>
-                </a:tc>
-                <a:extLst>
-                  <a:ext uri="{0D108BD9-81ED-4DB2-BD59-A6C34878D82A}">
-                    <a16:rowId xmlns:a16="http://schemas.microsoft.com/office/drawing/2014/main" val="977737313"/>
-                  </a:ext>
-                </a:extLst>
-              </a:tr>
-              <a:tr h="169929">
-                <a:tc>
-                  <a:txBody>
-                    <a:bodyPr/>
-                    <a:lstStyle/>
-                    <a:p>
-                      <a:r>
-                        <a:rPr lang="en-GB" sz="500" dirty="0"/>
-                        <a:t>Terence Newman</a:t>
-                      </a:r>
-                    </a:p>
-                  </a:txBody>
-                  <a:tcPr/>
-                </a:tc>
-                <a:tc>
-                  <a:txBody>
-                    <a:bodyPr/>
-                    <a:lstStyle/>
-                    <a:p>
-                      <a:r>
-                        <a:rPr lang="en-GB" sz="500" dirty="0"/>
-                        <a:t>-</a:t>
-                      </a:r>
-                    </a:p>
-                  </a:txBody>
-                  <a:tcPr/>
-                </a:tc>
-                <a:tc>
-                  <a:txBody>
-                    <a:bodyPr/>
-                    <a:lstStyle/>
-                    <a:p>
-                      <a:r>
-                        <a:rPr lang="en-GB" sz="500" dirty="0"/>
-                        <a:t>Yevgeny Kafelnikov</a:t>
-                      </a:r>
-                    </a:p>
-                  </a:txBody>
-                  <a:tcPr/>
-                </a:tc>
-                <a:tc>
-                  <a:txBody>
-                    <a:bodyPr/>
-                    <a:lstStyle/>
-                    <a:p>
-                      <a:r>
-                        <a:rPr lang="en-GB" sz="500" dirty="0"/>
-                        <a:t>-</a:t>
-                      </a:r>
-                    </a:p>
-                  </a:txBody>
-                  <a:tcPr/>
-                </a:tc>
-                <a:extLst>
-                  <a:ext uri="{0D108BD9-81ED-4DB2-BD59-A6C34878D82A}">
-                    <a16:rowId xmlns:a16="http://schemas.microsoft.com/office/drawing/2014/main" val="268052284"/>
-                  </a:ext>
-                </a:extLst>
-              </a:tr>
-              <a:tr h="169929">
-                <a:tc>
-                  <a:txBody>
-                    <a:bodyPr/>
-                    <a:lstStyle/>
-                    <a:p>
-                      <a:r>
-                        <a:rPr lang="en-GB" sz="500" dirty="0"/>
-                        <a:t>Teresa Graves</a:t>
-                      </a:r>
-                    </a:p>
-                  </a:txBody>
-                  <a:tcPr/>
-                </a:tc>
-                <a:tc>
-                  <a:txBody>
-                    <a:bodyPr/>
-                    <a:lstStyle/>
-                    <a:p>
-                      <a:r>
-                        <a:rPr lang="en-GB" sz="500" dirty="0"/>
-                        <a:t>-</a:t>
-                      </a:r>
-                    </a:p>
-                  </a:txBody>
-                  <a:tcPr/>
-                </a:tc>
-                <a:tc>
-                  <a:txBody>
-                    <a:bodyPr/>
-                    <a:lstStyle/>
-                    <a:p>
-                      <a:r>
-                        <a:rPr lang="en-GB" sz="500" dirty="0"/>
-                        <a:t>Yogi Berra</a:t>
-                      </a:r>
-                    </a:p>
-                  </a:txBody>
-                  <a:tcPr/>
-                </a:tc>
-                <a:tc>
-                  <a:txBody>
-                    <a:bodyPr/>
-                    <a:lstStyle/>
-                    <a:p>
-                      <a:r>
-                        <a:rPr lang="en-GB" sz="500" dirty="0"/>
-                        <a:t>-</a:t>
-                      </a:r>
-                    </a:p>
-                  </a:txBody>
-                  <a:tcPr/>
-                </a:tc>
-                <a:extLst>
-                  <a:ext uri="{0D108BD9-81ED-4DB2-BD59-A6C34878D82A}">
-                    <a16:rowId xmlns:a16="http://schemas.microsoft.com/office/drawing/2014/main" val="3453303915"/>
-                  </a:ext>
-                </a:extLst>
-              </a:tr>
-              <a:tr h="169929">
-                <a:tc>
-                  <a:txBody>
-                    <a:bodyPr/>
-                    <a:lstStyle/>
-                    <a:p>
-                      <a:r>
-                        <a:rPr lang="en-GB" sz="500" dirty="0" err="1"/>
-                        <a:t>Teresa_Williams</a:t>
-                      </a:r>
-                      <a:endParaRPr lang="en-GB" sz="500" dirty="0"/>
-                    </a:p>
-                  </a:txBody>
-                  <a:tcPr/>
-                </a:tc>
-                <a:tc>
-                  <a:txBody>
-                    <a:bodyPr/>
-                    <a:lstStyle/>
-                    <a:p>
-                      <a:r>
-                        <a:rPr lang="en-GB" sz="500" dirty="0"/>
-                        <a:t>-</a:t>
-                      </a:r>
-                    </a:p>
-                  </a:txBody>
-                  <a:tcPr/>
-                </a:tc>
-                <a:tc>
-                  <a:txBody>
-                    <a:bodyPr/>
-                    <a:lstStyle/>
-                    <a:p>
-                      <a:r>
-                        <a:rPr lang="en-GB" sz="500" dirty="0"/>
-                        <a:t>Yossi Beilin</a:t>
-                      </a:r>
-                    </a:p>
-                  </a:txBody>
-                  <a:tcPr/>
-                </a:tc>
-                <a:tc>
-                  <a:txBody>
-                    <a:bodyPr/>
-                    <a:lstStyle/>
-                    <a:p>
-                      <a:r>
-                        <a:rPr lang="en-GB" sz="500" dirty="0"/>
-                        <a:t>-</a:t>
-                      </a:r>
-                    </a:p>
-                  </a:txBody>
-                  <a:tcPr/>
-                </a:tc>
-                <a:extLst>
-                  <a:ext uri="{0D108BD9-81ED-4DB2-BD59-A6C34878D82A}">
-                    <a16:rowId xmlns:a16="http://schemas.microsoft.com/office/drawing/2014/main" val="1777076561"/>
-                  </a:ext>
-                </a:extLst>
-              </a:tr>
-              <a:tr h="169929">
-                <a:tc>
-                  <a:txBody>
-                    <a:bodyPr/>
-                    <a:lstStyle/>
-                    <a:p>
-                      <a:r>
-                        <a:rPr lang="en-GB" sz="500" dirty="0"/>
-                        <a:t>Terrell Suggs</a:t>
-                      </a:r>
-                    </a:p>
-                  </a:txBody>
-                  <a:tcPr/>
-                </a:tc>
-                <a:tc>
-                  <a:txBody>
-                    <a:bodyPr/>
-                    <a:lstStyle/>
-                    <a:p>
-                      <a:r>
-                        <a:rPr lang="en-GB" sz="500" dirty="0"/>
-                        <a:t>-</a:t>
-                      </a:r>
-                    </a:p>
-                  </a:txBody>
-                  <a:tcPr/>
-                </a:tc>
-                <a:tc>
-                  <a:txBody>
-                    <a:bodyPr/>
-                    <a:lstStyle/>
-                    <a:p>
-                      <a:pPr marL="0" marR="0" lvl="0" indent="0" algn="l" defTabSz="914400" rtl="0" eaLnBrk="1" fontAlgn="auto" latinLnBrk="0" hangingPunct="1">
-                        <a:lnSpc>
-                          <a:spcPct val="100000"/>
-                        </a:lnSpc>
-                        <a:spcBef>
-                          <a:spcPts val="0"/>
-                        </a:spcBef>
-                        <a:spcAft>
-                          <a:spcPts val="0"/>
-                        </a:spcAft>
-                        <a:buClrTx/>
-                        <a:buSzTx/>
-                        <a:buFontTx/>
-                        <a:buNone/>
-                        <a:tabLst/>
-                        <a:defRPr/>
-                      </a:pPr>
-                      <a:r>
-                        <a:rPr lang="en-GB" sz="500" dirty="0"/>
+                        <a:rPr lang="en-GB" sz="500" dirty="0">
+                          <a:highlight>
+                            <a:srgbClr val="FFFF00"/>
+                          </a:highlight>
+                        </a:rPr>
                         <a:t>Wolfgang </a:t>
                       </a:r>
                       <a:r>
-                        <a:rPr lang="en-GB" sz="500" dirty="0" err="1"/>
+                        <a:rPr lang="en-GB" sz="500" dirty="0" err="1">
+                          <a:highlight>
+                            <a:srgbClr val="FFFF00"/>
+                          </a:highlight>
+                        </a:rPr>
                         <a:t>Schuessel</a:t>
                       </a:r>
-                      <a:endParaRPr lang="en-GB" sz="500" dirty="0"/>
+                      <a:endParaRPr lang="en-GB" sz="500" dirty="0">
+                        <a:highlight>
+                          <a:srgbClr val="FFFF00"/>
+                        </a:highlight>
+                      </a:endParaRPr>
                     </a:p>
                   </a:txBody>
                   <a:tcPr/>
@@ -6808,7 +6776,7 @@
           <p:nvPr>
             <p:extLst>
               <p:ext uri="{D42A27DB-BD31-4B8C-83A1-F6EECF244321}">
-                <p14:modId xmlns:p14="http://schemas.microsoft.com/office/powerpoint/2010/main" val="1267802506"/>
+                <p14:modId xmlns:p14="http://schemas.microsoft.com/office/powerpoint/2010/main" val="3833259197"/>
               </p:ext>
             </p:extLst>
           </p:nvPr>
@@ -7031,7 +6999,11 @@
                         <a:defRPr/>
                       </a:pPr>
                       <a:r>
-                        <a:rPr lang="en-GB" sz="500" dirty="0"/>
+                        <a:rPr lang="en-GB" sz="500" dirty="0">
+                          <a:highlight>
+                            <a:srgbClr val="FFFF00"/>
+                          </a:highlight>
+                        </a:rPr>
                         <a:t>Woody Allen</a:t>
                       </a:r>
                     </a:p>
@@ -7824,12 +7796,16 @@
                     <a:lstStyle/>
                     <a:p>
                       <a:r>
+                        <a:rPr lang="en-GB" sz="500" dirty="0"/>
+                        <a:t>Wang </a:t>
+                      </a:r>
+                      <a:r>
                         <a:rPr lang="en-GB" sz="500" dirty="0" err="1"/>
                         <a:t>Yingfan</a:t>
                       </a:r>
                       <a:r>
                         <a:rPr lang="en-GB" sz="500" dirty="0"/>
-                        <a:t> Wang</a:t>
+                        <a:t> </a:t>
                       </a:r>
                     </a:p>
                   </a:txBody>
@@ -7923,7 +7899,7 @@
                     <a:p>
                       <a:r>
                         <a:rPr lang="en-GB" sz="500" dirty="0"/>
-                        <a:t>Yashwant Sinha</a:t>
+                        <a:t>Afton Smith</a:t>
                       </a:r>
                     </a:p>
                   </a:txBody>
@@ -8239,9 +8215,30 @@
                     <a:bodyPr/>
                     <a:lstStyle/>
                     <a:p>
+                      <a:pPr marL="0" marR="0" lvl="0" indent="0" algn="l" defTabSz="914400" rtl="0" eaLnBrk="1" fontAlgn="auto" latinLnBrk="0" hangingPunct="1">
+                        <a:lnSpc>
+                          <a:spcPct val="100000"/>
+                        </a:lnSpc>
+                        <a:spcBef>
+                          <a:spcPts val="0"/>
+                        </a:spcBef>
+                        <a:spcAft>
+                          <a:spcPts val="0"/>
+                        </a:spcAft>
+                        <a:buClrTx/>
+                        <a:buSzTx/>
+                        <a:buFontTx/>
+                        <a:buNone/>
+                        <a:tabLst/>
+                        <a:defRPr/>
+                      </a:pPr>
+                      <a:r>
+                        <a:rPr lang="en-GB" sz="500" dirty="0"/>
+                        <a:t>Wolfgang </a:t>
+                      </a:r>
                       <a:r>
                         <a:rPr lang="en-GB" sz="500" dirty="0" err="1"/>
-                        <a:t>Yves_Brodeur</a:t>
+                        <a:t>Schuessel</a:t>
                       </a:r>
                       <a:endParaRPr lang="en-GB" sz="500" dirty="0"/>
                     </a:p>
@@ -8286,14 +8283,14 @@
           <p:nvPr>
             <p:extLst>
               <p:ext uri="{D42A27DB-BD31-4B8C-83A1-F6EECF244321}">
-                <p14:modId xmlns:p14="http://schemas.microsoft.com/office/powerpoint/2010/main" val="3468870977"/>
+                <p14:modId xmlns:p14="http://schemas.microsoft.com/office/powerpoint/2010/main" val="1487101737"/>
               </p:ext>
             </p:extLst>
           </p:nvPr>
         </p:nvGraphicFramePr>
         <p:xfrm>
           <a:off x="4864708" y="1549846"/>
-          <a:ext cx="2274272" cy="3714042"/>
+          <a:ext cx="2274272" cy="3826659"/>
         </p:xfrm>
         <a:graphic>
           <a:graphicData uri="http://schemas.openxmlformats.org/drawingml/2006/table">
@@ -8411,9 +8408,10 @@
                     <a:lstStyle/>
                     <a:p>
                       <a:r>
-                        <a:rPr lang="en-GB" sz="500" dirty="0"/>
-                        <a:t>Will Young</a:t>
-                      </a:r>
+                        <a:rPr lang="en-GB" sz="500" dirty="0" err="1"/>
+                        <a:t>Aaron_Pena</a:t>
+                      </a:r>
+                      <a:endParaRPr lang="en-GB" sz="500" dirty="0"/>
                     </a:p>
                   </a:txBody>
                   <a:tcPr marL="53946" marR="53946" marT="26973" marB="26973"/>
@@ -8492,12 +8490,8 @@
                     <a:lstStyle/>
                     <a:p>
                       <a:r>
-                        <a:rPr lang="en-GB" sz="500" dirty="0"/>
-                        <a:t>Xanana </a:t>
-                      </a:r>
-                      <a:r>
                         <a:rPr lang="en-GB" sz="500" dirty="0" err="1"/>
-                        <a:t>Gusmao</a:t>
+                        <a:t>Abel_Aguilar</a:t>
                       </a:r>
                       <a:endParaRPr lang="en-GB" sz="500" dirty="0"/>
                     </a:p>
@@ -8556,12 +8550,8 @@
                     <a:lstStyle/>
                     <a:p>
                       <a:r>
-                        <a:rPr lang="en-GB" sz="500" dirty="0"/>
-                        <a:t>Ximena </a:t>
-                      </a:r>
-                      <a:r>
                         <a:rPr lang="en-GB" sz="500" dirty="0" err="1"/>
-                        <a:t>Bohorquez</a:t>
+                        <a:t>Abner_Martinez</a:t>
                       </a:r>
                       <a:endParaRPr lang="en-GB" sz="500" dirty="0"/>
                     </a:p>
@@ -8620,12 +8610,8 @@
                     <a:lstStyle/>
                     <a:p>
                       <a:r>
-                        <a:rPr lang="en-GB" sz="500" dirty="0"/>
-                        <a:t>Yana </a:t>
-                      </a:r>
-                      <a:r>
                         <a:rPr lang="en-GB" sz="500" dirty="0" err="1"/>
-                        <a:t>Klochkova</a:t>
+                        <a:t>Adelina_Avila</a:t>
                       </a:r>
                       <a:endParaRPr lang="en-GB" sz="500" dirty="0"/>
                     </a:p>
@@ -8685,15 +8671,7 @@
                     <a:p>
                       <a:r>
                         <a:rPr lang="en-GB" sz="500" dirty="0" err="1"/>
-                        <a:t>Yannos</a:t>
-                      </a:r>
-                      <a:r>
-                        <a:rPr lang="en-GB" sz="500" dirty="0"/>
-                        <a:t> </a:t>
-                      </a:r>
-                      <a:r>
-                        <a:rPr lang="en-GB" sz="500" dirty="0" err="1"/>
-                        <a:t>Papantoniou</a:t>
+                        <a:t>Adriana_Perez_Navarro</a:t>
                       </a:r>
                       <a:endParaRPr lang="en-GB" sz="500" dirty="0"/>
                     </a:p>
@@ -8758,12 +8736,9 @@
                     <a:p>
                       <a:r>
                         <a:rPr lang="en-GB" sz="500" dirty="0" err="1"/>
-                        <a:t>Taia</a:t>
-                      </a:r>
-                      <a:r>
-                        <a:rPr lang="en-GB" sz="500" dirty="0"/>
-                        <a:t> Balk</a:t>
-                      </a:r>
+                        <a:t>Alberto_Gonzales</a:t>
+                      </a:r>
+                      <a:endParaRPr lang="en-GB" sz="500" dirty="0"/>
                     </a:p>
                   </a:txBody>
                   <a:tcPr marL="53946" marR="53946" marT="26973" marB="26973"/>
@@ -8837,12 +8812,8 @@
                     <a:lstStyle/>
                     <a:p>
                       <a:r>
-                        <a:rPr lang="en-GB" sz="500" dirty="0"/>
-                        <a:t>Tanya </a:t>
-                      </a:r>
-                      <a:r>
                         <a:rPr lang="en-GB" sz="500" dirty="0" err="1"/>
-                        <a:t>Holyk</a:t>
+                        <a:t>Alberto_Ruiz_Gallardon</a:t>
                       </a:r>
                       <a:endParaRPr lang="en-GB" sz="500" dirty="0"/>
                     </a:p>
@@ -8902,15 +8873,7 @@
                     <a:p>
                       <a:r>
                         <a:rPr lang="en-GB" sz="500" dirty="0" err="1"/>
-                        <a:t>Taoufik</a:t>
-                      </a:r>
-                      <a:r>
-                        <a:rPr lang="en-GB" sz="500" dirty="0"/>
-                        <a:t> </a:t>
-                      </a:r>
-                      <a:r>
-                        <a:rPr lang="en-GB" sz="500" dirty="0" err="1"/>
-                        <a:t>Mathlouthi</a:t>
+                        <a:t>Alberto_Sordi</a:t>
                       </a:r>
                       <a:endParaRPr lang="en-GB" sz="500" dirty="0"/>
                     </a:p>
@@ -8970,12 +8933,9 @@
                     <a:p>
                       <a:r>
                         <a:rPr lang="en-GB" sz="500" dirty="0" err="1"/>
-                        <a:t>Taylyn</a:t>
-                      </a:r>
-                      <a:r>
-                        <a:rPr lang="en-GB" sz="500" dirty="0"/>
-                        <a:t> Solomon</a:t>
-                      </a:r>
+                        <a:t>Aldo_Paredes</a:t>
+                      </a:r>
+                      <a:endParaRPr lang="en-GB" sz="500" dirty="0"/>
                     </a:p>
                   </a:txBody>
                   <a:tcPr/>
@@ -9032,9 +8992,10 @@
                     <a:lstStyle/>
                     <a:p>
                       <a:r>
-                        <a:rPr lang="en-GB" sz="500" dirty="0"/>
-                        <a:t>Tom Harkin</a:t>
-                      </a:r>
+                        <a:rPr lang="en-GB" sz="500" dirty="0" err="1"/>
+                        <a:t>Alejandro_Fernandez</a:t>
+                      </a:r>
+                      <a:endParaRPr lang="en-GB" sz="500" dirty="0"/>
                     </a:p>
                   </a:txBody>
                   <a:tcPr/>
@@ -9092,20 +9053,9 @@
                     <a:p>
                       <a:r>
                         <a:rPr lang="en-GB" sz="500" dirty="0" err="1"/>
-                        <a:t>Terje</a:t>
-                      </a:r>
-                      <a:r>
-                        <a:rPr lang="en-GB" sz="500" dirty="0"/>
-                        <a:t> </a:t>
-                      </a:r>
-                      <a:r>
-                        <a:rPr lang="en-GB" sz="500" dirty="0" err="1"/>
-                        <a:t>Roed</a:t>
-                      </a:r>
-                      <a:r>
-                        <a:rPr lang="en-GB" sz="500" dirty="0"/>
-                        <a:t>-Larsen</a:t>
-                      </a:r>
+                        <a:t>Alejandro_Lembo</a:t>
+                      </a:r>
+                      <a:endParaRPr lang="en-GB" sz="500" dirty="0"/>
                     </a:p>
                   </a:txBody>
                   <a:tcPr/>
@@ -9184,14 +9134,18 @@
                     <a:lstStyle/>
                     <a:p>
                       <a:r>
-                        <a:rPr lang="en-GB" sz="500" dirty="0"/>
-                        <a:t>Terry </a:t>
-                      </a:r>
-                      <a:r>
-                        <a:rPr lang="en-GB" sz="500" dirty="0" err="1"/>
-                        <a:t>Semel</a:t>
-                      </a:r>
-                      <a:endParaRPr lang="en-GB" sz="500" dirty="0"/>
+                        <a:rPr lang="en-GB" sz="500" dirty="0" err="1">
+                          <a:highlight>
+                            <a:srgbClr val="FFFF00"/>
+                          </a:highlight>
+                        </a:rPr>
+                        <a:t>Alejandro_Toledo</a:t>
+                      </a:r>
+                      <a:endParaRPr lang="en-GB" sz="500" dirty="0">
+                        <a:highlight>
+                          <a:srgbClr val="FFFF00"/>
+                        </a:highlight>
+                      </a:endParaRPr>
                     </a:p>
                   </a:txBody>
                   <a:tcPr/>
@@ -9253,12 +9207,8 @@
                     <a:lstStyle/>
                     <a:p>
                       <a:r>
-                        <a:rPr lang="en-GB" sz="500" dirty="0"/>
-                        <a:t>Thomas </a:t>
-                      </a:r>
-                      <a:r>
                         <a:rPr lang="en-GB" sz="500" dirty="0" err="1"/>
-                        <a:t>Haeggstroem</a:t>
+                        <a:t>Alessandro_Nesta</a:t>
                       </a:r>
                       <a:endParaRPr lang="en-GB" sz="500" dirty="0"/>
                     </a:p>
@@ -9317,9 +9267,10 @@
                     <a:lstStyle/>
                     <a:p>
                       <a:r>
-                        <a:rPr lang="en-GB" sz="500" dirty="0"/>
-                        <a:t>Tim Conway</a:t>
-                      </a:r>
+                        <a:rPr lang="en-GB" sz="500" dirty="0" err="1"/>
+                        <a:t>Taia_Balk</a:t>
+                      </a:r>
+                      <a:endParaRPr lang="en-GB" sz="500" dirty="0"/>
                     </a:p>
                   </a:txBody>
                   <a:tcPr/>
@@ -9381,34 +9332,35 @@
                     <a:lstStyle/>
                     <a:p>
                       <a:r>
-                        <a:rPr lang="en-GB" sz="500" dirty="0"/>
-                        <a:t> Tim Lopes</a:t>
-                      </a:r>
-                    </a:p>
-                  </a:txBody>
-                  <a:tcPr/>
-                </a:tc>
-                <a:tc>
-                  <a:txBody>
-                    <a:bodyPr/>
-                    <a:lstStyle/>
-                    <a:p>
-                      <a:r>
-                        <a:rPr lang="en-GB" sz="500" dirty="0"/>
-                        <a:t>-</a:t>
-                      </a:r>
-                    </a:p>
-                  </a:txBody>
-                  <a:tcPr/>
-                </a:tc>
-                <a:tc>
-                  <a:txBody>
-                    <a:bodyPr/>
-                    <a:lstStyle/>
-                    <a:p>
-                      <a:r>
-                        <a:rPr lang="en-GB" sz="500" dirty="0"/>
-                        <a:t>Yashwant Sinha</a:t>
+                        <a:rPr lang="en-GB" sz="500" dirty="0" err="1"/>
+                        <a:t>Tanya_Holyk</a:t>
+                      </a:r>
+                      <a:endParaRPr lang="en-GB" sz="500" dirty="0"/>
+                    </a:p>
+                  </a:txBody>
+                  <a:tcPr/>
+                </a:tc>
+                <a:tc>
+                  <a:txBody>
+                    <a:bodyPr/>
+                    <a:lstStyle/>
+                    <a:p>
+                      <a:r>
+                        <a:rPr lang="en-GB" sz="500" dirty="0"/>
+                        <a:t>-</a:t>
+                      </a:r>
+                    </a:p>
+                  </a:txBody>
+                  <a:tcPr/>
+                </a:tc>
+                <a:tc>
+                  <a:txBody>
+                    <a:bodyPr/>
+                    <a:lstStyle/>
+                    <a:p>
+                      <a:r>
+                        <a:rPr lang="en-GB" sz="500" dirty="0"/>
+                        <a:t>Afton Smith</a:t>
                       </a:r>
                     </a:p>
                   </a:txBody>
@@ -9440,9 +9392,10 @@
                     <a:lstStyle/>
                     <a:p>
                       <a:r>
-                        <a:rPr lang="en-GB" sz="500" dirty="0"/>
-                        <a:t>Toby Keith</a:t>
-                      </a:r>
+                        <a:rPr lang="en-GB" sz="500" dirty="0" err="1"/>
+                        <a:t>Taoufik_Mathlouthi</a:t>
+                      </a:r>
+                      <a:endParaRPr lang="en-GB" sz="500" dirty="0"/>
                     </a:p>
                   </a:txBody>
                   <a:tcPr/>
@@ -9499,9 +9452,10 @@
                     <a:lstStyle/>
                     <a:p>
                       <a:r>
-                        <a:rPr lang="en-GB" sz="500" dirty="0"/>
-                        <a:t>Tommy Haas</a:t>
-                      </a:r>
+                        <a:rPr lang="en-GB" sz="500" dirty="0" err="1"/>
+                        <a:t>Taylyn_Solomon</a:t>
+                      </a:r>
+                      <a:endParaRPr lang="en-GB" sz="500" dirty="0"/>
                     </a:p>
                   </a:txBody>
                   <a:tcPr/>
@@ -9558,9 +9512,10 @@
                     <a:lstStyle/>
                     <a:p>
                       <a:r>
-                        <a:rPr lang="en-GB" sz="500" dirty="0"/>
-                        <a:t>Tommy Maddox</a:t>
-                      </a:r>
+                        <a:rPr lang="en-GB" sz="500" dirty="0" err="1"/>
+                        <a:t>Tim_Lopes</a:t>
+                      </a:r>
+                      <a:endParaRPr lang="en-GB" sz="500" dirty="0"/>
                     </a:p>
                   </a:txBody>
                   <a:tcPr/>
@@ -9617,12 +9572,8 @@
                     <a:lstStyle/>
                     <a:p>
                       <a:r>
-                        <a:rPr lang="en-GB" sz="500" dirty="0"/>
-                        <a:t>Tom </a:t>
-                      </a:r>
-                      <a:r>
                         <a:rPr lang="en-GB" sz="500" dirty="0" err="1"/>
-                        <a:t>Amstutz</a:t>
+                        <a:t>Xanana_Gusmao</a:t>
                       </a:r>
                       <a:endParaRPr lang="en-GB" sz="500" dirty="0"/>
                     </a:p>
@@ -9682,7 +9633,7 @@
                     <a:p>
                       <a:r>
                         <a:rPr lang="en-GB" sz="500" dirty="0" err="1"/>
-                        <a:t>Tom_Craddick</a:t>
+                        <a:t>Zarai_Toledo</a:t>
                       </a:r>
                       <a:endParaRPr lang="en-GB" sz="500" dirty="0"/>
                     </a:p>
@@ -9707,10 +9658,32 @@
                     <a:bodyPr/>
                     <a:lstStyle/>
                     <a:p>
-                      <a:r>
-                        <a:rPr lang="en-GB" sz="500" dirty="0"/>
-                        <a:t>Yves Brodeur</a:t>
-                      </a:r>
+                      <a:pPr marL="0" marR="0" lvl="0" indent="0" algn="l" defTabSz="914400" rtl="0" eaLnBrk="1" fontAlgn="auto" latinLnBrk="0" hangingPunct="1">
+                        <a:lnSpc>
+                          <a:spcPct val="100000"/>
+                        </a:lnSpc>
+                        <a:spcBef>
+                          <a:spcPts val="0"/>
+                        </a:spcBef>
+                        <a:spcAft>
+                          <a:spcPts val="0"/>
+                        </a:spcAft>
+                        <a:buClrTx/>
+                        <a:buSzTx/>
+                        <a:buFontTx/>
+                        <a:buNone/>
+                        <a:tabLst/>
+                        <a:defRPr/>
+                      </a:pPr>
+                      <a:r>
+                        <a:rPr lang="en-GB" sz="500" dirty="0"/>
+                        <a:t>Wolfgang </a:t>
+                      </a:r>
+                      <a:r>
+                        <a:rPr lang="en-GB" sz="500" dirty="0" err="1"/>
+                        <a:t>Schuessel</a:t>
+                      </a:r>
+                      <a:endParaRPr lang="en-GB" sz="500" dirty="0"/>
                     </a:p>
                   </a:txBody>
                   <a:tcPr/>
@@ -9753,14 +9726,14 @@
           <p:nvPr>
             <p:extLst>
               <p:ext uri="{D42A27DB-BD31-4B8C-83A1-F6EECF244321}">
-                <p14:modId xmlns:p14="http://schemas.microsoft.com/office/powerpoint/2010/main" val="2082692658"/>
+                <p14:modId xmlns:p14="http://schemas.microsoft.com/office/powerpoint/2010/main" val="3637183339"/>
               </p:ext>
             </p:extLst>
           </p:nvPr>
         </p:nvGraphicFramePr>
         <p:xfrm>
           <a:off x="7189731" y="1545296"/>
-          <a:ext cx="2274272" cy="3787953"/>
+          <a:ext cx="2274272" cy="3818600"/>
         </p:xfrm>
         <a:graphic>
           <a:graphicData uri="http://schemas.openxmlformats.org/drawingml/2006/table">
@@ -9878,9 +9851,10 @@
                     <a:lstStyle/>
                     <a:p>
                       <a:r>
-                        <a:rPr lang="en-GB" sz="500" dirty="0"/>
-                        <a:t>Will Self</a:t>
-                      </a:r>
+                        <a:rPr lang="en-GB" sz="500" dirty="0" err="1"/>
+                        <a:t>Ali_Abbas</a:t>
+                      </a:r>
+                      <a:endParaRPr lang="en-GB" sz="500" dirty="0"/>
                     </a:p>
                   </a:txBody>
                   <a:tcPr marL="48175" marR="48175" marT="24088" marB="24088"/>
@@ -9959,9 +9933,10 @@
                     <a:lstStyle/>
                     <a:p>
                       <a:r>
-                        <a:rPr lang="en-GB" sz="500" dirty="0"/>
-                        <a:t>Yann Martel</a:t>
-                      </a:r>
+                        <a:rPr lang="en-GB" sz="500" dirty="0" err="1"/>
+                        <a:t>Ali_Abdullah_Saleh</a:t>
+                      </a:r>
+                      <a:endParaRPr lang="en-GB" sz="500" dirty="0"/>
                     </a:p>
                   </a:txBody>
                   <a:tcPr marL="48175" marR="48175" marT="24088" marB="24088"/>
@@ -10018,9 +9993,10 @@
                     <a:lstStyle/>
                     <a:p>
                       <a:r>
-                        <a:rPr lang="en-GB" sz="500" dirty="0"/>
-                        <a:t>Yao Ming</a:t>
-                      </a:r>
+                        <a:rPr lang="en-GB" sz="500" dirty="0" err="1"/>
+                        <a:t>Ali_Adbul_Karim_Madani</a:t>
+                      </a:r>
+                      <a:endParaRPr lang="en-GB" sz="500" dirty="0"/>
                     </a:p>
                   </a:txBody>
                   <a:tcPr marL="48175" marR="48175" marT="24088" marB="24088"/>
@@ -10077,12 +10053,8 @@
                     <a:lstStyle/>
                     <a:p>
                       <a:r>
-                        <a:rPr lang="en-GB" sz="500" dirty="0"/>
-                        <a:t>Yasar </a:t>
-                      </a:r>
-                      <a:r>
                         <a:rPr lang="en-GB" sz="500" dirty="0" err="1"/>
-                        <a:t>Yakis</a:t>
+                        <a:t>Ali_Ahmeti</a:t>
                       </a:r>
                       <a:endParaRPr lang="en-GB" sz="500" dirty="0"/>
                     </a:p>
@@ -10142,12 +10114,9 @@
                     <a:p>
                       <a:r>
                         <a:rPr lang="en-GB" sz="500" dirty="0" err="1"/>
-                        <a:t>Yasein</a:t>
-                      </a:r>
-                      <a:r>
-                        <a:rPr lang="en-GB" sz="500" dirty="0"/>
-                        <a:t> Taher</a:t>
-                      </a:r>
+                        <a:t>Ali_Fallahian</a:t>
+                      </a:r>
+                      <a:endParaRPr lang="en-GB" sz="500" dirty="0"/>
                     </a:p>
                   </a:txBody>
                   <a:tcPr marL="48175" marR="48175" marT="24088" marB="24088"/>
@@ -10210,7 +10179,7 @@
                     <a:p>
                       <a:r>
                         <a:rPr lang="en-GB" sz="500" dirty="0" err="1"/>
-                        <a:t>Yasser_Arafat</a:t>
+                        <a:t>Ali_Hammoud</a:t>
                       </a:r>
                       <a:endParaRPr lang="en-GB" sz="500" dirty="0"/>
                     </a:p>
@@ -10286,12 +10255,8 @@
                     <a:lstStyle/>
                     <a:p>
                       <a:r>
-                        <a:rPr lang="en-GB" sz="500" dirty="0"/>
-                        <a:t>Talal </a:t>
-                      </a:r>
-                      <a:r>
                         <a:rPr lang="en-GB" sz="500" dirty="0" err="1"/>
-                        <a:t>Keenaan</a:t>
+                        <a:t>Ali_Khamenei</a:t>
                       </a:r>
                       <a:endParaRPr lang="en-GB" sz="500" dirty="0"/>
                     </a:p>
@@ -10350,9 +10315,10 @@
                     <a:lstStyle/>
                     <a:p>
                       <a:r>
-                        <a:rPr lang="en-GB" sz="500" dirty="0"/>
-                        <a:t>Talisa Bratt</a:t>
-                      </a:r>
+                        <a:rPr lang="en-GB" sz="500" dirty="0" err="1"/>
+                        <a:t>Ali_Mohammed_Maher</a:t>
+                      </a:r>
+                      <a:endParaRPr lang="en-GB" sz="500" dirty="0"/>
                     </a:p>
                   </a:txBody>
                   <a:tcPr/>
@@ -10409,9 +10375,10 @@
                     <a:lstStyle/>
                     <a:p>
                       <a:r>
-                        <a:rPr lang="en-GB" sz="500" dirty="0"/>
-                        <a:t>Talisa Soto</a:t>
-                      </a:r>
+                        <a:rPr lang="en-GB" sz="500" dirty="0" err="1"/>
+                        <a:t>Ali_Naimi</a:t>
+                      </a:r>
+                      <a:endParaRPr lang="en-GB" sz="500" dirty="0"/>
                     </a:p>
                   </a:txBody>
                   <a:tcPr/>
@@ -10468,9 +10435,10 @@
                     <a:lstStyle/>
                     <a:p>
                       <a:r>
-                        <a:rPr lang="en-GB" sz="500" dirty="0"/>
-                        <a:t>Tariq Aziz</a:t>
-                      </a:r>
+                        <a:rPr lang="en-GB" sz="500" dirty="0" err="1"/>
+                        <a:t>Makiya_Ali_Hassan</a:t>
+                      </a:r>
+                      <a:endParaRPr lang="en-GB" sz="500" dirty="0"/>
                     </a:p>
                   </a:txBody>
                   <a:tcPr/>
@@ -10528,12 +10496,9 @@
                     <a:p>
                       <a:r>
                         <a:rPr lang="en-GB" sz="500" dirty="0" err="1"/>
-                        <a:t>Tassos</a:t>
-                      </a:r>
-                      <a:r>
-                        <a:rPr lang="en-GB" sz="500" dirty="0"/>
-                        <a:t> Papadopoulos</a:t>
-                      </a:r>
+                        <a:t>Malik_Mahmud</a:t>
+                      </a:r>
+                      <a:endParaRPr lang="en-GB" sz="500" dirty="0"/>
                     </a:p>
                   </a:txBody>
                   <a:tcPr/>
@@ -10612,9 +10577,10 @@
                     <a:lstStyle/>
                     <a:p>
                       <a:r>
-                        <a:rPr lang="en-GB" sz="500" dirty="0"/>
-                        <a:t>Tatiana Kennedy Schlossberg</a:t>
-                      </a:r>
+                        <a:rPr lang="en-GB" sz="500" dirty="0" err="1"/>
+                        <a:t>Mamdouh_Habib</a:t>
+                      </a:r>
+                      <a:endParaRPr lang="en-GB" sz="500" dirty="0"/>
                     </a:p>
                   </a:txBody>
                   <a:tcPr/>
@@ -10676,9 +10642,10 @@
                     <a:lstStyle/>
                     <a:p>
                       <a:r>
-                        <a:rPr lang="en-GB" sz="500" dirty="0"/>
-                        <a:t>Ted Christopher</a:t>
-                      </a:r>
+                        <a:rPr lang="en-GB" sz="500" dirty="0" err="1"/>
+                        <a:t>Talal_Keenaan</a:t>
+                      </a:r>
+                      <a:endParaRPr lang="en-GB" sz="500" dirty="0"/>
                     </a:p>
                   </a:txBody>
                   <a:tcPr/>
@@ -10735,9 +10702,10 @@
                     <a:lstStyle/>
                     <a:p>
                       <a:r>
-                        <a:rPr lang="en-GB" sz="500" dirty="0"/>
-                        <a:t>Ted Costa</a:t>
-                      </a:r>
+                        <a:rPr lang="en-GB" sz="500" dirty="0" err="1"/>
+                        <a:t>Talisa_Bratt</a:t>
+                      </a:r>
+                      <a:endParaRPr lang="en-GB" sz="500" dirty="0"/>
                     </a:p>
                   </a:txBody>
                   <a:tcPr/>
@@ -10799,12 +10767,8 @@
                     <a:lstStyle/>
                     <a:p>
                       <a:r>
-                        <a:rPr lang="en-GB" sz="500" dirty="0"/>
-                        <a:t>Terry </a:t>
-                      </a:r>
-                      <a:r>
                         <a:rPr lang="en-GB" sz="500" dirty="0" err="1"/>
-                        <a:t>Hoeppner</a:t>
+                        <a:t>Talisa_Soto</a:t>
                       </a:r>
                       <a:endParaRPr lang="en-GB" sz="500" dirty="0"/>
                     </a:p>
@@ -10831,7 +10795,7 @@
                     <a:p>
                       <a:r>
                         <a:rPr lang="en-GB" sz="500" dirty="0"/>
-                        <a:t>Yashwant Sinha</a:t>
+                        <a:t>Afton Smith</a:t>
                       </a:r>
                     </a:p>
                   </a:txBody>
@@ -10863,9 +10827,10 @@
                     <a:lstStyle/>
                     <a:p>
                       <a:r>
-                        <a:rPr lang="en-GB" sz="500" dirty="0"/>
-                        <a:t>Theresa May</a:t>
-                      </a:r>
+                        <a:rPr lang="en-GB" sz="500" dirty="0" err="1"/>
+                        <a:t>Tariq_Aziz</a:t>
+                      </a:r>
+                      <a:endParaRPr lang="en-GB" sz="500" dirty="0"/>
                     </a:p>
                   </a:txBody>
                   <a:tcPr/>
@@ -10922,9 +10887,10 @@
                     <a:lstStyle/>
                     <a:p>
                       <a:r>
-                        <a:rPr lang="en-GB" sz="500" dirty="0"/>
-                        <a:t>Thomas Bjorn</a:t>
-                      </a:r>
+                        <a:rPr lang="en-GB" sz="500" dirty="0" err="1"/>
+                        <a:t>Tassos_Papadopoulos</a:t>
+                      </a:r>
+                      <a:endParaRPr lang="en-GB" sz="500" dirty="0"/>
                     </a:p>
                   </a:txBody>
                   <a:tcPr/>
@@ -10981,9 +10947,10 @@
                     <a:lstStyle/>
                     <a:p>
                       <a:r>
-                        <a:rPr lang="en-GB" sz="500" dirty="0"/>
-                        <a:t>Thomas Van Essen</a:t>
-                      </a:r>
+                        <a:rPr lang="en-GB" sz="500" dirty="0" err="1"/>
+                        <a:t>Yasar_Yakis</a:t>
+                      </a:r>
+                      <a:endParaRPr lang="en-GB" sz="500" dirty="0"/>
                     </a:p>
                   </a:txBody>
                   <a:tcPr/>
@@ -11040,9 +11007,10 @@
                     <a:lstStyle/>
                     <a:p>
                       <a:r>
-                        <a:rPr lang="en-GB" sz="500" dirty="0"/>
-                        <a:t>Tiago Splitter</a:t>
-                      </a:r>
+                        <a:rPr lang="en-GB" sz="500" dirty="0" err="1"/>
+                        <a:t>Yasein_Taher</a:t>
+                      </a:r>
+                      <a:endParaRPr lang="en-GB" sz="500" dirty="0"/>
                     </a:p>
                   </a:txBody>
                   <a:tcPr/>
@@ -11099,35 +11067,66 @@
                     <a:lstStyle/>
                     <a:p>
                       <a:r>
-                        <a:rPr lang="en-GB" sz="500" dirty="0"/>
-                        <a:t>Tim Blake Nelson</a:t>
-                      </a:r>
-                    </a:p>
-                  </a:txBody>
-                  <a:tcPr/>
-                </a:tc>
-                <a:tc>
-                  <a:txBody>
-                    <a:bodyPr/>
-                    <a:lstStyle/>
-                    <a:p>
-                      <a:r>
-                        <a:rPr lang="en-GB" sz="500" dirty="0"/>
-                        <a:t>-</a:t>
-                      </a:r>
-                    </a:p>
-                  </a:txBody>
-                  <a:tcPr/>
-                </a:tc>
-                <a:tc>
-                  <a:txBody>
-                    <a:bodyPr/>
-                    <a:lstStyle/>
-                    <a:p>
-                      <a:r>
-                        <a:rPr lang="en-GB" sz="500" dirty="0"/>
-                        <a:t>Yves Brodeur</a:t>
-                      </a:r>
+                        <a:rPr lang="en-GB" sz="500" dirty="0" err="1">
+                          <a:highlight>
+                            <a:srgbClr val="FFFF00"/>
+                          </a:highlight>
+                        </a:rPr>
+                        <a:t>Yasser_Arafat</a:t>
+                      </a:r>
+                      <a:endParaRPr lang="en-GB" sz="500" dirty="0">
+                        <a:highlight>
+                          <a:srgbClr val="FFFF00"/>
+                        </a:highlight>
+                      </a:endParaRPr>
+                    </a:p>
+                  </a:txBody>
+                  <a:tcPr/>
+                </a:tc>
+                <a:tc>
+                  <a:txBody>
+                    <a:bodyPr/>
+                    <a:lstStyle/>
+                    <a:p>
+                      <a:r>
+                        <a:rPr lang="en-GB" sz="500" dirty="0"/>
+                        <a:t>-</a:t>
+                      </a:r>
+                    </a:p>
+                  </a:txBody>
+                  <a:tcPr/>
+                </a:tc>
+                <a:tc>
+                  <a:txBody>
+                    <a:bodyPr/>
+                    <a:lstStyle/>
+                    <a:p>
+                      <a:pPr marL="0" marR="0" lvl="0" indent="0" algn="l" defTabSz="914400" rtl="0" eaLnBrk="1" fontAlgn="auto" latinLnBrk="0" hangingPunct="1">
+                        <a:lnSpc>
+                          <a:spcPct val="100000"/>
+                        </a:lnSpc>
+                        <a:spcBef>
+                          <a:spcPts val="0"/>
+                        </a:spcBef>
+                        <a:spcAft>
+                          <a:spcPts val="0"/>
+                        </a:spcAft>
+                        <a:buClrTx/>
+                        <a:buSzTx/>
+                        <a:buFontTx/>
+                        <a:buNone/>
+                        <a:tabLst/>
+                        <a:defRPr/>
+                      </a:pPr>
+                      <a:r>
+                        <a:rPr lang="en-GB" sz="500" dirty="0"/>
+                        <a:t>Wolfgang </a:t>
+                      </a:r>
+                      <a:r>
+                        <a:rPr lang="en-GB" sz="500" dirty="0" err="1"/>
+                        <a:t>Schuessel</a:t>
+                      </a:r>
+                      <a:endParaRPr lang="en-GB" sz="500" dirty="0"/>
                     </a:p>
                   </a:txBody>
                   <a:tcPr/>
@@ -11170,14 +11169,14 @@
           <p:nvPr>
             <p:extLst>
               <p:ext uri="{D42A27DB-BD31-4B8C-83A1-F6EECF244321}">
-                <p14:modId xmlns:p14="http://schemas.microsoft.com/office/powerpoint/2010/main" val="3838597414"/>
+                <p14:modId xmlns:p14="http://schemas.microsoft.com/office/powerpoint/2010/main" val="671561054"/>
               </p:ext>
             </p:extLst>
           </p:nvPr>
         </p:nvGraphicFramePr>
         <p:xfrm>
           <a:off x="9514754" y="1549845"/>
-          <a:ext cx="2288223" cy="4119513"/>
+          <a:ext cx="2288223" cy="4147606"/>
         </p:xfrm>
         <a:graphic>
           <a:graphicData uri="http://schemas.openxmlformats.org/drawingml/2006/table">
@@ -11295,9 +11294,10 @@
                     <a:lstStyle/>
                     <a:p>
                       <a:r>
-                        <a:rPr lang="en-GB" sz="500" dirty="0"/>
-                        <a:t>Willis Roberts</a:t>
-                      </a:r>
+                        <a:rPr lang="en-GB" sz="500" dirty="0" err="1"/>
+                        <a:t>Adoor_Gopalakarishnan</a:t>
+                      </a:r>
+                      <a:endParaRPr lang="en-GB" sz="500" dirty="0"/>
                     </a:p>
                   </a:txBody>
                   <a:tcPr marL="52310" marR="52310" marT="26155" marB="26155"/>
@@ -11376,9 +11376,10 @@
                     <a:lstStyle/>
                     <a:p>
                       <a:r>
-                        <a:rPr lang="en-GB" sz="500" dirty="0"/>
-                        <a:t>Tara Dawn Christensen</a:t>
-                      </a:r>
+                        <a:rPr lang="en-GB" sz="500" dirty="0" err="1"/>
+                        <a:t>Anjum_Hussain</a:t>
+                      </a:r>
+                      <a:endParaRPr lang="en-GB" sz="500" dirty="0"/>
                     </a:p>
                   </a:txBody>
                   <a:tcPr marL="52310" marR="52310" marT="26155" marB="26155"/>
@@ -11435,9 +11436,10 @@
                     <a:lstStyle/>
                     <a:p>
                       <a:r>
-                        <a:rPr lang="en-GB" sz="500" dirty="0"/>
-                        <a:t>Tony Fernandes</a:t>
-                      </a:r>
+                        <a:rPr lang="en-GB" sz="500" dirty="0" err="1"/>
+                        <a:t>Azmi_Bishara</a:t>
+                      </a:r>
+                      <a:endParaRPr lang="en-GB" sz="500" dirty="0"/>
                     </a:p>
                   </a:txBody>
                   <a:tcPr/>
@@ -11553,9 +11555,10 @@
                     <a:lstStyle/>
                     <a:p>
                       <a:r>
-                        <a:rPr lang="en-GB" sz="500" dirty="0"/>
-                        <a:t>Vinnie Jones</a:t>
-                      </a:r>
+                        <a:rPr lang="en-GB" sz="500" dirty="0" err="1"/>
+                        <a:t>Dalai_Lama</a:t>
+                      </a:r>
+                      <a:endParaRPr lang="en-GB" sz="500" dirty="0"/>
                     </a:p>
                   </a:txBody>
                   <a:tcPr/>
@@ -11693,7 +11696,11 @@
                     <a:lstStyle/>
                     <a:p>
                       <a:r>
-                        <a:rPr lang="en-GB" sz="500" dirty="0"/>
+                        <a:rPr lang="en-GB" sz="500" dirty="0">
+                          <a:highlight>
+                            <a:srgbClr val="FFFF00"/>
+                          </a:highlight>
+                        </a:rPr>
                         <a:t>Taha Yassin Ramadan</a:t>
                       </a:r>
                     </a:p>
@@ -11886,13 +11893,10 @@
                     <a:lstStyle/>
                     <a:p>
                       <a:r>
-                        <a:rPr lang="en-GB" sz="500" dirty="0" err="1"/>
-                        <a:t>Zaini</a:t>
-                      </a:r>
-                      <a:r>
-                        <a:rPr lang="en-GB" sz="500" dirty="0"/>
-                        <a:t> Abdullah</a:t>
-                      </a:r>
+                        <a:rPr lang="en-GB" sz="500"/>
+                        <a:t>Mohammad_Aktar</a:t>
+                      </a:r>
+                      <a:endParaRPr lang="en-GB" sz="500" dirty="0"/>
                     </a:p>
                   </a:txBody>
                   <a:tcPr>
@@ -12286,7 +12290,7 @@
                     <a:p>
                       <a:r>
                         <a:rPr lang="en-GB" sz="500" dirty="0"/>
-                        <a:t>Yashwant Sinha</a:t>
+                        <a:t>Afton Smith</a:t>
                       </a:r>
                     </a:p>
                   </a:txBody>
@@ -12614,10 +12618,32 @@
                     <a:bodyPr/>
                     <a:lstStyle/>
                     <a:p>
-                      <a:r>
-                        <a:rPr lang="en-GB" sz="500" dirty="0"/>
-                        <a:t>Yves Brodeur</a:t>
-                      </a:r>
+                      <a:pPr marL="0" marR="0" lvl="0" indent="0" algn="l" defTabSz="914400" rtl="0" eaLnBrk="1" fontAlgn="auto" latinLnBrk="0" hangingPunct="1">
+                        <a:lnSpc>
+                          <a:spcPct val="100000"/>
+                        </a:lnSpc>
+                        <a:spcBef>
+                          <a:spcPts val="0"/>
+                        </a:spcBef>
+                        <a:spcAft>
+                          <a:spcPts val="0"/>
+                        </a:spcAft>
+                        <a:buClrTx/>
+                        <a:buSzTx/>
+                        <a:buFontTx/>
+                        <a:buNone/>
+                        <a:tabLst/>
+                        <a:defRPr/>
+                      </a:pPr>
+                      <a:r>
+                        <a:rPr lang="en-GB" sz="500" dirty="0"/>
+                        <a:t>Wolfgang </a:t>
+                      </a:r>
+                      <a:r>
+                        <a:rPr lang="en-GB" sz="500" dirty="0" err="1"/>
+                        <a:t>Schuessel</a:t>
+                      </a:r>
+                      <a:endParaRPr lang="en-GB" sz="500" dirty="0"/>
                     </a:p>
                   </a:txBody>
                   <a:tcPr/>

</xml_diff>